<commit_message>
lab 7 ppt final
</commit_message>
<xml_diff>
--- a/實驗七/presentation/實驗七_第二組_葉彥辰_郭亮佑_蘇昱嘉.pptx
+++ b/實驗七/presentation/實驗七_第二組_葉彥辰_郭亮佑_蘇昱嘉.pptx
@@ -5,13 +5,17 @@
     <p:sldMasterId id="2147483660" r:id="rId1"/>
   </p:sldMasterIdLst>
   <p:notesMasterIdLst>
-    <p:notesMasterId r:id="rId6"/>
+    <p:notesMasterId r:id="rId10"/>
   </p:notesMasterIdLst>
   <p:sldIdLst>
     <p:sldId id="256" r:id="rId2"/>
     <p:sldId id="257" r:id="rId3"/>
-    <p:sldId id="342" r:id="rId4"/>
-    <p:sldId id="341" r:id="rId5"/>
+    <p:sldId id="345" r:id="rId4"/>
+    <p:sldId id="342" r:id="rId5"/>
+    <p:sldId id="343" r:id="rId6"/>
+    <p:sldId id="346" r:id="rId7"/>
+    <p:sldId id="347" r:id="rId8"/>
+    <p:sldId id="348" r:id="rId9"/>
   </p:sldIdLst>
   <p:sldSz cx="12192000" cy="6858000"/>
   <p:notesSz cx="6858000" cy="9144000"/>
@@ -121,6 +125,72 @@
 <file path=ppt/changesInfos/changesInfo1.xml><?xml version="1.0" encoding="utf-8"?>
 <pc:chgInfo xmlns:a="http://schemas.openxmlformats.org/drawingml/2006/main" xmlns:r="http://schemas.openxmlformats.org/officeDocument/2006/relationships" xmlns:ac="http://schemas.microsoft.com/office/drawing/2013/main/command" xmlns:pc="http://schemas.microsoft.com/office/powerpoint/2013/main/command">
   <pc:docChgLst>
+    <pc:chgData name="亮佑 郭" userId="0ac4c1b3aead664f" providerId="LiveId" clId="{6D0249C2-CDB6-4B5A-AD3A-51DACC1CBF54}"/>
+    <pc:docChg chg="undo redo custSel addSld modSld">
+      <pc:chgData name="亮佑 郭" userId="0ac4c1b3aead664f" providerId="LiveId" clId="{6D0249C2-CDB6-4B5A-AD3A-51DACC1CBF54}" dt="2025-03-02T13:07:28.303" v="1492" actId="20577"/>
+      <pc:docMkLst>
+        <pc:docMk/>
+      </pc:docMkLst>
+      <pc:sldChg chg="addSp delSp modSp mod">
+        <pc:chgData name="亮佑 郭" userId="0ac4c1b3aead664f" providerId="LiveId" clId="{6D0249C2-CDB6-4B5A-AD3A-51DACC1CBF54}" dt="2025-03-02T04:26:21.232" v="1085" actId="21"/>
+        <pc:sldMkLst>
+          <pc:docMk/>
+          <pc:sldMk cId="3472544154" sldId="256"/>
+        </pc:sldMkLst>
+        <pc:picChg chg="add mod">
+          <ac:chgData name="亮佑 郭" userId="0ac4c1b3aead664f" providerId="LiveId" clId="{6D0249C2-CDB6-4B5A-AD3A-51DACC1CBF54}" dt="2025-03-02T04:26:15.826" v="1084" actId="1076"/>
+          <ac:picMkLst>
+            <pc:docMk/>
+            <pc:sldMk cId="3472544154" sldId="256"/>
+            <ac:picMk id="5" creationId="{9196E4C0-5E3D-B757-7AC4-4B4BEFDDBF51}"/>
+          </ac:picMkLst>
+        </pc:picChg>
+      </pc:sldChg>
+      <pc:sldChg chg="addSp modSp mod">
+        <pc:chgData name="亮佑 郭" userId="0ac4c1b3aead664f" providerId="LiveId" clId="{6D0249C2-CDB6-4B5A-AD3A-51DACC1CBF54}" dt="2025-03-01T14:44:49.924" v="1037" actId="1076"/>
+        <pc:sldMkLst>
+          <pc:docMk/>
+          <pc:sldMk cId="1791802273" sldId="281"/>
+        </pc:sldMkLst>
+      </pc:sldChg>
+      <pc:sldChg chg="addSp modSp mod">
+        <pc:chgData name="亮佑 郭" userId="0ac4c1b3aead664f" providerId="LiveId" clId="{6D0249C2-CDB6-4B5A-AD3A-51DACC1CBF54}" dt="2025-03-01T13:22:29.785" v="637" actId="1076"/>
+        <pc:sldMkLst>
+          <pc:docMk/>
+          <pc:sldMk cId="2918753784" sldId="282"/>
+        </pc:sldMkLst>
+      </pc:sldChg>
+      <pc:sldChg chg="addSp delSp modSp mod">
+        <pc:chgData name="亮佑 郭" userId="0ac4c1b3aead664f" providerId="LiveId" clId="{6D0249C2-CDB6-4B5A-AD3A-51DACC1CBF54}" dt="2025-03-01T12:25:09.212" v="155" actId="1076"/>
+        <pc:sldMkLst>
+          <pc:docMk/>
+          <pc:sldMk cId="1961476027" sldId="284"/>
+        </pc:sldMkLst>
+      </pc:sldChg>
+      <pc:sldChg chg="addSp delSp modSp new mod">
+        <pc:chgData name="亮佑 郭" userId="0ac4c1b3aead664f" providerId="LiveId" clId="{6D0249C2-CDB6-4B5A-AD3A-51DACC1CBF54}" dt="2025-03-02T04:20:23.311" v="1069" actId="20577"/>
+        <pc:sldMkLst>
+          <pc:docMk/>
+          <pc:sldMk cId="3609315435" sldId="288"/>
+        </pc:sldMkLst>
+      </pc:sldChg>
+      <pc:sldChg chg="addSp delSp modSp new mod">
+        <pc:chgData name="亮佑 郭" userId="0ac4c1b3aead664f" providerId="LiveId" clId="{6D0249C2-CDB6-4B5A-AD3A-51DACC1CBF54}" dt="2025-03-02T13:07:04.964" v="1468" actId="1076"/>
+        <pc:sldMkLst>
+          <pc:docMk/>
+          <pc:sldMk cId="607302404" sldId="289"/>
+        </pc:sldMkLst>
+      </pc:sldChg>
+      <pc:sldChg chg="addSp delSp modSp new mod">
+        <pc:chgData name="亮佑 郭" userId="0ac4c1b3aead664f" providerId="LiveId" clId="{6D0249C2-CDB6-4B5A-AD3A-51DACC1CBF54}" dt="2025-03-02T13:07:28.303" v="1492" actId="20577"/>
+        <pc:sldMkLst>
+          <pc:docMk/>
+          <pc:sldMk cId="1302444796" sldId="290"/>
+        </pc:sldMkLst>
+      </pc:sldChg>
+    </pc:docChg>
+  </pc:docChgLst>
+  <pc:docChgLst>
     <pc:chgData name="亮佑 郭" userId="0ac4c1b3aead664f" providerId="LiveId" clId="{69C52A65-8E28-4CC2-9C97-070222943FBD}"/>
     <pc:docChg chg="undo custSel modSld">
       <pc:chgData name="亮佑 郭" userId="0ac4c1b3aead664f" providerId="LiveId" clId="{69C52A65-8E28-4CC2-9C97-070222943FBD}" dt="2025-04-06T13:49:39.372" v="118" actId="14734"/>
@@ -207,72 +277,6 @@
       </pc:sldChg>
     </pc:docChg>
   </pc:docChgLst>
-  <pc:docChgLst>
-    <pc:chgData name="亮佑 郭" userId="0ac4c1b3aead664f" providerId="LiveId" clId="{6D0249C2-CDB6-4B5A-AD3A-51DACC1CBF54}"/>
-    <pc:docChg chg="undo redo custSel addSld modSld">
-      <pc:chgData name="亮佑 郭" userId="0ac4c1b3aead664f" providerId="LiveId" clId="{6D0249C2-CDB6-4B5A-AD3A-51DACC1CBF54}" dt="2025-03-02T13:07:28.303" v="1492" actId="20577"/>
-      <pc:docMkLst>
-        <pc:docMk/>
-      </pc:docMkLst>
-      <pc:sldChg chg="addSp delSp modSp mod">
-        <pc:chgData name="亮佑 郭" userId="0ac4c1b3aead664f" providerId="LiveId" clId="{6D0249C2-CDB6-4B5A-AD3A-51DACC1CBF54}" dt="2025-03-02T04:26:21.232" v="1085" actId="21"/>
-        <pc:sldMkLst>
-          <pc:docMk/>
-          <pc:sldMk cId="3472544154" sldId="256"/>
-        </pc:sldMkLst>
-        <pc:picChg chg="add mod">
-          <ac:chgData name="亮佑 郭" userId="0ac4c1b3aead664f" providerId="LiveId" clId="{6D0249C2-CDB6-4B5A-AD3A-51DACC1CBF54}" dt="2025-03-02T04:26:15.826" v="1084" actId="1076"/>
-          <ac:picMkLst>
-            <pc:docMk/>
-            <pc:sldMk cId="3472544154" sldId="256"/>
-            <ac:picMk id="5" creationId="{9196E4C0-5E3D-B757-7AC4-4B4BEFDDBF51}"/>
-          </ac:picMkLst>
-        </pc:picChg>
-      </pc:sldChg>
-      <pc:sldChg chg="addSp modSp mod">
-        <pc:chgData name="亮佑 郭" userId="0ac4c1b3aead664f" providerId="LiveId" clId="{6D0249C2-CDB6-4B5A-AD3A-51DACC1CBF54}" dt="2025-03-01T14:44:49.924" v="1037" actId="1076"/>
-        <pc:sldMkLst>
-          <pc:docMk/>
-          <pc:sldMk cId="1791802273" sldId="281"/>
-        </pc:sldMkLst>
-      </pc:sldChg>
-      <pc:sldChg chg="addSp modSp mod">
-        <pc:chgData name="亮佑 郭" userId="0ac4c1b3aead664f" providerId="LiveId" clId="{6D0249C2-CDB6-4B5A-AD3A-51DACC1CBF54}" dt="2025-03-01T13:22:29.785" v="637" actId="1076"/>
-        <pc:sldMkLst>
-          <pc:docMk/>
-          <pc:sldMk cId="2918753784" sldId="282"/>
-        </pc:sldMkLst>
-      </pc:sldChg>
-      <pc:sldChg chg="addSp delSp modSp mod">
-        <pc:chgData name="亮佑 郭" userId="0ac4c1b3aead664f" providerId="LiveId" clId="{6D0249C2-CDB6-4B5A-AD3A-51DACC1CBF54}" dt="2025-03-01T12:25:09.212" v="155" actId="1076"/>
-        <pc:sldMkLst>
-          <pc:docMk/>
-          <pc:sldMk cId="1961476027" sldId="284"/>
-        </pc:sldMkLst>
-      </pc:sldChg>
-      <pc:sldChg chg="addSp delSp modSp new mod">
-        <pc:chgData name="亮佑 郭" userId="0ac4c1b3aead664f" providerId="LiveId" clId="{6D0249C2-CDB6-4B5A-AD3A-51DACC1CBF54}" dt="2025-03-02T04:20:23.311" v="1069" actId="20577"/>
-        <pc:sldMkLst>
-          <pc:docMk/>
-          <pc:sldMk cId="3609315435" sldId="288"/>
-        </pc:sldMkLst>
-      </pc:sldChg>
-      <pc:sldChg chg="addSp delSp modSp new mod">
-        <pc:chgData name="亮佑 郭" userId="0ac4c1b3aead664f" providerId="LiveId" clId="{6D0249C2-CDB6-4B5A-AD3A-51DACC1CBF54}" dt="2025-03-02T13:07:04.964" v="1468" actId="1076"/>
-        <pc:sldMkLst>
-          <pc:docMk/>
-          <pc:sldMk cId="607302404" sldId="289"/>
-        </pc:sldMkLst>
-      </pc:sldChg>
-      <pc:sldChg chg="addSp delSp modSp new mod">
-        <pc:chgData name="亮佑 郭" userId="0ac4c1b3aead664f" providerId="LiveId" clId="{6D0249C2-CDB6-4B5A-AD3A-51DACC1CBF54}" dt="2025-03-02T13:07:28.303" v="1492" actId="20577"/>
-        <pc:sldMkLst>
-          <pc:docMk/>
-          <pc:sldMk cId="1302444796" sldId="290"/>
-        </pc:sldMkLst>
-      </pc:sldChg>
-    </pc:docChg>
-  </pc:docChgLst>
 </pc:chgInfo>
 </file>
 
@@ -358,7 +362,7 @@
           <a:p>
             <a:fld id="{57D05ABF-D590-45D6-9362-AC05D4E152AF}" type="datetimeFigureOut">
               <a:rPr lang="zh-TW" altLang="en-US" smtClean="0"/>
-              <a:t>2025/4/11</a:t>
+              <a:t>2025/4/13</a:t>
             </a:fld>
             <a:endParaRPr lang="zh-TW" altLang="en-US"/>
           </a:p>
@@ -772,7 +776,7 @@
           <a:p>
             <a:fld id="{A6CAA258-0090-479D-81AE-6C5E423E63D8}" type="datetimeFigureOut">
               <a:rPr lang="zh-TW" altLang="en-US" smtClean="0"/>
-              <a:t>2025/4/11</a:t>
+              <a:t>2025/4/13</a:t>
             </a:fld>
             <a:endParaRPr lang="zh-TW" altLang="en-US"/>
           </a:p>
@@ -970,7 +974,7 @@
           <a:p>
             <a:fld id="{A6CAA258-0090-479D-81AE-6C5E423E63D8}" type="datetimeFigureOut">
               <a:rPr lang="zh-TW" altLang="en-US" smtClean="0"/>
-              <a:t>2025/4/11</a:t>
+              <a:t>2025/4/13</a:t>
             </a:fld>
             <a:endParaRPr lang="zh-TW" altLang="en-US"/>
           </a:p>
@@ -1178,7 +1182,7 @@
           <a:p>
             <a:fld id="{A6CAA258-0090-479D-81AE-6C5E423E63D8}" type="datetimeFigureOut">
               <a:rPr lang="zh-TW" altLang="en-US" smtClean="0"/>
-              <a:t>2025/4/11</a:t>
+              <a:t>2025/4/13</a:t>
             </a:fld>
             <a:endParaRPr lang="zh-TW" altLang="en-US"/>
           </a:p>
@@ -1376,7 +1380,7 @@
           <a:p>
             <a:fld id="{A6CAA258-0090-479D-81AE-6C5E423E63D8}" type="datetimeFigureOut">
               <a:rPr lang="zh-TW" altLang="en-US" smtClean="0"/>
-              <a:t>2025/4/11</a:t>
+              <a:t>2025/4/13</a:t>
             </a:fld>
             <a:endParaRPr lang="zh-TW" altLang="en-US"/>
           </a:p>
@@ -1651,7 +1655,7 @@
           <a:p>
             <a:fld id="{A6CAA258-0090-479D-81AE-6C5E423E63D8}" type="datetimeFigureOut">
               <a:rPr lang="zh-TW" altLang="en-US" smtClean="0"/>
-              <a:t>2025/4/11</a:t>
+              <a:t>2025/4/13</a:t>
             </a:fld>
             <a:endParaRPr lang="zh-TW" altLang="en-US"/>
           </a:p>
@@ -1916,7 +1920,7 @@
           <a:p>
             <a:fld id="{A6CAA258-0090-479D-81AE-6C5E423E63D8}" type="datetimeFigureOut">
               <a:rPr lang="zh-TW" altLang="en-US" smtClean="0"/>
-              <a:t>2025/4/11</a:t>
+              <a:t>2025/4/13</a:t>
             </a:fld>
             <a:endParaRPr lang="zh-TW" altLang="en-US"/>
           </a:p>
@@ -2328,7 +2332,7 @@
           <a:p>
             <a:fld id="{A6CAA258-0090-479D-81AE-6C5E423E63D8}" type="datetimeFigureOut">
               <a:rPr lang="zh-TW" altLang="en-US" smtClean="0"/>
-              <a:t>2025/4/11</a:t>
+              <a:t>2025/4/13</a:t>
             </a:fld>
             <a:endParaRPr lang="zh-TW" altLang="en-US"/>
           </a:p>
@@ -2469,7 +2473,7 @@
           <a:p>
             <a:fld id="{A6CAA258-0090-479D-81AE-6C5E423E63D8}" type="datetimeFigureOut">
               <a:rPr lang="zh-TW" altLang="en-US" smtClean="0"/>
-              <a:t>2025/4/11</a:t>
+              <a:t>2025/4/13</a:t>
             </a:fld>
             <a:endParaRPr lang="zh-TW" altLang="en-US"/>
           </a:p>
@@ -2582,7 +2586,7 @@
           <a:p>
             <a:fld id="{A6CAA258-0090-479D-81AE-6C5E423E63D8}" type="datetimeFigureOut">
               <a:rPr lang="zh-TW" altLang="en-US" smtClean="0"/>
-              <a:t>2025/4/11</a:t>
+              <a:t>2025/4/13</a:t>
             </a:fld>
             <a:endParaRPr lang="zh-TW" altLang="en-US"/>
           </a:p>
@@ -2893,7 +2897,7 @@
           <a:p>
             <a:fld id="{A6CAA258-0090-479D-81AE-6C5E423E63D8}" type="datetimeFigureOut">
               <a:rPr lang="zh-TW" altLang="en-US" smtClean="0"/>
-              <a:t>2025/4/11</a:t>
+              <a:t>2025/4/13</a:t>
             </a:fld>
             <a:endParaRPr lang="zh-TW" altLang="en-US"/>
           </a:p>
@@ -3181,7 +3185,7 @@
           <a:p>
             <a:fld id="{A6CAA258-0090-479D-81AE-6C5E423E63D8}" type="datetimeFigureOut">
               <a:rPr lang="zh-TW" altLang="en-US" smtClean="0"/>
-              <a:t>2025/4/11</a:t>
+              <a:t>2025/4/13</a:t>
             </a:fld>
             <a:endParaRPr lang="zh-TW" altLang="en-US"/>
           </a:p>
@@ -3422,7 +3426,7 @@
           <a:p>
             <a:fld id="{A6CAA258-0090-479D-81AE-6C5E423E63D8}" type="datetimeFigureOut">
               <a:rPr lang="zh-TW" altLang="en-US" smtClean="0"/>
-              <a:t>2025/4/11</a:t>
+              <a:t>2025/4/13</a:t>
             </a:fld>
             <a:endParaRPr lang="zh-TW" altLang="en-US"/>
           </a:p>
@@ -3855,10 +3859,9 @@
           <a:lstStyle/>
           <a:p>
             <a:r>
-              <a:rPr lang="zh-TW" altLang="en-US" dirty="0" smtClean="0"/>
+              <a:rPr lang="zh-TW" altLang="en-US" dirty="0"/>
               <a:t>實驗七</a:t>
             </a:r>
-            <a:endParaRPr lang="zh-TW" altLang="en-US" dirty="0"/>
           </a:p>
         </p:txBody>
       </p:sp>
@@ -3938,7 +3941,7 @@
           <a:lstStyle/>
           <a:p>
             <a:r>
-              <a:rPr lang="zh-TW" altLang="en-US" dirty="0" smtClean="0">
+              <a:rPr lang="zh-TW" altLang="en-US" dirty="0">
                 <a:latin typeface="標楷體" panose="03000509000000000000" pitchFamily="65" charset="-120"/>
                 <a:ea typeface="標楷體" panose="03000509000000000000" pitchFamily="65" charset="-120"/>
               </a:rPr>
@@ -3949,14 +3952,7 @@
                 <a:latin typeface="標楷體" panose="03000509000000000000" pitchFamily="65" charset="-120"/>
                 <a:ea typeface="標楷體" panose="03000509000000000000" pitchFamily="65" charset="-120"/>
               </a:rPr>
-              <a:t>7</a:t>
-            </a:r>
-            <a:r>
-              <a:rPr lang="en-US" altLang="zh-TW" dirty="0" smtClean="0">
-                <a:latin typeface="標楷體" panose="03000509000000000000" pitchFamily="65" charset="-120"/>
-                <a:ea typeface="標楷體" panose="03000509000000000000" pitchFamily="65" charset="-120"/>
-              </a:rPr>
-              <a:t>-1</a:t>
+              <a:t>7-1</a:t>
             </a:r>
             <a:endParaRPr lang="zh-TW" altLang="en-US" dirty="0">
               <a:latin typeface="標楷體" panose="03000509000000000000" pitchFamily="65" charset="-120"/>
@@ -3981,7 +3977,7 @@
         </p:blipFill>
         <p:spPr>
           <a:xfrm>
-            <a:off x="785525" y="1690688"/>
+            <a:off x="992777" y="1498297"/>
             <a:ext cx="8335758" cy="707920"/>
           </a:xfrm>
           <a:prstGeom prst="rect">
@@ -3989,6 +3985,3108 @@
           </a:prstGeom>
         </p:spPr>
       </p:pic>
+      <p:graphicFrame>
+        <p:nvGraphicFramePr>
+          <p:cNvPr id="7" name="表格 6">
+            <a:extLst>
+              <a:ext uri="{FF2B5EF4-FFF2-40B4-BE49-F238E27FC236}">
+                <a16:creationId xmlns:a16="http://schemas.microsoft.com/office/drawing/2014/main" id="{1A4F68DD-F8F4-2326-EF24-86CCFF5F583F}"/>
+              </a:ext>
+            </a:extLst>
+          </p:cNvPr>
+          <p:cNvGraphicFramePr>
+            <a:graphicFrameLocks noGrp="1"/>
+          </p:cNvGraphicFramePr>
+          <p:nvPr>
+            <p:extLst>
+              <p:ext uri="{D42A27DB-BD31-4B8C-83A1-F6EECF244321}">
+                <p14:modId xmlns:p14="http://schemas.microsoft.com/office/powerpoint/2010/main" val="2491421513"/>
+              </p:ext>
+            </p:extLst>
+          </p:nvPr>
+        </p:nvGraphicFramePr>
+        <p:xfrm>
+          <a:off x="992777" y="2721746"/>
+          <a:ext cx="9709877" cy="2524125"/>
+        </p:xfrm>
+        <a:graphic>
+          <a:graphicData uri="http://schemas.openxmlformats.org/drawingml/2006/table">
+            <a:tbl>
+              <a:tblPr>
+                <a:tableStyleId>{00A15C55-8517-42AA-B614-E9B94910E393}</a:tableStyleId>
+              </a:tblPr>
+              <a:tblGrid>
+                <a:gridCol w="1140823">
+                  <a:extLst>
+                    <a:ext uri="{9D8B030D-6E8A-4147-A177-3AD203B41FA5}">
+                      <a16:colId xmlns:a16="http://schemas.microsoft.com/office/drawing/2014/main" val="538816457"/>
+                    </a:ext>
+                  </a:extLst>
+                </a:gridCol>
+                <a:gridCol w="772627">
+                  <a:extLst>
+                    <a:ext uri="{9D8B030D-6E8A-4147-A177-3AD203B41FA5}">
+                      <a16:colId xmlns:a16="http://schemas.microsoft.com/office/drawing/2014/main" val="2741041100"/>
+                    </a:ext>
+                  </a:extLst>
+                </a:gridCol>
+                <a:gridCol w="951557">
+                  <a:extLst>
+                    <a:ext uri="{9D8B030D-6E8A-4147-A177-3AD203B41FA5}">
+                      <a16:colId xmlns:a16="http://schemas.microsoft.com/office/drawing/2014/main" val="416037968"/>
+                    </a:ext>
+                  </a:extLst>
+                </a:gridCol>
+                <a:gridCol w="837370">
+                  <a:extLst>
+                    <a:ext uri="{9D8B030D-6E8A-4147-A177-3AD203B41FA5}">
+                      <a16:colId xmlns:a16="http://schemas.microsoft.com/office/drawing/2014/main" val="1442924179"/>
+                    </a:ext>
+                  </a:extLst>
+                </a:gridCol>
+                <a:gridCol w="964245">
+                  <a:extLst>
+                    <a:ext uri="{9D8B030D-6E8A-4147-A177-3AD203B41FA5}">
+                      <a16:colId xmlns:a16="http://schemas.microsoft.com/office/drawing/2014/main" val="2677420474"/>
+                    </a:ext>
+                  </a:extLst>
+                </a:gridCol>
+                <a:gridCol w="865917">
+                  <a:extLst>
+                    <a:ext uri="{9D8B030D-6E8A-4147-A177-3AD203B41FA5}">
+                      <a16:colId xmlns:a16="http://schemas.microsoft.com/office/drawing/2014/main" val="1268523235"/>
+                    </a:ext>
+                  </a:extLst>
+                </a:gridCol>
+                <a:gridCol w="751730">
+                  <a:extLst>
+                    <a:ext uri="{9D8B030D-6E8A-4147-A177-3AD203B41FA5}">
+                      <a16:colId xmlns:a16="http://schemas.microsoft.com/office/drawing/2014/main" val="427030173"/>
+                    </a:ext>
+                  </a:extLst>
+                </a:gridCol>
+                <a:gridCol w="811996">
+                  <a:extLst>
+                    <a:ext uri="{9D8B030D-6E8A-4147-A177-3AD203B41FA5}">
+                      <a16:colId xmlns:a16="http://schemas.microsoft.com/office/drawing/2014/main" val="354625330"/>
+                    </a:ext>
+                  </a:extLst>
+                </a:gridCol>
+                <a:gridCol w="786621">
+                  <a:extLst>
+                    <a:ext uri="{9D8B030D-6E8A-4147-A177-3AD203B41FA5}">
+                      <a16:colId xmlns:a16="http://schemas.microsoft.com/office/drawing/2014/main" val="3803417188"/>
+                    </a:ext>
+                  </a:extLst>
+                </a:gridCol>
+                <a:gridCol w="608997">
+                  <a:extLst>
+                    <a:ext uri="{9D8B030D-6E8A-4147-A177-3AD203B41FA5}">
+                      <a16:colId xmlns:a16="http://schemas.microsoft.com/office/drawing/2014/main" val="4065287843"/>
+                    </a:ext>
+                  </a:extLst>
+                </a:gridCol>
+                <a:gridCol w="608997">
+                  <a:extLst>
+                    <a:ext uri="{9D8B030D-6E8A-4147-A177-3AD203B41FA5}">
+                      <a16:colId xmlns:a16="http://schemas.microsoft.com/office/drawing/2014/main" val="3453666275"/>
+                    </a:ext>
+                  </a:extLst>
+                </a:gridCol>
+                <a:gridCol w="608997">
+                  <a:extLst>
+                    <a:ext uri="{9D8B030D-6E8A-4147-A177-3AD203B41FA5}">
+                      <a16:colId xmlns:a16="http://schemas.microsoft.com/office/drawing/2014/main" val="630049333"/>
+                    </a:ext>
+                  </a:extLst>
+                </a:gridCol>
+              </a:tblGrid>
+              <a:tr h="245886">
+                <a:tc>
+                  <a:txBody>
+                    <a:bodyPr/>
+                    <a:lstStyle/>
+                    <a:p>
+                      <a:pPr algn="l" fontAlgn="b"/>
+                      <a:r>
+                        <a:rPr lang="zh-TW" altLang="en-US" sz="1600" u="none" strike="noStrike" dirty="0">
+                          <a:effectLst/>
+                          <a:latin typeface="標楷體" panose="03000509000000000000" pitchFamily="65" charset="-120"/>
+                          <a:ea typeface="標楷體" panose="03000509000000000000" pitchFamily="65" charset="-120"/>
+                        </a:rPr>
+                        <a:t>頻率</a:t>
+                      </a:r>
+                      <a:r>
+                        <a:rPr lang="en-US" altLang="zh-TW" sz="1600" u="none" strike="noStrike" dirty="0">
+                          <a:effectLst/>
+                          <a:latin typeface="標楷體" panose="03000509000000000000" pitchFamily="65" charset="-120"/>
+                          <a:ea typeface="標楷體" panose="03000509000000000000" pitchFamily="65" charset="-120"/>
+                        </a:rPr>
+                        <a:t>(</a:t>
+                      </a:r>
+                      <a:r>
+                        <a:rPr lang="en-US" sz="1600" u="none" strike="noStrike" dirty="0" err="1">
+                          <a:effectLst/>
+                          <a:latin typeface="標楷體" panose="03000509000000000000" pitchFamily="65" charset="-120"/>
+                          <a:ea typeface="標楷體" panose="03000509000000000000" pitchFamily="65" charset="-120"/>
+                        </a:rPr>
+                        <a:t>hz</a:t>
+                      </a:r>
+                      <a:r>
+                        <a:rPr lang="en-US" sz="1600" u="none" strike="noStrike" dirty="0">
+                          <a:effectLst/>
+                          <a:latin typeface="標楷體" panose="03000509000000000000" pitchFamily="65" charset="-120"/>
+                          <a:ea typeface="標楷體" panose="03000509000000000000" pitchFamily="65" charset="-120"/>
+                        </a:rPr>
+                        <a:t>)</a:t>
+                      </a:r>
+                      <a:endParaRPr lang="en-US" sz="1600" b="1" i="0" u="none" strike="noStrike" dirty="0">
+                        <a:solidFill>
+                          <a:srgbClr val="FFFFFF"/>
+                        </a:solidFill>
+                        <a:effectLst/>
+                        <a:latin typeface="標楷體" panose="03000509000000000000" pitchFamily="65" charset="-120"/>
+                        <a:ea typeface="標楷體" panose="03000509000000000000" pitchFamily="65" charset="-120"/>
+                      </a:endParaRPr>
+                    </a:p>
+                  </a:txBody>
+                  <a:tcPr marL="9525" marR="9525" marT="9525" marB="0" anchor="b">
+                    <a:solidFill>
+                      <a:schemeClr val="accent4"/>
+                    </a:solidFill>
+                  </a:tcPr>
+                </a:tc>
+                <a:tc>
+                  <a:txBody>
+                    <a:bodyPr/>
+                    <a:lstStyle/>
+                    <a:p>
+                      <a:pPr algn="l" fontAlgn="b"/>
+                      <a:r>
+                        <a:rPr lang="en-US" altLang="zh-TW" sz="1400" u="none" strike="noStrike" dirty="0">
+                          <a:effectLst/>
+                          <a:latin typeface="標楷體" panose="03000509000000000000" pitchFamily="65" charset="-120"/>
+                          <a:ea typeface="標楷體" panose="03000509000000000000" pitchFamily="65" charset="-120"/>
+                        </a:rPr>
+                        <a:t>0.1</a:t>
+                      </a:r>
+                      <a:endParaRPr lang="en-US" altLang="zh-TW" sz="1400" b="1" i="0" u="none" strike="noStrike" dirty="0">
+                        <a:solidFill>
+                          <a:srgbClr val="FFFFFF"/>
+                        </a:solidFill>
+                        <a:effectLst/>
+                        <a:latin typeface="標楷體" panose="03000509000000000000" pitchFamily="65" charset="-120"/>
+                        <a:ea typeface="標楷體" panose="03000509000000000000" pitchFamily="65" charset="-120"/>
+                      </a:endParaRPr>
+                    </a:p>
+                  </a:txBody>
+                  <a:tcPr marL="9525" marR="9525" marT="9525" marB="0" anchor="b">
+                    <a:solidFill>
+                      <a:schemeClr val="accent4"/>
+                    </a:solidFill>
+                  </a:tcPr>
+                </a:tc>
+                <a:tc>
+                  <a:txBody>
+                    <a:bodyPr/>
+                    <a:lstStyle/>
+                    <a:p>
+                      <a:pPr algn="l" fontAlgn="b"/>
+                      <a:r>
+                        <a:rPr lang="en-US" altLang="zh-TW" sz="1400" u="none" strike="noStrike" dirty="0">
+                          <a:effectLst/>
+                          <a:latin typeface="標楷體" panose="03000509000000000000" pitchFamily="65" charset="-120"/>
+                          <a:ea typeface="標楷體" panose="03000509000000000000" pitchFamily="65" charset="-120"/>
+                        </a:rPr>
+                        <a:t>0.2</a:t>
+                      </a:r>
+                      <a:endParaRPr lang="en-US" altLang="zh-TW" sz="1400" b="1" i="0" u="none" strike="noStrike" dirty="0">
+                        <a:solidFill>
+                          <a:srgbClr val="FFFFFF"/>
+                        </a:solidFill>
+                        <a:effectLst/>
+                        <a:latin typeface="標楷體" panose="03000509000000000000" pitchFamily="65" charset="-120"/>
+                        <a:ea typeface="標楷體" panose="03000509000000000000" pitchFamily="65" charset="-120"/>
+                      </a:endParaRPr>
+                    </a:p>
+                  </a:txBody>
+                  <a:tcPr marL="9525" marR="9525" marT="9525" marB="0" anchor="b">
+                    <a:solidFill>
+                      <a:schemeClr val="accent4"/>
+                    </a:solidFill>
+                  </a:tcPr>
+                </a:tc>
+                <a:tc>
+                  <a:txBody>
+                    <a:bodyPr/>
+                    <a:lstStyle/>
+                    <a:p>
+                      <a:pPr algn="l" fontAlgn="b"/>
+                      <a:r>
+                        <a:rPr lang="en-US" altLang="zh-TW" sz="1400" u="none" strike="noStrike" dirty="0">
+                          <a:effectLst/>
+                          <a:latin typeface="標楷體" panose="03000509000000000000" pitchFamily="65" charset="-120"/>
+                          <a:ea typeface="標楷體" panose="03000509000000000000" pitchFamily="65" charset="-120"/>
+                        </a:rPr>
+                        <a:t>0.4</a:t>
+                      </a:r>
+                      <a:endParaRPr lang="en-US" altLang="zh-TW" sz="1400" b="1" i="0" u="none" strike="noStrike" dirty="0">
+                        <a:solidFill>
+                          <a:srgbClr val="FFFFFF"/>
+                        </a:solidFill>
+                        <a:effectLst/>
+                        <a:latin typeface="標楷體" panose="03000509000000000000" pitchFamily="65" charset="-120"/>
+                        <a:ea typeface="標楷體" panose="03000509000000000000" pitchFamily="65" charset="-120"/>
+                      </a:endParaRPr>
+                    </a:p>
+                  </a:txBody>
+                  <a:tcPr marL="9525" marR="9525" marT="9525" marB="0" anchor="b">
+                    <a:solidFill>
+                      <a:schemeClr val="accent4"/>
+                    </a:solidFill>
+                  </a:tcPr>
+                </a:tc>
+                <a:tc>
+                  <a:txBody>
+                    <a:bodyPr/>
+                    <a:lstStyle/>
+                    <a:p>
+                      <a:pPr algn="l" fontAlgn="b"/>
+                      <a:r>
+                        <a:rPr lang="en-US" altLang="zh-TW" sz="1400" u="none" strike="noStrike" dirty="0">
+                          <a:effectLst/>
+                          <a:latin typeface="標楷體" panose="03000509000000000000" pitchFamily="65" charset="-120"/>
+                          <a:ea typeface="標楷體" panose="03000509000000000000" pitchFamily="65" charset="-120"/>
+                        </a:rPr>
+                        <a:t>0.6</a:t>
+                      </a:r>
+                      <a:endParaRPr lang="en-US" altLang="zh-TW" sz="1400" b="1" i="0" u="none" strike="noStrike" dirty="0">
+                        <a:solidFill>
+                          <a:srgbClr val="FFFFFF"/>
+                        </a:solidFill>
+                        <a:effectLst/>
+                        <a:latin typeface="標楷體" panose="03000509000000000000" pitchFamily="65" charset="-120"/>
+                        <a:ea typeface="標楷體" panose="03000509000000000000" pitchFamily="65" charset="-120"/>
+                      </a:endParaRPr>
+                    </a:p>
+                  </a:txBody>
+                  <a:tcPr marL="9525" marR="9525" marT="9525" marB="0" anchor="b">
+                    <a:solidFill>
+                      <a:schemeClr val="accent4"/>
+                    </a:solidFill>
+                  </a:tcPr>
+                </a:tc>
+                <a:tc>
+                  <a:txBody>
+                    <a:bodyPr/>
+                    <a:lstStyle/>
+                    <a:p>
+                      <a:pPr algn="l" fontAlgn="b"/>
+                      <a:r>
+                        <a:rPr lang="en-US" altLang="zh-TW" sz="1400" u="none" strike="noStrike" dirty="0">
+                          <a:effectLst/>
+                          <a:latin typeface="標楷體" panose="03000509000000000000" pitchFamily="65" charset="-120"/>
+                          <a:ea typeface="標楷體" panose="03000509000000000000" pitchFamily="65" charset="-120"/>
+                        </a:rPr>
+                        <a:t>0.8</a:t>
+                      </a:r>
+                      <a:endParaRPr lang="en-US" altLang="zh-TW" sz="1400" b="1" i="0" u="none" strike="noStrike" dirty="0">
+                        <a:solidFill>
+                          <a:srgbClr val="FFFFFF"/>
+                        </a:solidFill>
+                        <a:effectLst/>
+                        <a:latin typeface="標楷體" panose="03000509000000000000" pitchFamily="65" charset="-120"/>
+                        <a:ea typeface="標楷體" panose="03000509000000000000" pitchFamily="65" charset="-120"/>
+                      </a:endParaRPr>
+                    </a:p>
+                  </a:txBody>
+                  <a:tcPr marL="9525" marR="9525" marT="9525" marB="0" anchor="b">
+                    <a:solidFill>
+                      <a:schemeClr val="accent4"/>
+                    </a:solidFill>
+                  </a:tcPr>
+                </a:tc>
+                <a:tc>
+                  <a:txBody>
+                    <a:bodyPr/>
+                    <a:lstStyle/>
+                    <a:p>
+                      <a:pPr algn="l" fontAlgn="b"/>
+                      <a:r>
+                        <a:rPr lang="en-US" altLang="zh-TW" sz="1400" u="none" strike="noStrike" dirty="0">
+                          <a:effectLst/>
+                          <a:latin typeface="標楷體" panose="03000509000000000000" pitchFamily="65" charset="-120"/>
+                          <a:ea typeface="標楷體" panose="03000509000000000000" pitchFamily="65" charset="-120"/>
+                        </a:rPr>
+                        <a:t>1</a:t>
+                      </a:r>
+                      <a:endParaRPr lang="en-US" altLang="zh-TW" sz="1400" b="1" i="0" u="none" strike="noStrike" dirty="0">
+                        <a:solidFill>
+                          <a:srgbClr val="FFFFFF"/>
+                        </a:solidFill>
+                        <a:effectLst/>
+                        <a:latin typeface="標楷體" panose="03000509000000000000" pitchFamily="65" charset="-120"/>
+                        <a:ea typeface="標楷體" panose="03000509000000000000" pitchFamily="65" charset="-120"/>
+                      </a:endParaRPr>
+                    </a:p>
+                  </a:txBody>
+                  <a:tcPr marL="9525" marR="9525" marT="9525" marB="0" anchor="b">
+                    <a:solidFill>
+                      <a:schemeClr val="accent4"/>
+                    </a:solidFill>
+                  </a:tcPr>
+                </a:tc>
+                <a:tc>
+                  <a:txBody>
+                    <a:bodyPr/>
+                    <a:lstStyle/>
+                    <a:p>
+                      <a:pPr algn="l" fontAlgn="b"/>
+                      <a:r>
+                        <a:rPr lang="en-US" altLang="zh-TW" sz="1400" u="none" strike="noStrike">
+                          <a:effectLst/>
+                          <a:latin typeface="標楷體" panose="03000509000000000000" pitchFamily="65" charset="-120"/>
+                          <a:ea typeface="標楷體" panose="03000509000000000000" pitchFamily="65" charset="-120"/>
+                        </a:rPr>
+                        <a:t>2</a:t>
+                      </a:r>
+                      <a:endParaRPr lang="en-US" altLang="zh-TW" sz="1400" b="1" i="0" u="none" strike="noStrike">
+                        <a:solidFill>
+                          <a:srgbClr val="FFFFFF"/>
+                        </a:solidFill>
+                        <a:effectLst/>
+                        <a:latin typeface="標楷體" panose="03000509000000000000" pitchFamily="65" charset="-120"/>
+                        <a:ea typeface="標楷體" panose="03000509000000000000" pitchFamily="65" charset="-120"/>
+                      </a:endParaRPr>
+                    </a:p>
+                  </a:txBody>
+                  <a:tcPr marL="9525" marR="9525" marT="9525" marB="0" anchor="b">
+                    <a:solidFill>
+                      <a:schemeClr val="accent4"/>
+                    </a:solidFill>
+                  </a:tcPr>
+                </a:tc>
+                <a:tc>
+                  <a:txBody>
+                    <a:bodyPr/>
+                    <a:lstStyle/>
+                    <a:p>
+                      <a:pPr algn="l" fontAlgn="b"/>
+                      <a:r>
+                        <a:rPr lang="en-US" altLang="zh-TW" sz="1400" u="none" strike="noStrike">
+                          <a:effectLst/>
+                          <a:latin typeface="標楷體" panose="03000509000000000000" pitchFamily="65" charset="-120"/>
+                          <a:ea typeface="標楷體" panose="03000509000000000000" pitchFamily="65" charset="-120"/>
+                        </a:rPr>
+                        <a:t>4</a:t>
+                      </a:r>
+                      <a:endParaRPr lang="en-US" altLang="zh-TW" sz="1400" b="1" i="0" u="none" strike="noStrike">
+                        <a:solidFill>
+                          <a:srgbClr val="FFFFFF"/>
+                        </a:solidFill>
+                        <a:effectLst/>
+                        <a:latin typeface="標楷體" panose="03000509000000000000" pitchFamily="65" charset="-120"/>
+                        <a:ea typeface="標楷體" panose="03000509000000000000" pitchFamily="65" charset="-120"/>
+                      </a:endParaRPr>
+                    </a:p>
+                  </a:txBody>
+                  <a:tcPr marL="9525" marR="9525" marT="9525" marB="0" anchor="b">
+                    <a:solidFill>
+                      <a:schemeClr val="accent4"/>
+                    </a:solidFill>
+                  </a:tcPr>
+                </a:tc>
+                <a:tc>
+                  <a:txBody>
+                    <a:bodyPr/>
+                    <a:lstStyle/>
+                    <a:p>
+                      <a:pPr algn="l" fontAlgn="b"/>
+                      <a:r>
+                        <a:rPr lang="en-US" altLang="zh-TW" sz="1400" u="none" strike="noStrike">
+                          <a:effectLst/>
+                          <a:latin typeface="標楷體" panose="03000509000000000000" pitchFamily="65" charset="-120"/>
+                          <a:ea typeface="標楷體" panose="03000509000000000000" pitchFamily="65" charset="-120"/>
+                        </a:rPr>
+                        <a:t>6</a:t>
+                      </a:r>
+                      <a:endParaRPr lang="en-US" altLang="zh-TW" sz="1400" b="1" i="0" u="none" strike="noStrike">
+                        <a:solidFill>
+                          <a:srgbClr val="FFFFFF"/>
+                        </a:solidFill>
+                        <a:effectLst/>
+                        <a:latin typeface="標楷體" panose="03000509000000000000" pitchFamily="65" charset="-120"/>
+                        <a:ea typeface="標楷體" panose="03000509000000000000" pitchFamily="65" charset="-120"/>
+                      </a:endParaRPr>
+                    </a:p>
+                  </a:txBody>
+                  <a:tcPr marL="9525" marR="9525" marT="9525" marB="0" anchor="b">
+                    <a:solidFill>
+                      <a:schemeClr val="accent4"/>
+                    </a:solidFill>
+                  </a:tcPr>
+                </a:tc>
+                <a:tc>
+                  <a:txBody>
+                    <a:bodyPr/>
+                    <a:lstStyle/>
+                    <a:p>
+                      <a:pPr algn="l" fontAlgn="b"/>
+                      <a:r>
+                        <a:rPr lang="en-US" altLang="zh-TW" sz="1400" u="none" strike="noStrike">
+                          <a:effectLst/>
+                          <a:latin typeface="標楷體" panose="03000509000000000000" pitchFamily="65" charset="-120"/>
+                          <a:ea typeface="標楷體" panose="03000509000000000000" pitchFamily="65" charset="-120"/>
+                        </a:rPr>
+                        <a:t>8</a:t>
+                      </a:r>
+                      <a:endParaRPr lang="en-US" altLang="zh-TW" sz="1400" b="1" i="0" u="none" strike="noStrike">
+                        <a:solidFill>
+                          <a:srgbClr val="FFFFFF"/>
+                        </a:solidFill>
+                        <a:effectLst/>
+                        <a:latin typeface="標楷體" panose="03000509000000000000" pitchFamily="65" charset="-120"/>
+                        <a:ea typeface="標楷體" panose="03000509000000000000" pitchFamily="65" charset="-120"/>
+                      </a:endParaRPr>
+                    </a:p>
+                  </a:txBody>
+                  <a:tcPr marL="9525" marR="9525" marT="9525" marB="0" anchor="b">
+                    <a:solidFill>
+                      <a:schemeClr val="accent4"/>
+                    </a:solidFill>
+                  </a:tcPr>
+                </a:tc>
+                <a:tc>
+                  <a:txBody>
+                    <a:bodyPr/>
+                    <a:lstStyle/>
+                    <a:p>
+                      <a:pPr algn="l" fontAlgn="b"/>
+                      <a:r>
+                        <a:rPr lang="en-US" altLang="zh-TW" sz="1400" u="none" strike="noStrike" dirty="0">
+                          <a:effectLst/>
+                          <a:latin typeface="標楷體" panose="03000509000000000000" pitchFamily="65" charset="-120"/>
+                          <a:ea typeface="標楷體" panose="03000509000000000000" pitchFamily="65" charset="-120"/>
+                        </a:rPr>
+                        <a:t>10</a:t>
+                      </a:r>
+                      <a:endParaRPr lang="en-US" altLang="zh-TW" sz="1400" b="1" i="0" u="none" strike="noStrike" dirty="0">
+                        <a:solidFill>
+                          <a:srgbClr val="FFFFFF"/>
+                        </a:solidFill>
+                        <a:effectLst/>
+                        <a:latin typeface="標楷體" panose="03000509000000000000" pitchFamily="65" charset="-120"/>
+                        <a:ea typeface="標楷體" panose="03000509000000000000" pitchFamily="65" charset="-120"/>
+                      </a:endParaRPr>
+                    </a:p>
+                  </a:txBody>
+                  <a:tcPr marL="9525" marR="9525" marT="9525" marB="0" anchor="b">
+                    <a:solidFill>
+                      <a:schemeClr val="accent4"/>
+                    </a:solidFill>
+                  </a:tcPr>
+                </a:tc>
+                <a:extLst>
+                  <a:ext uri="{0D108BD9-81ED-4DB2-BD59-A6C34878D82A}">
+                    <a16:rowId xmlns:a16="http://schemas.microsoft.com/office/drawing/2014/main" val="1331175453"/>
+                  </a:ext>
+                </a:extLst>
+              </a:tr>
+              <a:tr h="213455">
+                <a:tc>
+                  <a:txBody>
+                    <a:bodyPr/>
+                    <a:lstStyle/>
+                    <a:p>
+                      <a:pPr algn="l" fontAlgn="b"/>
+                      <a:r>
+                        <a:rPr lang="el-GR" sz="1600" u="none" strike="noStrike" dirty="0">
+                          <a:effectLst/>
+                          <a:ea typeface="標楷體" panose="03000509000000000000" pitchFamily="65" charset="-120"/>
+                        </a:rPr>
+                        <a:t>ω = 2π</a:t>
+                      </a:r>
+                      <a:r>
+                        <a:rPr lang="en-US" sz="1600" u="none" strike="noStrike" dirty="0">
+                          <a:effectLst/>
+                          <a:latin typeface="標楷體" panose="03000509000000000000" pitchFamily="65" charset="-120"/>
+                          <a:ea typeface="標楷體" panose="03000509000000000000" pitchFamily="65" charset="-120"/>
+                        </a:rPr>
+                        <a:t>f[rad/s]</a:t>
+                      </a:r>
+                      <a:endParaRPr lang="en-US" sz="1600" b="0" i="0" u="none" strike="noStrike" dirty="0">
+                        <a:solidFill>
+                          <a:srgbClr val="000000"/>
+                        </a:solidFill>
+                        <a:effectLst/>
+                        <a:latin typeface="標楷體" panose="03000509000000000000" pitchFamily="65" charset="-120"/>
+                        <a:ea typeface="標楷體" panose="03000509000000000000" pitchFamily="65" charset="-120"/>
+                      </a:endParaRPr>
+                    </a:p>
+                  </a:txBody>
+                  <a:tcPr marL="9525" marR="9525" marT="9525" marB="0" anchor="b"/>
+                </a:tc>
+                <a:tc>
+                  <a:txBody>
+                    <a:bodyPr/>
+                    <a:lstStyle/>
+                    <a:p>
+                      <a:pPr algn="r" fontAlgn="b"/>
+                      <a:r>
+                        <a:rPr lang="en-US" altLang="zh-TW" sz="1400" u="none" strike="noStrike" dirty="0">
+                          <a:effectLst/>
+                          <a:latin typeface="標楷體" panose="03000509000000000000" pitchFamily="65" charset="-120"/>
+                          <a:ea typeface="標楷體" panose="03000509000000000000" pitchFamily="65" charset="-120"/>
+                        </a:rPr>
+                        <a:t>0.63</a:t>
+                      </a:r>
+                      <a:endParaRPr lang="en-US" altLang="zh-TW" sz="1400" b="0" i="0" u="none" strike="noStrike" dirty="0">
+                        <a:solidFill>
+                          <a:srgbClr val="000000"/>
+                        </a:solidFill>
+                        <a:effectLst/>
+                        <a:latin typeface="標楷體" panose="03000509000000000000" pitchFamily="65" charset="-120"/>
+                        <a:ea typeface="標楷體" panose="03000509000000000000" pitchFamily="65" charset="-120"/>
+                      </a:endParaRPr>
+                    </a:p>
+                  </a:txBody>
+                  <a:tcPr marL="9525" marR="9525" marT="9525" marB="0" anchor="b"/>
+                </a:tc>
+                <a:tc>
+                  <a:txBody>
+                    <a:bodyPr/>
+                    <a:lstStyle/>
+                    <a:p>
+                      <a:pPr algn="r" fontAlgn="b"/>
+                      <a:r>
+                        <a:rPr lang="en-US" altLang="zh-TW" sz="1400" u="none" strike="noStrike" dirty="0">
+                          <a:effectLst/>
+                          <a:latin typeface="標楷體" panose="03000509000000000000" pitchFamily="65" charset="-120"/>
+                          <a:ea typeface="標楷體" panose="03000509000000000000" pitchFamily="65" charset="-120"/>
+                        </a:rPr>
+                        <a:t>1.26</a:t>
+                      </a:r>
+                      <a:endParaRPr lang="en-US" altLang="zh-TW" sz="1400" b="0" i="0" u="none" strike="noStrike" dirty="0">
+                        <a:solidFill>
+                          <a:srgbClr val="000000"/>
+                        </a:solidFill>
+                        <a:effectLst/>
+                        <a:latin typeface="標楷體" panose="03000509000000000000" pitchFamily="65" charset="-120"/>
+                        <a:ea typeface="標楷體" panose="03000509000000000000" pitchFamily="65" charset="-120"/>
+                      </a:endParaRPr>
+                    </a:p>
+                  </a:txBody>
+                  <a:tcPr marL="9525" marR="9525" marT="9525" marB="0" anchor="b"/>
+                </a:tc>
+                <a:tc>
+                  <a:txBody>
+                    <a:bodyPr/>
+                    <a:lstStyle/>
+                    <a:p>
+                      <a:pPr algn="r" fontAlgn="b"/>
+                      <a:r>
+                        <a:rPr lang="en-US" altLang="zh-TW" sz="1400" u="none" strike="noStrike">
+                          <a:effectLst/>
+                          <a:latin typeface="標楷體" panose="03000509000000000000" pitchFamily="65" charset="-120"/>
+                          <a:ea typeface="標楷體" panose="03000509000000000000" pitchFamily="65" charset="-120"/>
+                        </a:rPr>
+                        <a:t>2.51</a:t>
+                      </a:r>
+                      <a:endParaRPr lang="en-US" altLang="zh-TW" sz="1400" b="0" i="0" u="none" strike="noStrike">
+                        <a:solidFill>
+                          <a:srgbClr val="000000"/>
+                        </a:solidFill>
+                        <a:effectLst/>
+                        <a:latin typeface="標楷體" panose="03000509000000000000" pitchFamily="65" charset="-120"/>
+                        <a:ea typeface="標楷體" panose="03000509000000000000" pitchFamily="65" charset="-120"/>
+                      </a:endParaRPr>
+                    </a:p>
+                  </a:txBody>
+                  <a:tcPr marL="9525" marR="9525" marT="9525" marB="0" anchor="b"/>
+                </a:tc>
+                <a:tc>
+                  <a:txBody>
+                    <a:bodyPr/>
+                    <a:lstStyle/>
+                    <a:p>
+                      <a:pPr algn="r" fontAlgn="b"/>
+                      <a:r>
+                        <a:rPr lang="en-US" altLang="zh-TW" sz="1400" u="none" strike="noStrike" dirty="0">
+                          <a:effectLst/>
+                          <a:latin typeface="標楷體" panose="03000509000000000000" pitchFamily="65" charset="-120"/>
+                          <a:ea typeface="標楷體" panose="03000509000000000000" pitchFamily="65" charset="-120"/>
+                        </a:rPr>
+                        <a:t>3.77</a:t>
+                      </a:r>
+                      <a:endParaRPr lang="en-US" altLang="zh-TW" sz="1400" b="0" i="0" u="none" strike="noStrike" dirty="0">
+                        <a:solidFill>
+                          <a:srgbClr val="000000"/>
+                        </a:solidFill>
+                        <a:effectLst/>
+                        <a:latin typeface="標楷體" panose="03000509000000000000" pitchFamily="65" charset="-120"/>
+                        <a:ea typeface="標楷體" panose="03000509000000000000" pitchFamily="65" charset="-120"/>
+                      </a:endParaRPr>
+                    </a:p>
+                  </a:txBody>
+                  <a:tcPr marL="9525" marR="9525" marT="9525" marB="0" anchor="b"/>
+                </a:tc>
+                <a:tc>
+                  <a:txBody>
+                    <a:bodyPr/>
+                    <a:lstStyle/>
+                    <a:p>
+                      <a:pPr algn="r" fontAlgn="b"/>
+                      <a:r>
+                        <a:rPr lang="en-US" altLang="zh-TW" sz="1400" u="none" strike="noStrike">
+                          <a:effectLst/>
+                          <a:latin typeface="標楷體" panose="03000509000000000000" pitchFamily="65" charset="-120"/>
+                          <a:ea typeface="標楷體" panose="03000509000000000000" pitchFamily="65" charset="-120"/>
+                        </a:rPr>
+                        <a:t>5.03</a:t>
+                      </a:r>
+                      <a:endParaRPr lang="en-US" altLang="zh-TW" sz="1400" b="0" i="0" u="none" strike="noStrike">
+                        <a:solidFill>
+                          <a:srgbClr val="000000"/>
+                        </a:solidFill>
+                        <a:effectLst/>
+                        <a:latin typeface="標楷體" panose="03000509000000000000" pitchFamily="65" charset="-120"/>
+                        <a:ea typeface="標楷體" panose="03000509000000000000" pitchFamily="65" charset="-120"/>
+                      </a:endParaRPr>
+                    </a:p>
+                  </a:txBody>
+                  <a:tcPr marL="9525" marR="9525" marT="9525" marB="0" anchor="b"/>
+                </a:tc>
+                <a:tc>
+                  <a:txBody>
+                    <a:bodyPr/>
+                    <a:lstStyle/>
+                    <a:p>
+                      <a:pPr algn="r" fontAlgn="b"/>
+                      <a:r>
+                        <a:rPr lang="en-US" altLang="zh-TW" sz="1400" u="none" strike="noStrike">
+                          <a:effectLst/>
+                          <a:latin typeface="標楷體" panose="03000509000000000000" pitchFamily="65" charset="-120"/>
+                          <a:ea typeface="標楷體" panose="03000509000000000000" pitchFamily="65" charset="-120"/>
+                        </a:rPr>
+                        <a:t>6.28</a:t>
+                      </a:r>
+                      <a:endParaRPr lang="en-US" altLang="zh-TW" sz="1400" b="0" i="0" u="none" strike="noStrike">
+                        <a:solidFill>
+                          <a:srgbClr val="000000"/>
+                        </a:solidFill>
+                        <a:effectLst/>
+                        <a:latin typeface="標楷體" panose="03000509000000000000" pitchFamily="65" charset="-120"/>
+                        <a:ea typeface="標楷體" panose="03000509000000000000" pitchFamily="65" charset="-120"/>
+                      </a:endParaRPr>
+                    </a:p>
+                  </a:txBody>
+                  <a:tcPr marL="9525" marR="9525" marT="9525" marB="0" anchor="b"/>
+                </a:tc>
+                <a:tc>
+                  <a:txBody>
+                    <a:bodyPr/>
+                    <a:lstStyle/>
+                    <a:p>
+                      <a:pPr algn="r" fontAlgn="b"/>
+                      <a:r>
+                        <a:rPr lang="en-US" altLang="zh-TW" sz="1400" u="none" strike="noStrike" dirty="0">
+                          <a:effectLst/>
+                          <a:latin typeface="標楷體" panose="03000509000000000000" pitchFamily="65" charset="-120"/>
+                          <a:ea typeface="標楷體" panose="03000509000000000000" pitchFamily="65" charset="-120"/>
+                        </a:rPr>
+                        <a:t>12.57</a:t>
+                      </a:r>
+                      <a:endParaRPr lang="en-US" altLang="zh-TW" sz="1400" b="0" i="0" u="none" strike="noStrike" dirty="0">
+                        <a:solidFill>
+                          <a:srgbClr val="000000"/>
+                        </a:solidFill>
+                        <a:effectLst/>
+                        <a:latin typeface="標楷體" panose="03000509000000000000" pitchFamily="65" charset="-120"/>
+                        <a:ea typeface="標楷體" panose="03000509000000000000" pitchFamily="65" charset="-120"/>
+                      </a:endParaRPr>
+                    </a:p>
+                  </a:txBody>
+                  <a:tcPr marL="9525" marR="9525" marT="9525" marB="0" anchor="b"/>
+                </a:tc>
+                <a:tc>
+                  <a:txBody>
+                    <a:bodyPr/>
+                    <a:lstStyle/>
+                    <a:p>
+                      <a:pPr algn="r" fontAlgn="b"/>
+                      <a:r>
+                        <a:rPr lang="en-US" altLang="zh-TW" sz="1400" u="none" strike="noStrike" dirty="0">
+                          <a:effectLst/>
+                          <a:latin typeface="標楷體" panose="03000509000000000000" pitchFamily="65" charset="-120"/>
+                          <a:ea typeface="標楷體" panose="03000509000000000000" pitchFamily="65" charset="-120"/>
+                        </a:rPr>
+                        <a:t>25.1</a:t>
+                      </a:r>
+                      <a:endParaRPr lang="en-US" altLang="zh-TW" sz="1400" b="0" i="0" u="none" strike="noStrike" dirty="0">
+                        <a:solidFill>
+                          <a:srgbClr val="000000"/>
+                        </a:solidFill>
+                        <a:effectLst/>
+                        <a:latin typeface="標楷體" panose="03000509000000000000" pitchFamily="65" charset="-120"/>
+                        <a:ea typeface="標楷體" panose="03000509000000000000" pitchFamily="65" charset="-120"/>
+                      </a:endParaRPr>
+                    </a:p>
+                  </a:txBody>
+                  <a:tcPr marL="9525" marR="9525" marT="9525" marB="0" anchor="b"/>
+                </a:tc>
+                <a:tc>
+                  <a:txBody>
+                    <a:bodyPr/>
+                    <a:lstStyle/>
+                    <a:p>
+                      <a:pPr algn="r" fontAlgn="b"/>
+                      <a:r>
+                        <a:rPr lang="en-US" altLang="zh-TW" sz="1400" u="none" strike="noStrike" dirty="0">
+                          <a:effectLst/>
+                          <a:latin typeface="標楷體" panose="03000509000000000000" pitchFamily="65" charset="-120"/>
+                          <a:ea typeface="標楷體" panose="03000509000000000000" pitchFamily="65" charset="-120"/>
+                        </a:rPr>
+                        <a:t>37.7</a:t>
+                      </a:r>
+                      <a:endParaRPr lang="en-US" altLang="zh-TW" sz="1400" b="0" i="0" u="none" strike="noStrike" dirty="0">
+                        <a:solidFill>
+                          <a:srgbClr val="000000"/>
+                        </a:solidFill>
+                        <a:effectLst/>
+                        <a:latin typeface="標楷體" panose="03000509000000000000" pitchFamily="65" charset="-120"/>
+                        <a:ea typeface="標楷體" panose="03000509000000000000" pitchFamily="65" charset="-120"/>
+                      </a:endParaRPr>
+                    </a:p>
+                  </a:txBody>
+                  <a:tcPr marL="9525" marR="9525" marT="9525" marB="0" anchor="b"/>
+                </a:tc>
+                <a:tc>
+                  <a:txBody>
+                    <a:bodyPr/>
+                    <a:lstStyle/>
+                    <a:p>
+                      <a:pPr algn="r" fontAlgn="b"/>
+                      <a:r>
+                        <a:rPr lang="en-US" altLang="zh-TW" sz="1400" u="none" strike="noStrike" dirty="0">
+                          <a:effectLst/>
+                          <a:latin typeface="標楷體" panose="03000509000000000000" pitchFamily="65" charset="-120"/>
+                          <a:ea typeface="標楷體" panose="03000509000000000000" pitchFamily="65" charset="-120"/>
+                        </a:rPr>
+                        <a:t>50.3</a:t>
+                      </a:r>
+                      <a:endParaRPr lang="en-US" altLang="zh-TW" sz="1400" b="0" i="0" u="none" strike="noStrike" dirty="0">
+                        <a:solidFill>
+                          <a:srgbClr val="000000"/>
+                        </a:solidFill>
+                        <a:effectLst/>
+                        <a:latin typeface="標楷體" panose="03000509000000000000" pitchFamily="65" charset="-120"/>
+                        <a:ea typeface="標楷體" panose="03000509000000000000" pitchFamily="65" charset="-120"/>
+                      </a:endParaRPr>
+                    </a:p>
+                  </a:txBody>
+                  <a:tcPr marL="9525" marR="9525" marT="9525" marB="0" anchor="b"/>
+                </a:tc>
+                <a:tc>
+                  <a:txBody>
+                    <a:bodyPr/>
+                    <a:lstStyle/>
+                    <a:p>
+                      <a:pPr algn="r" fontAlgn="b"/>
+                      <a:r>
+                        <a:rPr lang="en-US" altLang="zh-TW" sz="1400" u="none" strike="noStrike">
+                          <a:effectLst/>
+                          <a:latin typeface="標楷體" panose="03000509000000000000" pitchFamily="65" charset="-120"/>
+                          <a:ea typeface="標楷體" panose="03000509000000000000" pitchFamily="65" charset="-120"/>
+                        </a:rPr>
+                        <a:t>62.8</a:t>
+                      </a:r>
+                      <a:endParaRPr lang="en-US" altLang="zh-TW" sz="1400" b="0" i="0" u="none" strike="noStrike">
+                        <a:solidFill>
+                          <a:srgbClr val="000000"/>
+                        </a:solidFill>
+                        <a:effectLst/>
+                        <a:latin typeface="標楷體" panose="03000509000000000000" pitchFamily="65" charset="-120"/>
+                        <a:ea typeface="標楷體" panose="03000509000000000000" pitchFamily="65" charset="-120"/>
+                      </a:endParaRPr>
+                    </a:p>
+                  </a:txBody>
+                  <a:tcPr marL="9525" marR="9525" marT="9525" marB="0" anchor="b"/>
+                </a:tc>
+                <a:extLst>
+                  <a:ext uri="{0D108BD9-81ED-4DB2-BD59-A6C34878D82A}">
+                    <a16:rowId xmlns:a16="http://schemas.microsoft.com/office/drawing/2014/main" val="3696473676"/>
+                  </a:ext>
+                </a:extLst>
+              </a:tr>
+              <a:tr h="245886">
+                <a:tc>
+                  <a:txBody>
+                    <a:bodyPr/>
+                    <a:lstStyle/>
+                    <a:p>
+                      <a:pPr algn="l" fontAlgn="b"/>
+                      <a:r>
+                        <a:rPr lang="en-US" sz="1600" u="none" strike="noStrike">
+                          <a:effectLst/>
+                          <a:latin typeface="標楷體" panose="03000509000000000000" pitchFamily="65" charset="-120"/>
+                          <a:ea typeface="標楷體" panose="03000509000000000000" pitchFamily="65" charset="-120"/>
+                        </a:rPr>
+                        <a:t>A [V]</a:t>
+                      </a:r>
+                      <a:endParaRPr lang="en-US" sz="1600" b="0" i="0" u="none" strike="noStrike">
+                        <a:solidFill>
+                          <a:srgbClr val="000000"/>
+                        </a:solidFill>
+                        <a:effectLst/>
+                        <a:latin typeface="標楷體" panose="03000509000000000000" pitchFamily="65" charset="-120"/>
+                        <a:ea typeface="標楷體" panose="03000509000000000000" pitchFamily="65" charset="-120"/>
+                      </a:endParaRPr>
+                    </a:p>
+                  </a:txBody>
+                  <a:tcPr marL="9525" marR="9525" marT="9525" marB="0" anchor="b"/>
+                </a:tc>
+                <a:tc>
+                  <a:txBody>
+                    <a:bodyPr/>
+                    <a:lstStyle/>
+                    <a:p>
+                      <a:pPr algn="r" fontAlgn="b"/>
+                      <a:r>
+                        <a:rPr lang="en-US" altLang="zh-TW" sz="1400" u="none" strike="noStrike">
+                          <a:effectLst/>
+                          <a:latin typeface="標楷體" panose="03000509000000000000" pitchFamily="65" charset="-120"/>
+                          <a:ea typeface="標楷體" panose="03000509000000000000" pitchFamily="65" charset="-120"/>
+                        </a:rPr>
+                        <a:t>5.15</a:t>
+                      </a:r>
+                      <a:endParaRPr lang="en-US" altLang="zh-TW" sz="1400" b="0" i="0" u="none" strike="noStrike">
+                        <a:solidFill>
+                          <a:srgbClr val="000000"/>
+                        </a:solidFill>
+                        <a:effectLst/>
+                        <a:latin typeface="標楷體" panose="03000509000000000000" pitchFamily="65" charset="-120"/>
+                        <a:ea typeface="標楷體" panose="03000509000000000000" pitchFamily="65" charset="-120"/>
+                      </a:endParaRPr>
+                    </a:p>
+                  </a:txBody>
+                  <a:tcPr marL="9525" marR="9525" marT="9525" marB="0" anchor="b"/>
+                </a:tc>
+                <a:tc>
+                  <a:txBody>
+                    <a:bodyPr/>
+                    <a:lstStyle/>
+                    <a:p>
+                      <a:pPr algn="r" fontAlgn="b"/>
+                      <a:r>
+                        <a:rPr lang="en-US" altLang="zh-TW" sz="1400" u="none" strike="noStrike">
+                          <a:effectLst/>
+                          <a:latin typeface="標楷體" panose="03000509000000000000" pitchFamily="65" charset="-120"/>
+                          <a:ea typeface="標楷體" panose="03000509000000000000" pitchFamily="65" charset="-120"/>
+                        </a:rPr>
+                        <a:t>5.15</a:t>
+                      </a:r>
+                      <a:endParaRPr lang="en-US" altLang="zh-TW" sz="1400" b="0" i="0" u="none" strike="noStrike">
+                        <a:solidFill>
+                          <a:srgbClr val="000000"/>
+                        </a:solidFill>
+                        <a:effectLst/>
+                        <a:latin typeface="標楷體" panose="03000509000000000000" pitchFamily="65" charset="-120"/>
+                        <a:ea typeface="標楷體" panose="03000509000000000000" pitchFamily="65" charset="-120"/>
+                      </a:endParaRPr>
+                    </a:p>
+                  </a:txBody>
+                  <a:tcPr marL="9525" marR="9525" marT="9525" marB="0" anchor="b"/>
+                </a:tc>
+                <a:tc>
+                  <a:txBody>
+                    <a:bodyPr/>
+                    <a:lstStyle/>
+                    <a:p>
+                      <a:pPr algn="r" fontAlgn="b"/>
+                      <a:r>
+                        <a:rPr lang="en-US" altLang="zh-TW" sz="1400" u="none" strike="noStrike">
+                          <a:effectLst/>
+                          <a:latin typeface="標楷體" panose="03000509000000000000" pitchFamily="65" charset="-120"/>
+                          <a:ea typeface="標楷體" panose="03000509000000000000" pitchFamily="65" charset="-120"/>
+                        </a:rPr>
+                        <a:t>5</a:t>
+                      </a:r>
+                      <a:endParaRPr lang="en-US" altLang="zh-TW" sz="1400" b="0" i="0" u="none" strike="noStrike">
+                        <a:solidFill>
+                          <a:srgbClr val="000000"/>
+                        </a:solidFill>
+                        <a:effectLst/>
+                        <a:latin typeface="標楷體" panose="03000509000000000000" pitchFamily="65" charset="-120"/>
+                        <a:ea typeface="標楷體" panose="03000509000000000000" pitchFamily="65" charset="-120"/>
+                      </a:endParaRPr>
+                    </a:p>
+                  </a:txBody>
+                  <a:tcPr marL="9525" marR="9525" marT="9525" marB="0" anchor="b"/>
+                </a:tc>
+                <a:tc>
+                  <a:txBody>
+                    <a:bodyPr/>
+                    <a:lstStyle/>
+                    <a:p>
+                      <a:pPr algn="r" fontAlgn="b"/>
+                      <a:r>
+                        <a:rPr lang="en-US" altLang="zh-TW" sz="1400" u="none" strike="noStrike">
+                          <a:effectLst/>
+                          <a:latin typeface="標楷體" panose="03000509000000000000" pitchFamily="65" charset="-120"/>
+                          <a:ea typeface="標楷體" panose="03000509000000000000" pitchFamily="65" charset="-120"/>
+                        </a:rPr>
+                        <a:t>5.3</a:t>
+                      </a:r>
+                      <a:endParaRPr lang="en-US" altLang="zh-TW" sz="1400" b="0" i="0" u="none" strike="noStrike">
+                        <a:solidFill>
+                          <a:srgbClr val="000000"/>
+                        </a:solidFill>
+                        <a:effectLst/>
+                        <a:latin typeface="標楷體" panose="03000509000000000000" pitchFamily="65" charset="-120"/>
+                        <a:ea typeface="標楷體" panose="03000509000000000000" pitchFamily="65" charset="-120"/>
+                      </a:endParaRPr>
+                    </a:p>
+                  </a:txBody>
+                  <a:tcPr marL="9525" marR="9525" marT="9525" marB="0" anchor="b"/>
+                </a:tc>
+                <a:tc>
+                  <a:txBody>
+                    <a:bodyPr/>
+                    <a:lstStyle/>
+                    <a:p>
+                      <a:pPr algn="r" fontAlgn="b"/>
+                      <a:r>
+                        <a:rPr lang="en-US" altLang="zh-TW" sz="1400" u="none" strike="noStrike" dirty="0">
+                          <a:effectLst/>
+                          <a:latin typeface="標楷體" panose="03000509000000000000" pitchFamily="65" charset="-120"/>
+                          <a:ea typeface="標楷體" panose="03000509000000000000" pitchFamily="65" charset="-120"/>
+                        </a:rPr>
+                        <a:t>5.3</a:t>
+                      </a:r>
+                      <a:endParaRPr lang="en-US" altLang="zh-TW" sz="1400" b="0" i="0" u="none" strike="noStrike" dirty="0">
+                        <a:solidFill>
+                          <a:srgbClr val="000000"/>
+                        </a:solidFill>
+                        <a:effectLst/>
+                        <a:latin typeface="標楷體" panose="03000509000000000000" pitchFamily="65" charset="-120"/>
+                        <a:ea typeface="標楷體" panose="03000509000000000000" pitchFamily="65" charset="-120"/>
+                      </a:endParaRPr>
+                    </a:p>
+                  </a:txBody>
+                  <a:tcPr marL="9525" marR="9525" marT="9525" marB="0" anchor="b"/>
+                </a:tc>
+                <a:tc>
+                  <a:txBody>
+                    <a:bodyPr/>
+                    <a:lstStyle/>
+                    <a:p>
+                      <a:pPr algn="r" fontAlgn="b"/>
+                      <a:r>
+                        <a:rPr lang="en-US" altLang="zh-TW" sz="1400" u="none" strike="noStrike">
+                          <a:effectLst/>
+                          <a:latin typeface="標楷體" panose="03000509000000000000" pitchFamily="65" charset="-120"/>
+                          <a:ea typeface="標楷體" panose="03000509000000000000" pitchFamily="65" charset="-120"/>
+                        </a:rPr>
+                        <a:t>5.15</a:t>
+                      </a:r>
+                      <a:endParaRPr lang="en-US" altLang="zh-TW" sz="1400" b="0" i="0" u="none" strike="noStrike">
+                        <a:solidFill>
+                          <a:srgbClr val="000000"/>
+                        </a:solidFill>
+                        <a:effectLst/>
+                        <a:latin typeface="標楷體" panose="03000509000000000000" pitchFamily="65" charset="-120"/>
+                        <a:ea typeface="標楷體" panose="03000509000000000000" pitchFamily="65" charset="-120"/>
+                      </a:endParaRPr>
+                    </a:p>
+                  </a:txBody>
+                  <a:tcPr marL="9525" marR="9525" marT="9525" marB="0" anchor="b"/>
+                </a:tc>
+                <a:tc>
+                  <a:txBody>
+                    <a:bodyPr/>
+                    <a:lstStyle/>
+                    <a:p>
+                      <a:pPr algn="r" fontAlgn="b"/>
+                      <a:r>
+                        <a:rPr lang="en-US" altLang="zh-TW" sz="1400" u="none" strike="noStrike">
+                          <a:effectLst/>
+                          <a:latin typeface="標楷體" panose="03000509000000000000" pitchFamily="65" charset="-120"/>
+                          <a:ea typeface="標楷體" panose="03000509000000000000" pitchFamily="65" charset="-120"/>
+                        </a:rPr>
+                        <a:t>5.15</a:t>
+                      </a:r>
+                      <a:endParaRPr lang="en-US" altLang="zh-TW" sz="1400" b="0" i="0" u="none" strike="noStrike">
+                        <a:solidFill>
+                          <a:srgbClr val="000000"/>
+                        </a:solidFill>
+                        <a:effectLst/>
+                        <a:latin typeface="標楷體" panose="03000509000000000000" pitchFamily="65" charset="-120"/>
+                        <a:ea typeface="標楷體" panose="03000509000000000000" pitchFamily="65" charset="-120"/>
+                      </a:endParaRPr>
+                    </a:p>
+                  </a:txBody>
+                  <a:tcPr marL="9525" marR="9525" marT="9525" marB="0" anchor="b"/>
+                </a:tc>
+                <a:tc>
+                  <a:txBody>
+                    <a:bodyPr/>
+                    <a:lstStyle/>
+                    <a:p>
+                      <a:pPr algn="r" fontAlgn="b"/>
+                      <a:r>
+                        <a:rPr lang="en-US" altLang="zh-TW" sz="1400" u="none" strike="noStrike">
+                          <a:effectLst/>
+                          <a:latin typeface="標楷體" panose="03000509000000000000" pitchFamily="65" charset="-120"/>
+                          <a:ea typeface="標楷體" panose="03000509000000000000" pitchFamily="65" charset="-120"/>
+                        </a:rPr>
+                        <a:t>5.15</a:t>
+                      </a:r>
+                      <a:endParaRPr lang="en-US" altLang="zh-TW" sz="1400" b="0" i="0" u="none" strike="noStrike">
+                        <a:solidFill>
+                          <a:srgbClr val="000000"/>
+                        </a:solidFill>
+                        <a:effectLst/>
+                        <a:latin typeface="標楷體" panose="03000509000000000000" pitchFamily="65" charset="-120"/>
+                        <a:ea typeface="標楷體" panose="03000509000000000000" pitchFamily="65" charset="-120"/>
+                      </a:endParaRPr>
+                    </a:p>
+                  </a:txBody>
+                  <a:tcPr marL="9525" marR="9525" marT="9525" marB="0" anchor="b"/>
+                </a:tc>
+                <a:tc>
+                  <a:txBody>
+                    <a:bodyPr/>
+                    <a:lstStyle/>
+                    <a:p>
+                      <a:pPr algn="r" fontAlgn="b"/>
+                      <a:r>
+                        <a:rPr lang="en-US" altLang="zh-TW" sz="1400" u="none" strike="noStrike">
+                          <a:effectLst/>
+                          <a:latin typeface="標楷體" panose="03000509000000000000" pitchFamily="65" charset="-120"/>
+                          <a:ea typeface="標楷體" panose="03000509000000000000" pitchFamily="65" charset="-120"/>
+                        </a:rPr>
+                        <a:t>5.25</a:t>
+                      </a:r>
+                      <a:endParaRPr lang="en-US" altLang="zh-TW" sz="1400" b="0" i="0" u="none" strike="noStrike">
+                        <a:solidFill>
+                          <a:srgbClr val="000000"/>
+                        </a:solidFill>
+                        <a:effectLst/>
+                        <a:latin typeface="標楷體" panose="03000509000000000000" pitchFamily="65" charset="-120"/>
+                        <a:ea typeface="標楷體" panose="03000509000000000000" pitchFamily="65" charset="-120"/>
+                      </a:endParaRPr>
+                    </a:p>
+                  </a:txBody>
+                  <a:tcPr marL="9525" marR="9525" marT="9525" marB="0" anchor="b"/>
+                </a:tc>
+                <a:tc>
+                  <a:txBody>
+                    <a:bodyPr/>
+                    <a:lstStyle/>
+                    <a:p>
+                      <a:pPr algn="r" fontAlgn="b"/>
+                      <a:r>
+                        <a:rPr lang="en-US" altLang="zh-TW" sz="1400" u="none" strike="noStrike">
+                          <a:effectLst/>
+                          <a:latin typeface="標楷體" panose="03000509000000000000" pitchFamily="65" charset="-120"/>
+                          <a:ea typeface="標楷體" panose="03000509000000000000" pitchFamily="65" charset="-120"/>
+                        </a:rPr>
+                        <a:t>5.03</a:t>
+                      </a:r>
+                      <a:endParaRPr lang="en-US" altLang="zh-TW" sz="1400" b="0" i="0" u="none" strike="noStrike">
+                        <a:solidFill>
+                          <a:srgbClr val="000000"/>
+                        </a:solidFill>
+                        <a:effectLst/>
+                        <a:latin typeface="標楷體" panose="03000509000000000000" pitchFamily="65" charset="-120"/>
+                        <a:ea typeface="標楷體" panose="03000509000000000000" pitchFamily="65" charset="-120"/>
+                      </a:endParaRPr>
+                    </a:p>
+                  </a:txBody>
+                  <a:tcPr marL="9525" marR="9525" marT="9525" marB="0" anchor="b"/>
+                </a:tc>
+                <a:tc>
+                  <a:txBody>
+                    <a:bodyPr/>
+                    <a:lstStyle/>
+                    <a:p>
+                      <a:pPr algn="r" fontAlgn="b"/>
+                      <a:r>
+                        <a:rPr lang="en-US" altLang="zh-TW" sz="1400" u="none" strike="noStrike">
+                          <a:effectLst/>
+                          <a:latin typeface="標楷體" panose="03000509000000000000" pitchFamily="65" charset="-120"/>
+                          <a:ea typeface="標楷體" panose="03000509000000000000" pitchFamily="65" charset="-120"/>
+                        </a:rPr>
+                        <a:t>5</a:t>
+                      </a:r>
+                      <a:endParaRPr lang="en-US" altLang="zh-TW" sz="1400" b="0" i="0" u="none" strike="noStrike">
+                        <a:solidFill>
+                          <a:srgbClr val="000000"/>
+                        </a:solidFill>
+                        <a:effectLst/>
+                        <a:latin typeface="標楷體" panose="03000509000000000000" pitchFamily="65" charset="-120"/>
+                        <a:ea typeface="標楷體" panose="03000509000000000000" pitchFamily="65" charset="-120"/>
+                      </a:endParaRPr>
+                    </a:p>
+                  </a:txBody>
+                  <a:tcPr marL="9525" marR="9525" marT="9525" marB="0" anchor="b"/>
+                </a:tc>
+                <a:extLst>
+                  <a:ext uri="{0D108BD9-81ED-4DB2-BD59-A6C34878D82A}">
+                    <a16:rowId xmlns:a16="http://schemas.microsoft.com/office/drawing/2014/main" val="2849800664"/>
+                  </a:ext>
+                </a:extLst>
+              </a:tr>
+              <a:tr h="245886">
+                <a:tc>
+                  <a:txBody>
+                    <a:bodyPr/>
+                    <a:lstStyle/>
+                    <a:p>
+                      <a:pPr algn="l" fontAlgn="b"/>
+                      <a:r>
+                        <a:rPr lang="en-US" sz="1600" u="none" strike="noStrike">
+                          <a:effectLst/>
+                          <a:latin typeface="標楷體" panose="03000509000000000000" pitchFamily="65" charset="-120"/>
+                          <a:ea typeface="標楷體" panose="03000509000000000000" pitchFamily="65" charset="-120"/>
+                        </a:rPr>
+                        <a:t>B [V]</a:t>
+                      </a:r>
+                      <a:endParaRPr lang="en-US" sz="1600" b="0" i="0" u="none" strike="noStrike">
+                        <a:solidFill>
+                          <a:srgbClr val="000000"/>
+                        </a:solidFill>
+                        <a:effectLst/>
+                        <a:latin typeface="標楷體" panose="03000509000000000000" pitchFamily="65" charset="-120"/>
+                        <a:ea typeface="標楷體" panose="03000509000000000000" pitchFamily="65" charset="-120"/>
+                      </a:endParaRPr>
+                    </a:p>
+                  </a:txBody>
+                  <a:tcPr marL="9525" marR="9525" marT="9525" marB="0" anchor="b"/>
+                </a:tc>
+                <a:tc>
+                  <a:txBody>
+                    <a:bodyPr/>
+                    <a:lstStyle/>
+                    <a:p>
+                      <a:pPr algn="r" fontAlgn="b"/>
+                      <a:r>
+                        <a:rPr lang="en-US" altLang="zh-TW" sz="1400" u="none" strike="noStrike">
+                          <a:effectLst/>
+                          <a:latin typeface="標楷體" panose="03000509000000000000" pitchFamily="65" charset="-120"/>
+                          <a:ea typeface="標楷體" panose="03000509000000000000" pitchFamily="65" charset="-120"/>
+                        </a:rPr>
+                        <a:t>4.95</a:t>
+                      </a:r>
+                      <a:endParaRPr lang="en-US" altLang="zh-TW" sz="1400" b="0" i="0" u="none" strike="noStrike">
+                        <a:solidFill>
+                          <a:srgbClr val="000000"/>
+                        </a:solidFill>
+                        <a:effectLst/>
+                        <a:latin typeface="標楷體" panose="03000509000000000000" pitchFamily="65" charset="-120"/>
+                        <a:ea typeface="標楷體" panose="03000509000000000000" pitchFamily="65" charset="-120"/>
+                      </a:endParaRPr>
+                    </a:p>
+                  </a:txBody>
+                  <a:tcPr marL="9525" marR="9525" marT="9525" marB="0" anchor="b"/>
+                </a:tc>
+                <a:tc>
+                  <a:txBody>
+                    <a:bodyPr/>
+                    <a:lstStyle/>
+                    <a:p>
+                      <a:pPr algn="r" fontAlgn="b"/>
+                      <a:r>
+                        <a:rPr lang="en-US" altLang="zh-TW" sz="1400" u="none" strike="noStrike">
+                          <a:effectLst/>
+                          <a:latin typeface="標楷體" panose="03000509000000000000" pitchFamily="65" charset="-120"/>
+                          <a:ea typeface="標楷體" panose="03000509000000000000" pitchFamily="65" charset="-120"/>
+                        </a:rPr>
+                        <a:t>5.1</a:t>
+                      </a:r>
+                      <a:endParaRPr lang="en-US" altLang="zh-TW" sz="1400" b="0" i="0" u="none" strike="noStrike">
+                        <a:solidFill>
+                          <a:srgbClr val="000000"/>
+                        </a:solidFill>
+                        <a:effectLst/>
+                        <a:latin typeface="標楷體" panose="03000509000000000000" pitchFamily="65" charset="-120"/>
+                        <a:ea typeface="標楷體" panose="03000509000000000000" pitchFamily="65" charset="-120"/>
+                      </a:endParaRPr>
+                    </a:p>
+                  </a:txBody>
+                  <a:tcPr marL="9525" marR="9525" marT="9525" marB="0" anchor="b"/>
+                </a:tc>
+                <a:tc>
+                  <a:txBody>
+                    <a:bodyPr/>
+                    <a:lstStyle/>
+                    <a:p>
+                      <a:pPr algn="r" fontAlgn="b"/>
+                      <a:r>
+                        <a:rPr lang="en-US" altLang="zh-TW" sz="1400" u="none" strike="noStrike">
+                          <a:effectLst/>
+                          <a:latin typeface="標楷體" panose="03000509000000000000" pitchFamily="65" charset="-120"/>
+                          <a:ea typeface="標楷體" panose="03000509000000000000" pitchFamily="65" charset="-120"/>
+                        </a:rPr>
+                        <a:t>4.2</a:t>
+                      </a:r>
+                      <a:endParaRPr lang="en-US" altLang="zh-TW" sz="1400" b="0" i="0" u="none" strike="noStrike">
+                        <a:solidFill>
+                          <a:srgbClr val="000000"/>
+                        </a:solidFill>
+                        <a:effectLst/>
+                        <a:latin typeface="標楷體" panose="03000509000000000000" pitchFamily="65" charset="-120"/>
+                        <a:ea typeface="標楷體" panose="03000509000000000000" pitchFamily="65" charset="-120"/>
+                      </a:endParaRPr>
+                    </a:p>
+                  </a:txBody>
+                  <a:tcPr marL="9525" marR="9525" marT="9525" marB="0" anchor="b"/>
+                </a:tc>
+                <a:tc>
+                  <a:txBody>
+                    <a:bodyPr/>
+                    <a:lstStyle/>
+                    <a:p>
+                      <a:pPr algn="r" fontAlgn="b"/>
+                      <a:r>
+                        <a:rPr lang="en-US" altLang="zh-TW" sz="1400" u="none" strike="noStrike" dirty="0">
+                          <a:effectLst/>
+                          <a:latin typeface="標楷體" panose="03000509000000000000" pitchFamily="65" charset="-120"/>
+                          <a:ea typeface="標楷體" panose="03000509000000000000" pitchFamily="65" charset="-120"/>
+                        </a:rPr>
+                        <a:t>3.05</a:t>
+                      </a:r>
+                      <a:endParaRPr lang="en-US" altLang="zh-TW" sz="1400" b="0" i="0" u="none" strike="noStrike" dirty="0">
+                        <a:solidFill>
+                          <a:srgbClr val="000000"/>
+                        </a:solidFill>
+                        <a:effectLst/>
+                        <a:latin typeface="標楷體" panose="03000509000000000000" pitchFamily="65" charset="-120"/>
+                        <a:ea typeface="標楷體" panose="03000509000000000000" pitchFamily="65" charset="-120"/>
+                      </a:endParaRPr>
+                    </a:p>
+                  </a:txBody>
+                  <a:tcPr marL="9525" marR="9525" marT="9525" marB="0" anchor="b"/>
+                </a:tc>
+                <a:tc>
+                  <a:txBody>
+                    <a:bodyPr/>
+                    <a:lstStyle/>
+                    <a:p>
+                      <a:pPr algn="r" fontAlgn="b"/>
+                      <a:r>
+                        <a:rPr lang="en-US" altLang="zh-TW" sz="1400" u="none" strike="noStrike">
+                          <a:effectLst/>
+                          <a:latin typeface="標楷體" panose="03000509000000000000" pitchFamily="65" charset="-120"/>
+                          <a:ea typeface="標楷體" panose="03000509000000000000" pitchFamily="65" charset="-120"/>
+                        </a:rPr>
+                        <a:t>2.4</a:t>
+                      </a:r>
+                      <a:endParaRPr lang="en-US" altLang="zh-TW" sz="1400" b="0" i="0" u="none" strike="noStrike">
+                        <a:solidFill>
+                          <a:srgbClr val="000000"/>
+                        </a:solidFill>
+                        <a:effectLst/>
+                        <a:latin typeface="標楷體" panose="03000509000000000000" pitchFamily="65" charset="-120"/>
+                        <a:ea typeface="標楷體" panose="03000509000000000000" pitchFamily="65" charset="-120"/>
+                      </a:endParaRPr>
+                    </a:p>
+                  </a:txBody>
+                  <a:tcPr marL="9525" marR="9525" marT="9525" marB="0" anchor="b"/>
+                </a:tc>
+                <a:tc>
+                  <a:txBody>
+                    <a:bodyPr/>
+                    <a:lstStyle/>
+                    <a:p>
+                      <a:pPr algn="r" fontAlgn="b"/>
+                      <a:r>
+                        <a:rPr lang="en-US" altLang="zh-TW" sz="1400" u="none" strike="noStrike">
+                          <a:effectLst/>
+                          <a:latin typeface="標楷體" panose="03000509000000000000" pitchFamily="65" charset="-120"/>
+                          <a:ea typeface="標楷體" panose="03000509000000000000" pitchFamily="65" charset="-120"/>
+                        </a:rPr>
+                        <a:t>1.85</a:t>
+                      </a:r>
+                      <a:endParaRPr lang="en-US" altLang="zh-TW" sz="1400" b="0" i="0" u="none" strike="noStrike">
+                        <a:solidFill>
+                          <a:srgbClr val="000000"/>
+                        </a:solidFill>
+                        <a:effectLst/>
+                        <a:latin typeface="標楷體" panose="03000509000000000000" pitchFamily="65" charset="-120"/>
+                        <a:ea typeface="標楷體" panose="03000509000000000000" pitchFamily="65" charset="-120"/>
+                      </a:endParaRPr>
+                    </a:p>
+                  </a:txBody>
+                  <a:tcPr marL="9525" marR="9525" marT="9525" marB="0" anchor="b"/>
+                </a:tc>
+                <a:tc>
+                  <a:txBody>
+                    <a:bodyPr/>
+                    <a:lstStyle/>
+                    <a:p>
+                      <a:pPr algn="r" fontAlgn="b"/>
+                      <a:r>
+                        <a:rPr lang="en-US" altLang="zh-TW" sz="1400" u="none" strike="noStrike">
+                          <a:effectLst/>
+                          <a:latin typeface="標楷體" panose="03000509000000000000" pitchFamily="65" charset="-120"/>
+                          <a:ea typeface="標楷體" panose="03000509000000000000" pitchFamily="65" charset="-120"/>
+                        </a:rPr>
+                        <a:t>1.05</a:t>
+                      </a:r>
+                      <a:endParaRPr lang="en-US" altLang="zh-TW" sz="1400" b="0" i="0" u="none" strike="noStrike">
+                        <a:solidFill>
+                          <a:srgbClr val="000000"/>
+                        </a:solidFill>
+                        <a:effectLst/>
+                        <a:latin typeface="標楷體" panose="03000509000000000000" pitchFamily="65" charset="-120"/>
+                        <a:ea typeface="標楷體" panose="03000509000000000000" pitchFamily="65" charset="-120"/>
+                      </a:endParaRPr>
+                    </a:p>
+                  </a:txBody>
+                  <a:tcPr marL="9525" marR="9525" marT="9525" marB="0" anchor="b"/>
+                </a:tc>
+                <a:tc>
+                  <a:txBody>
+                    <a:bodyPr/>
+                    <a:lstStyle/>
+                    <a:p>
+                      <a:pPr algn="r" fontAlgn="b"/>
+                      <a:r>
+                        <a:rPr lang="en-US" altLang="zh-TW" sz="1400" u="none" strike="noStrike">
+                          <a:effectLst/>
+                          <a:latin typeface="標楷體" panose="03000509000000000000" pitchFamily="65" charset="-120"/>
+                          <a:ea typeface="標楷體" panose="03000509000000000000" pitchFamily="65" charset="-120"/>
+                        </a:rPr>
+                        <a:t>0.65</a:t>
+                      </a:r>
+                      <a:endParaRPr lang="en-US" altLang="zh-TW" sz="1400" b="0" i="0" u="none" strike="noStrike">
+                        <a:solidFill>
+                          <a:srgbClr val="000000"/>
+                        </a:solidFill>
+                        <a:effectLst/>
+                        <a:latin typeface="標楷體" panose="03000509000000000000" pitchFamily="65" charset="-120"/>
+                        <a:ea typeface="標楷體" panose="03000509000000000000" pitchFamily="65" charset="-120"/>
+                      </a:endParaRPr>
+                    </a:p>
+                  </a:txBody>
+                  <a:tcPr marL="9525" marR="9525" marT="9525" marB="0" anchor="b"/>
+                </a:tc>
+                <a:tc>
+                  <a:txBody>
+                    <a:bodyPr/>
+                    <a:lstStyle/>
+                    <a:p>
+                      <a:pPr algn="r" fontAlgn="b"/>
+                      <a:r>
+                        <a:rPr lang="en-US" altLang="zh-TW" sz="1400" u="none" strike="noStrike">
+                          <a:effectLst/>
+                          <a:latin typeface="標楷體" panose="03000509000000000000" pitchFamily="65" charset="-120"/>
+                          <a:ea typeface="標楷體" panose="03000509000000000000" pitchFamily="65" charset="-120"/>
+                        </a:rPr>
+                        <a:t>0.4</a:t>
+                      </a:r>
+                      <a:endParaRPr lang="en-US" altLang="zh-TW" sz="1400" b="0" i="0" u="none" strike="noStrike">
+                        <a:solidFill>
+                          <a:srgbClr val="000000"/>
+                        </a:solidFill>
+                        <a:effectLst/>
+                        <a:latin typeface="標楷體" panose="03000509000000000000" pitchFamily="65" charset="-120"/>
+                        <a:ea typeface="標楷體" panose="03000509000000000000" pitchFamily="65" charset="-120"/>
+                      </a:endParaRPr>
+                    </a:p>
+                  </a:txBody>
+                  <a:tcPr marL="9525" marR="9525" marT="9525" marB="0" anchor="b"/>
+                </a:tc>
+                <a:tc>
+                  <a:txBody>
+                    <a:bodyPr/>
+                    <a:lstStyle/>
+                    <a:p>
+                      <a:pPr algn="r" fontAlgn="b"/>
+                      <a:r>
+                        <a:rPr lang="en-US" altLang="zh-TW" sz="1400" u="none" strike="noStrike">
+                          <a:effectLst/>
+                          <a:latin typeface="標楷體" panose="03000509000000000000" pitchFamily="65" charset="-120"/>
+                          <a:ea typeface="標楷體" panose="03000509000000000000" pitchFamily="65" charset="-120"/>
+                        </a:rPr>
+                        <a:t>0.6</a:t>
+                      </a:r>
+                      <a:endParaRPr lang="en-US" altLang="zh-TW" sz="1400" b="0" i="0" u="none" strike="noStrike">
+                        <a:solidFill>
+                          <a:srgbClr val="000000"/>
+                        </a:solidFill>
+                        <a:effectLst/>
+                        <a:latin typeface="標楷體" panose="03000509000000000000" pitchFamily="65" charset="-120"/>
+                        <a:ea typeface="標楷體" panose="03000509000000000000" pitchFamily="65" charset="-120"/>
+                      </a:endParaRPr>
+                    </a:p>
+                  </a:txBody>
+                  <a:tcPr marL="9525" marR="9525" marT="9525" marB="0" anchor="b"/>
+                </a:tc>
+                <a:tc>
+                  <a:txBody>
+                    <a:bodyPr/>
+                    <a:lstStyle/>
+                    <a:p>
+                      <a:pPr algn="r" fontAlgn="b"/>
+                      <a:r>
+                        <a:rPr lang="en-US" altLang="zh-TW" sz="1400" u="none" strike="noStrike">
+                          <a:effectLst/>
+                          <a:latin typeface="標楷體" panose="03000509000000000000" pitchFamily="65" charset="-120"/>
+                          <a:ea typeface="標楷體" panose="03000509000000000000" pitchFamily="65" charset="-120"/>
+                        </a:rPr>
+                        <a:t>0.6</a:t>
+                      </a:r>
+                      <a:endParaRPr lang="en-US" altLang="zh-TW" sz="1400" b="0" i="0" u="none" strike="noStrike">
+                        <a:solidFill>
+                          <a:srgbClr val="000000"/>
+                        </a:solidFill>
+                        <a:effectLst/>
+                        <a:latin typeface="標楷體" panose="03000509000000000000" pitchFamily="65" charset="-120"/>
+                        <a:ea typeface="標楷體" panose="03000509000000000000" pitchFamily="65" charset="-120"/>
+                      </a:endParaRPr>
+                    </a:p>
+                  </a:txBody>
+                  <a:tcPr marL="9525" marR="9525" marT="9525" marB="0" anchor="b"/>
+                </a:tc>
+                <a:extLst>
+                  <a:ext uri="{0D108BD9-81ED-4DB2-BD59-A6C34878D82A}">
+                    <a16:rowId xmlns:a16="http://schemas.microsoft.com/office/drawing/2014/main" val="989023610"/>
+                  </a:ext>
+                </a:extLst>
+              </a:tr>
+              <a:tr h="245886">
+                <a:tc>
+                  <a:txBody>
+                    <a:bodyPr/>
+                    <a:lstStyle/>
+                    <a:p>
+                      <a:pPr algn="l" fontAlgn="b"/>
+                      <a:r>
+                        <a:rPr lang="en-US" sz="1600" u="none" strike="noStrike">
+                          <a:effectLst/>
+                          <a:latin typeface="標楷體" panose="03000509000000000000" pitchFamily="65" charset="-120"/>
+                          <a:ea typeface="標楷體" panose="03000509000000000000" pitchFamily="65" charset="-120"/>
+                        </a:rPr>
+                        <a:t>𝑇1 [sec]</a:t>
+                      </a:r>
+                      <a:endParaRPr lang="en-US" sz="1600" b="0" i="0" u="none" strike="noStrike">
+                        <a:solidFill>
+                          <a:srgbClr val="000000"/>
+                        </a:solidFill>
+                        <a:effectLst/>
+                        <a:latin typeface="標楷體" panose="03000509000000000000" pitchFamily="65" charset="-120"/>
+                        <a:ea typeface="標楷體" panose="03000509000000000000" pitchFamily="65" charset="-120"/>
+                      </a:endParaRPr>
+                    </a:p>
+                  </a:txBody>
+                  <a:tcPr marL="9525" marR="9525" marT="9525" marB="0" anchor="b"/>
+                </a:tc>
+                <a:tc>
+                  <a:txBody>
+                    <a:bodyPr/>
+                    <a:lstStyle/>
+                    <a:p>
+                      <a:pPr algn="r" fontAlgn="b"/>
+                      <a:r>
+                        <a:rPr lang="en-US" altLang="zh-TW" sz="1400" u="none" strike="noStrike">
+                          <a:effectLst/>
+                          <a:latin typeface="標楷體" panose="03000509000000000000" pitchFamily="65" charset="-120"/>
+                          <a:ea typeface="標楷體" panose="03000509000000000000" pitchFamily="65" charset="-120"/>
+                        </a:rPr>
+                        <a:t>4.9</a:t>
+                      </a:r>
+                      <a:endParaRPr lang="en-US" altLang="zh-TW" sz="1400" b="0" i="0" u="none" strike="noStrike">
+                        <a:solidFill>
+                          <a:srgbClr val="000000"/>
+                        </a:solidFill>
+                        <a:effectLst/>
+                        <a:latin typeface="標楷體" panose="03000509000000000000" pitchFamily="65" charset="-120"/>
+                        <a:ea typeface="標楷體" panose="03000509000000000000" pitchFamily="65" charset="-120"/>
+                      </a:endParaRPr>
+                    </a:p>
+                  </a:txBody>
+                  <a:tcPr marL="9525" marR="9525" marT="9525" marB="0" anchor="b"/>
+                </a:tc>
+                <a:tc>
+                  <a:txBody>
+                    <a:bodyPr/>
+                    <a:lstStyle/>
+                    <a:p>
+                      <a:pPr algn="r" fontAlgn="b"/>
+                      <a:r>
+                        <a:rPr lang="en-US" altLang="zh-TW" sz="1400" u="none" strike="noStrike" dirty="0">
+                          <a:effectLst/>
+                          <a:latin typeface="標楷體" panose="03000509000000000000" pitchFamily="65" charset="-120"/>
+                          <a:ea typeface="標楷體" panose="03000509000000000000" pitchFamily="65" charset="-120"/>
+                        </a:rPr>
+                        <a:t>2.9</a:t>
+                      </a:r>
+                      <a:endParaRPr lang="en-US" altLang="zh-TW" sz="1400" b="0" i="0" u="none" strike="noStrike" dirty="0">
+                        <a:solidFill>
+                          <a:srgbClr val="000000"/>
+                        </a:solidFill>
+                        <a:effectLst/>
+                        <a:latin typeface="標楷體" panose="03000509000000000000" pitchFamily="65" charset="-120"/>
+                        <a:ea typeface="標楷體" panose="03000509000000000000" pitchFamily="65" charset="-120"/>
+                      </a:endParaRPr>
+                    </a:p>
+                  </a:txBody>
+                  <a:tcPr marL="9525" marR="9525" marT="9525" marB="0" anchor="b"/>
+                </a:tc>
+                <a:tc>
+                  <a:txBody>
+                    <a:bodyPr/>
+                    <a:lstStyle/>
+                    <a:p>
+                      <a:pPr algn="r" fontAlgn="b"/>
+                      <a:r>
+                        <a:rPr lang="en-US" altLang="zh-TW" sz="1400" u="none" strike="noStrike">
+                          <a:effectLst/>
+                          <a:latin typeface="標楷體" panose="03000509000000000000" pitchFamily="65" charset="-120"/>
+                          <a:ea typeface="標楷體" panose="03000509000000000000" pitchFamily="65" charset="-120"/>
+                        </a:rPr>
+                        <a:t>1.2</a:t>
+                      </a:r>
+                      <a:endParaRPr lang="en-US" altLang="zh-TW" sz="1400" b="0" i="0" u="none" strike="noStrike">
+                        <a:solidFill>
+                          <a:srgbClr val="000000"/>
+                        </a:solidFill>
+                        <a:effectLst/>
+                        <a:latin typeface="標楷體" panose="03000509000000000000" pitchFamily="65" charset="-120"/>
+                        <a:ea typeface="標楷體" panose="03000509000000000000" pitchFamily="65" charset="-120"/>
+                      </a:endParaRPr>
+                    </a:p>
+                  </a:txBody>
+                  <a:tcPr marL="9525" marR="9525" marT="9525" marB="0" anchor="b"/>
+                </a:tc>
+                <a:tc>
+                  <a:txBody>
+                    <a:bodyPr/>
+                    <a:lstStyle/>
+                    <a:p>
+                      <a:pPr algn="r" fontAlgn="b"/>
+                      <a:r>
+                        <a:rPr lang="en-US" altLang="zh-TW" sz="1400" u="none" strike="noStrike">
+                          <a:effectLst/>
+                          <a:latin typeface="標楷體" panose="03000509000000000000" pitchFamily="65" charset="-120"/>
+                          <a:ea typeface="標楷體" panose="03000509000000000000" pitchFamily="65" charset="-120"/>
+                        </a:rPr>
+                        <a:t>0.81</a:t>
+                      </a:r>
+                      <a:endParaRPr lang="en-US" altLang="zh-TW" sz="1400" b="0" i="0" u="none" strike="noStrike">
+                        <a:solidFill>
+                          <a:srgbClr val="000000"/>
+                        </a:solidFill>
+                        <a:effectLst/>
+                        <a:latin typeface="標楷體" panose="03000509000000000000" pitchFamily="65" charset="-120"/>
+                        <a:ea typeface="標楷體" panose="03000509000000000000" pitchFamily="65" charset="-120"/>
+                      </a:endParaRPr>
+                    </a:p>
+                  </a:txBody>
+                  <a:tcPr marL="9525" marR="9525" marT="9525" marB="0" anchor="b"/>
+                </a:tc>
+                <a:tc>
+                  <a:txBody>
+                    <a:bodyPr/>
+                    <a:lstStyle/>
+                    <a:p>
+                      <a:pPr algn="r" fontAlgn="b"/>
+                      <a:r>
+                        <a:rPr lang="en-US" altLang="zh-TW" sz="1400" u="none" strike="noStrike">
+                          <a:effectLst/>
+                          <a:latin typeface="標楷體" panose="03000509000000000000" pitchFamily="65" charset="-120"/>
+                          <a:ea typeface="標楷體" panose="03000509000000000000" pitchFamily="65" charset="-120"/>
+                        </a:rPr>
+                        <a:t>0.63</a:t>
+                      </a:r>
+                      <a:endParaRPr lang="en-US" altLang="zh-TW" sz="1400" b="0" i="0" u="none" strike="noStrike">
+                        <a:solidFill>
+                          <a:srgbClr val="000000"/>
+                        </a:solidFill>
+                        <a:effectLst/>
+                        <a:latin typeface="標楷體" panose="03000509000000000000" pitchFamily="65" charset="-120"/>
+                        <a:ea typeface="標楷體" panose="03000509000000000000" pitchFamily="65" charset="-120"/>
+                      </a:endParaRPr>
+                    </a:p>
+                  </a:txBody>
+                  <a:tcPr marL="9525" marR="9525" marT="9525" marB="0" anchor="b"/>
+                </a:tc>
+                <a:tc>
+                  <a:txBody>
+                    <a:bodyPr/>
+                    <a:lstStyle/>
+                    <a:p>
+                      <a:pPr algn="r" fontAlgn="b"/>
+                      <a:r>
+                        <a:rPr lang="en-US" altLang="zh-TW" sz="1400" u="none" strike="noStrike" dirty="0">
+                          <a:effectLst/>
+                          <a:latin typeface="標楷體" panose="03000509000000000000" pitchFamily="65" charset="-120"/>
+                          <a:ea typeface="標楷體" panose="03000509000000000000" pitchFamily="65" charset="-120"/>
+                        </a:rPr>
+                        <a:t>0.462</a:t>
+                      </a:r>
+                      <a:endParaRPr lang="en-US" altLang="zh-TW" sz="1400" b="0" i="0" u="none" strike="noStrike" dirty="0">
+                        <a:solidFill>
+                          <a:srgbClr val="000000"/>
+                        </a:solidFill>
+                        <a:effectLst/>
+                        <a:latin typeface="標楷體" panose="03000509000000000000" pitchFamily="65" charset="-120"/>
+                        <a:ea typeface="標楷體" panose="03000509000000000000" pitchFamily="65" charset="-120"/>
+                      </a:endParaRPr>
+                    </a:p>
+                  </a:txBody>
+                  <a:tcPr marL="9525" marR="9525" marT="9525" marB="0" anchor="b"/>
+                </a:tc>
+                <a:tc>
+                  <a:txBody>
+                    <a:bodyPr/>
+                    <a:lstStyle/>
+                    <a:p>
+                      <a:pPr algn="r" fontAlgn="b"/>
+                      <a:r>
+                        <a:rPr lang="en-US" altLang="zh-TW" sz="1400" u="none" strike="noStrike" dirty="0">
+                          <a:effectLst/>
+                          <a:latin typeface="標楷體" panose="03000509000000000000" pitchFamily="65" charset="-120"/>
+                          <a:ea typeface="標楷體" panose="03000509000000000000" pitchFamily="65" charset="-120"/>
+                        </a:rPr>
+                        <a:t>0.24</a:t>
+                      </a:r>
+                      <a:endParaRPr lang="en-US" altLang="zh-TW" sz="1400" b="0" i="0" u="none" strike="noStrike" dirty="0">
+                        <a:solidFill>
+                          <a:srgbClr val="000000"/>
+                        </a:solidFill>
+                        <a:effectLst/>
+                        <a:latin typeface="標楷體" panose="03000509000000000000" pitchFamily="65" charset="-120"/>
+                        <a:ea typeface="標楷體" panose="03000509000000000000" pitchFamily="65" charset="-120"/>
+                      </a:endParaRPr>
+                    </a:p>
+                  </a:txBody>
+                  <a:tcPr marL="9525" marR="9525" marT="9525" marB="0" anchor="b"/>
+                </a:tc>
+                <a:tc>
+                  <a:txBody>
+                    <a:bodyPr/>
+                    <a:lstStyle/>
+                    <a:p>
+                      <a:pPr algn="r" fontAlgn="b"/>
+                      <a:r>
+                        <a:rPr lang="en-US" altLang="zh-TW" sz="1400" u="none" strike="noStrike">
+                          <a:effectLst/>
+                          <a:latin typeface="標楷體" panose="03000509000000000000" pitchFamily="65" charset="-120"/>
+                          <a:ea typeface="標楷體" panose="03000509000000000000" pitchFamily="65" charset="-120"/>
+                        </a:rPr>
+                        <a:t>0.122</a:t>
+                      </a:r>
+                      <a:endParaRPr lang="en-US" altLang="zh-TW" sz="1400" b="0" i="0" u="none" strike="noStrike">
+                        <a:solidFill>
+                          <a:srgbClr val="000000"/>
+                        </a:solidFill>
+                        <a:effectLst/>
+                        <a:latin typeface="標楷體" panose="03000509000000000000" pitchFamily="65" charset="-120"/>
+                        <a:ea typeface="標楷體" panose="03000509000000000000" pitchFamily="65" charset="-120"/>
+                      </a:endParaRPr>
+                    </a:p>
+                  </a:txBody>
+                  <a:tcPr marL="9525" marR="9525" marT="9525" marB="0" anchor="b"/>
+                </a:tc>
+                <a:tc>
+                  <a:txBody>
+                    <a:bodyPr/>
+                    <a:lstStyle/>
+                    <a:p>
+                      <a:pPr algn="r" fontAlgn="b"/>
+                      <a:r>
+                        <a:rPr lang="en-US" altLang="zh-TW" sz="1400" u="none" strike="noStrike">
+                          <a:effectLst/>
+                          <a:latin typeface="標楷體" panose="03000509000000000000" pitchFamily="65" charset="-120"/>
+                          <a:ea typeface="標楷體" panose="03000509000000000000" pitchFamily="65" charset="-120"/>
+                        </a:rPr>
+                        <a:t>0.083</a:t>
+                      </a:r>
+                      <a:endParaRPr lang="en-US" altLang="zh-TW" sz="1400" b="0" i="0" u="none" strike="noStrike">
+                        <a:solidFill>
+                          <a:srgbClr val="000000"/>
+                        </a:solidFill>
+                        <a:effectLst/>
+                        <a:latin typeface="標楷體" panose="03000509000000000000" pitchFamily="65" charset="-120"/>
+                        <a:ea typeface="標楷體" panose="03000509000000000000" pitchFamily="65" charset="-120"/>
+                      </a:endParaRPr>
+                    </a:p>
+                  </a:txBody>
+                  <a:tcPr marL="9525" marR="9525" marT="9525" marB="0" anchor="b"/>
+                </a:tc>
+                <a:tc>
+                  <a:txBody>
+                    <a:bodyPr/>
+                    <a:lstStyle/>
+                    <a:p>
+                      <a:pPr algn="r" fontAlgn="b"/>
+                      <a:r>
+                        <a:rPr lang="en-US" altLang="zh-TW" sz="1400" u="none" strike="noStrike">
+                          <a:effectLst/>
+                          <a:latin typeface="標楷體" panose="03000509000000000000" pitchFamily="65" charset="-120"/>
+                          <a:ea typeface="標楷體" panose="03000509000000000000" pitchFamily="65" charset="-120"/>
+                        </a:rPr>
+                        <a:t>0.063</a:t>
+                      </a:r>
+                      <a:endParaRPr lang="en-US" altLang="zh-TW" sz="1400" b="0" i="0" u="none" strike="noStrike">
+                        <a:solidFill>
+                          <a:srgbClr val="000000"/>
+                        </a:solidFill>
+                        <a:effectLst/>
+                        <a:latin typeface="標楷體" panose="03000509000000000000" pitchFamily="65" charset="-120"/>
+                        <a:ea typeface="標楷體" panose="03000509000000000000" pitchFamily="65" charset="-120"/>
+                      </a:endParaRPr>
+                    </a:p>
+                  </a:txBody>
+                  <a:tcPr marL="9525" marR="9525" marT="9525" marB="0" anchor="b"/>
+                </a:tc>
+                <a:tc>
+                  <a:txBody>
+                    <a:bodyPr/>
+                    <a:lstStyle/>
+                    <a:p>
+                      <a:pPr algn="r" fontAlgn="b"/>
+                      <a:r>
+                        <a:rPr lang="en-US" altLang="zh-TW" sz="1400" u="none" strike="noStrike">
+                          <a:effectLst/>
+                          <a:latin typeface="標楷體" panose="03000509000000000000" pitchFamily="65" charset="-120"/>
+                          <a:ea typeface="標楷體" panose="03000509000000000000" pitchFamily="65" charset="-120"/>
+                        </a:rPr>
+                        <a:t>0.047</a:t>
+                      </a:r>
+                      <a:endParaRPr lang="en-US" altLang="zh-TW" sz="1400" b="0" i="0" u="none" strike="noStrike">
+                        <a:solidFill>
+                          <a:srgbClr val="000000"/>
+                        </a:solidFill>
+                        <a:effectLst/>
+                        <a:latin typeface="標楷體" panose="03000509000000000000" pitchFamily="65" charset="-120"/>
+                        <a:ea typeface="標楷體" panose="03000509000000000000" pitchFamily="65" charset="-120"/>
+                      </a:endParaRPr>
+                    </a:p>
+                  </a:txBody>
+                  <a:tcPr marL="9525" marR="9525" marT="9525" marB="0" anchor="b"/>
+                </a:tc>
+                <a:extLst>
+                  <a:ext uri="{0D108BD9-81ED-4DB2-BD59-A6C34878D82A}">
+                    <a16:rowId xmlns:a16="http://schemas.microsoft.com/office/drawing/2014/main" val="3089605726"/>
+                  </a:ext>
+                </a:extLst>
+              </a:tr>
+              <a:tr h="245886">
+                <a:tc>
+                  <a:txBody>
+                    <a:bodyPr/>
+                    <a:lstStyle/>
+                    <a:p>
+                      <a:pPr algn="l" fontAlgn="b"/>
+                      <a:r>
+                        <a:rPr lang="en-US" sz="1600" u="none" strike="noStrike">
+                          <a:effectLst/>
+                          <a:latin typeface="標楷體" panose="03000509000000000000" pitchFamily="65" charset="-120"/>
+                          <a:ea typeface="標楷體" panose="03000509000000000000" pitchFamily="65" charset="-120"/>
+                        </a:rPr>
+                        <a:t>𝑇2 [sec]</a:t>
+                      </a:r>
+                      <a:endParaRPr lang="en-US" sz="1600" b="0" i="0" u="none" strike="noStrike">
+                        <a:solidFill>
+                          <a:srgbClr val="000000"/>
+                        </a:solidFill>
+                        <a:effectLst/>
+                        <a:latin typeface="標楷體" panose="03000509000000000000" pitchFamily="65" charset="-120"/>
+                        <a:ea typeface="標楷體" panose="03000509000000000000" pitchFamily="65" charset="-120"/>
+                      </a:endParaRPr>
+                    </a:p>
+                  </a:txBody>
+                  <a:tcPr marL="9525" marR="9525" marT="9525" marB="0" anchor="b"/>
+                </a:tc>
+                <a:tc>
+                  <a:txBody>
+                    <a:bodyPr/>
+                    <a:lstStyle/>
+                    <a:p>
+                      <a:pPr algn="r" fontAlgn="b"/>
+                      <a:r>
+                        <a:rPr lang="en-US" altLang="zh-TW" sz="1400" u="none" strike="noStrike">
+                          <a:effectLst/>
+                          <a:latin typeface="標楷體" panose="03000509000000000000" pitchFamily="65" charset="-120"/>
+                          <a:ea typeface="標楷體" panose="03000509000000000000" pitchFamily="65" charset="-120"/>
+                        </a:rPr>
+                        <a:t>0.38</a:t>
+                      </a:r>
+                      <a:endParaRPr lang="en-US" altLang="zh-TW" sz="1400" b="0" i="0" u="none" strike="noStrike">
+                        <a:solidFill>
+                          <a:srgbClr val="000000"/>
+                        </a:solidFill>
+                        <a:effectLst/>
+                        <a:latin typeface="標楷體" panose="03000509000000000000" pitchFamily="65" charset="-120"/>
+                        <a:ea typeface="標楷體" panose="03000509000000000000" pitchFamily="65" charset="-120"/>
+                      </a:endParaRPr>
+                    </a:p>
+                  </a:txBody>
+                  <a:tcPr marL="9525" marR="9525" marT="9525" marB="0" anchor="b"/>
+                </a:tc>
+                <a:tc>
+                  <a:txBody>
+                    <a:bodyPr/>
+                    <a:lstStyle/>
+                    <a:p>
+                      <a:pPr algn="r" fontAlgn="b"/>
+                      <a:r>
+                        <a:rPr lang="en-US" altLang="zh-TW" sz="1400" u="none" strike="noStrike">
+                          <a:effectLst/>
+                          <a:latin typeface="標楷體" panose="03000509000000000000" pitchFamily="65" charset="-120"/>
+                          <a:ea typeface="標楷體" panose="03000509000000000000" pitchFamily="65" charset="-120"/>
+                        </a:rPr>
+                        <a:t>0.32</a:t>
+                      </a:r>
+                      <a:endParaRPr lang="en-US" altLang="zh-TW" sz="1400" b="0" i="0" u="none" strike="noStrike">
+                        <a:solidFill>
+                          <a:srgbClr val="000000"/>
+                        </a:solidFill>
+                        <a:effectLst/>
+                        <a:latin typeface="標楷體" panose="03000509000000000000" pitchFamily="65" charset="-120"/>
+                        <a:ea typeface="標楷體" panose="03000509000000000000" pitchFamily="65" charset="-120"/>
+                      </a:endParaRPr>
+                    </a:p>
+                  </a:txBody>
+                  <a:tcPr marL="9525" marR="9525" marT="9525" marB="0" anchor="b"/>
+                </a:tc>
+                <a:tc>
+                  <a:txBody>
+                    <a:bodyPr/>
+                    <a:lstStyle/>
+                    <a:p>
+                      <a:pPr algn="r" fontAlgn="b"/>
+                      <a:r>
+                        <a:rPr lang="en-US" altLang="zh-TW" sz="1400" u="none" strike="noStrike">
+                          <a:effectLst/>
+                          <a:latin typeface="標楷體" panose="03000509000000000000" pitchFamily="65" charset="-120"/>
+                          <a:ea typeface="標楷體" panose="03000509000000000000" pitchFamily="65" charset="-120"/>
+                        </a:rPr>
+                        <a:t>0.22</a:t>
+                      </a:r>
+                      <a:endParaRPr lang="en-US" altLang="zh-TW" sz="1400" b="0" i="0" u="none" strike="noStrike">
+                        <a:solidFill>
+                          <a:srgbClr val="000000"/>
+                        </a:solidFill>
+                        <a:effectLst/>
+                        <a:latin typeface="標楷體" panose="03000509000000000000" pitchFamily="65" charset="-120"/>
+                        <a:ea typeface="標楷體" panose="03000509000000000000" pitchFamily="65" charset="-120"/>
+                      </a:endParaRPr>
+                    </a:p>
+                  </a:txBody>
+                  <a:tcPr marL="9525" marR="9525" marT="9525" marB="0" anchor="b"/>
+                </a:tc>
+                <a:tc>
+                  <a:txBody>
+                    <a:bodyPr/>
+                    <a:lstStyle/>
+                    <a:p>
+                      <a:pPr algn="r" fontAlgn="b"/>
+                      <a:r>
+                        <a:rPr lang="en-US" altLang="zh-TW" sz="1400" u="none" strike="noStrike">
+                          <a:effectLst/>
+                          <a:latin typeface="標楷體" panose="03000509000000000000" pitchFamily="65" charset="-120"/>
+                          <a:ea typeface="標楷體" panose="03000509000000000000" pitchFamily="65" charset="-120"/>
+                        </a:rPr>
+                        <a:t>0.25</a:t>
+                      </a:r>
+                      <a:endParaRPr lang="en-US" altLang="zh-TW" sz="1400" b="0" i="0" u="none" strike="noStrike">
+                        <a:solidFill>
+                          <a:srgbClr val="000000"/>
+                        </a:solidFill>
+                        <a:effectLst/>
+                        <a:latin typeface="標楷體" panose="03000509000000000000" pitchFamily="65" charset="-120"/>
+                        <a:ea typeface="標楷體" panose="03000509000000000000" pitchFamily="65" charset="-120"/>
+                      </a:endParaRPr>
+                    </a:p>
+                  </a:txBody>
+                  <a:tcPr marL="9525" marR="9525" marT="9525" marB="0" anchor="b"/>
+                </a:tc>
+                <a:tc>
+                  <a:txBody>
+                    <a:bodyPr/>
+                    <a:lstStyle/>
+                    <a:p>
+                      <a:pPr algn="r" fontAlgn="b"/>
+                      <a:r>
+                        <a:rPr lang="en-US" altLang="zh-TW" sz="1400" u="none" strike="noStrike">
+                          <a:effectLst/>
+                          <a:latin typeface="標楷體" panose="03000509000000000000" pitchFamily="65" charset="-120"/>
+                          <a:ea typeface="標楷體" panose="03000509000000000000" pitchFamily="65" charset="-120"/>
+                        </a:rPr>
+                        <a:t>0.235</a:t>
+                      </a:r>
+                      <a:endParaRPr lang="en-US" altLang="zh-TW" sz="1400" b="0" i="0" u="none" strike="noStrike">
+                        <a:solidFill>
+                          <a:srgbClr val="000000"/>
+                        </a:solidFill>
+                        <a:effectLst/>
+                        <a:latin typeface="標楷體" panose="03000509000000000000" pitchFamily="65" charset="-120"/>
+                        <a:ea typeface="標楷體" panose="03000509000000000000" pitchFamily="65" charset="-120"/>
+                      </a:endParaRPr>
+                    </a:p>
+                  </a:txBody>
+                  <a:tcPr marL="9525" marR="9525" marT="9525" marB="0" anchor="b"/>
+                </a:tc>
+                <a:tc>
+                  <a:txBody>
+                    <a:bodyPr/>
+                    <a:lstStyle/>
+                    <a:p>
+                      <a:pPr algn="r" fontAlgn="b"/>
+                      <a:r>
+                        <a:rPr lang="en-US" altLang="zh-TW" sz="1400" u="none" strike="noStrike">
+                          <a:effectLst/>
+                          <a:latin typeface="標楷體" panose="03000509000000000000" pitchFamily="65" charset="-120"/>
+                          <a:ea typeface="標楷體" panose="03000509000000000000" pitchFamily="65" charset="-120"/>
+                        </a:rPr>
+                        <a:t>0.278</a:t>
+                      </a:r>
+                      <a:endParaRPr lang="en-US" altLang="zh-TW" sz="1400" b="0" i="0" u="none" strike="noStrike">
+                        <a:solidFill>
+                          <a:srgbClr val="000000"/>
+                        </a:solidFill>
+                        <a:effectLst/>
+                        <a:latin typeface="標楷體" panose="03000509000000000000" pitchFamily="65" charset="-120"/>
+                        <a:ea typeface="標楷體" panose="03000509000000000000" pitchFamily="65" charset="-120"/>
+                      </a:endParaRPr>
+                    </a:p>
+                  </a:txBody>
+                  <a:tcPr marL="9525" marR="9525" marT="9525" marB="0" anchor="b"/>
+                </a:tc>
+                <a:tc>
+                  <a:txBody>
+                    <a:bodyPr/>
+                    <a:lstStyle/>
+                    <a:p>
+                      <a:pPr algn="r" fontAlgn="b"/>
+                      <a:r>
+                        <a:rPr lang="en-US" altLang="zh-TW" sz="1400" u="none" strike="noStrike" dirty="0">
+                          <a:effectLst/>
+                          <a:latin typeface="標楷體" panose="03000509000000000000" pitchFamily="65" charset="-120"/>
+                          <a:ea typeface="標楷體" panose="03000509000000000000" pitchFamily="65" charset="-120"/>
+                        </a:rPr>
+                        <a:t>0.12</a:t>
+                      </a:r>
+                      <a:endParaRPr lang="en-US" altLang="zh-TW" sz="1400" b="0" i="0" u="none" strike="noStrike" dirty="0">
+                        <a:solidFill>
+                          <a:srgbClr val="000000"/>
+                        </a:solidFill>
+                        <a:effectLst/>
+                        <a:latin typeface="標楷體" panose="03000509000000000000" pitchFamily="65" charset="-120"/>
+                        <a:ea typeface="標楷體" panose="03000509000000000000" pitchFamily="65" charset="-120"/>
+                      </a:endParaRPr>
+                    </a:p>
+                  </a:txBody>
+                  <a:tcPr marL="9525" marR="9525" marT="9525" marB="0" anchor="b"/>
+                </a:tc>
+                <a:tc>
+                  <a:txBody>
+                    <a:bodyPr/>
+                    <a:lstStyle/>
+                    <a:p>
+                      <a:pPr algn="r" fontAlgn="b"/>
+                      <a:r>
+                        <a:rPr lang="en-US" altLang="zh-TW" sz="1400" u="none" strike="noStrike" dirty="0">
+                          <a:effectLst/>
+                          <a:latin typeface="標楷體" panose="03000509000000000000" pitchFamily="65" charset="-120"/>
+                          <a:ea typeface="標楷體" panose="03000509000000000000" pitchFamily="65" charset="-120"/>
+                        </a:rPr>
+                        <a:t>0.061</a:t>
+                      </a:r>
+                      <a:endParaRPr lang="en-US" altLang="zh-TW" sz="1400" b="0" i="0" u="none" strike="noStrike" dirty="0">
+                        <a:solidFill>
+                          <a:srgbClr val="000000"/>
+                        </a:solidFill>
+                        <a:effectLst/>
+                        <a:latin typeface="標楷體" panose="03000509000000000000" pitchFamily="65" charset="-120"/>
+                        <a:ea typeface="標楷體" panose="03000509000000000000" pitchFamily="65" charset="-120"/>
+                      </a:endParaRPr>
+                    </a:p>
+                  </a:txBody>
+                  <a:tcPr marL="9525" marR="9525" marT="9525" marB="0" anchor="b"/>
+                </a:tc>
+                <a:tc>
+                  <a:txBody>
+                    <a:bodyPr/>
+                    <a:lstStyle/>
+                    <a:p>
+                      <a:pPr algn="r" fontAlgn="b"/>
+                      <a:r>
+                        <a:rPr lang="en-US" altLang="zh-TW" sz="1400" u="none" strike="noStrike">
+                          <a:effectLst/>
+                          <a:latin typeface="標楷體" panose="03000509000000000000" pitchFamily="65" charset="-120"/>
+                          <a:ea typeface="標楷體" panose="03000509000000000000" pitchFamily="65" charset="-120"/>
+                        </a:rPr>
+                        <a:t>0.039</a:t>
+                      </a:r>
+                      <a:endParaRPr lang="en-US" altLang="zh-TW" sz="1400" b="0" i="0" u="none" strike="noStrike">
+                        <a:solidFill>
+                          <a:srgbClr val="000000"/>
+                        </a:solidFill>
+                        <a:effectLst/>
+                        <a:latin typeface="標楷體" panose="03000509000000000000" pitchFamily="65" charset="-120"/>
+                        <a:ea typeface="標楷體" panose="03000509000000000000" pitchFamily="65" charset="-120"/>
+                      </a:endParaRPr>
+                    </a:p>
+                  </a:txBody>
+                  <a:tcPr marL="9525" marR="9525" marT="9525" marB="0" anchor="b"/>
+                </a:tc>
+                <a:tc>
+                  <a:txBody>
+                    <a:bodyPr/>
+                    <a:lstStyle/>
+                    <a:p>
+                      <a:pPr algn="r" fontAlgn="b"/>
+                      <a:r>
+                        <a:rPr lang="en-US" altLang="zh-TW" sz="1400" u="none" strike="noStrike">
+                          <a:effectLst/>
+                          <a:latin typeface="標楷體" panose="03000509000000000000" pitchFamily="65" charset="-120"/>
+                          <a:ea typeface="標楷體" panose="03000509000000000000" pitchFamily="65" charset="-120"/>
+                        </a:rPr>
+                        <a:t>0.033</a:t>
+                      </a:r>
+                      <a:endParaRPr lang="en-US" altLang="zh-TW" sz="1400" b="0" i="0" u="none" strike="noStrike">
+                        <a:solidFill>
+                          <a:srgbClr val="000000"/>
+                        </a:solidFill>
+                        <a:effectLst/>
+                        <a:latin typeface="標楷體" panose="03000509000000000000" pitchFamily="65" charset="-120"/>
+                        <a:ea typeface="標楷體" panose="03000509000000000000" pitchFamily="65" charset="-120"/>
+                      </a:endParaRPr>
+                    </a:p>
+                  </a:txBody>
+                  <a:tcPr marL="9525" marR="9525" marT="9525" marB="0" anchor="b"/>
+                </a:tc>
+                <a:tc>
+                  <a:txBody>
+                    <a:bodyPr/>
+                    <a:lstStyle/>
+                    <a:p>
+                      <a:pPr algn="r" fontAlgn="b"/>
+                      <a:r>
+                        <a:rPr lang="en-US" altLang="zh-TW" sz="1400" u="none" strike="noStrike">
+                          <a:effectLst/>
+                          <a:latin typeface="標楷體" panose="03000509000000000000" pitchFamily="65" charset="-120"/>
+                          <a:ea typeface="標楷體" panose="03000509000000000000" pitchFamily="65" charset="-120"/>
+                        </a:rPr>
+                        <a:t>0.024</a:t>
+                      </a:r>
+                      <a:endParaRPr lang="en-US" altLang="zh-TW" sz="1400" b="0" i="0" u="none" strike="noStrike">
+                        <a:solidFill>
+                          <a:srgbClr val="000000"/>
+                        </a:solidFill>
+                        <a:effectLst/>
+                        <a:latin typeface="標楷體" panose="03000509000000000000" pitchFamily="65" charset="-120"/>
+                        <a:ea typeface="標楷體" panose="03000509000000000000" pitchFamily="65" charset="-120"/>
+                      </a:endParaRPr>
+                    </a:p>
+                  </a:txBody>
+                  <a:tcPr marL="9525" marR="9525" marT="9525" marB="0" anchor="b"/>
+                </a:tc>
+                <a:extLst>
+                  <a:ext uri="{0D108BD9-81ED-4DB2-BD59-A6C34878D82A}">
+                    <a16:rowId xmlns:a16="http://schemas.microsoft.com/office/drawing/2014/main" val="2958517933"/>
+                  </a:ext>
+                </a:extLst>
+              </a:tr>
+              <a:tr h="245886">
+                <a:tc>
+                  <a:txBody>
+                    <a:bodyPr/>
+                    <a:lstStyle/>
+                    <a:p>
+                      <a:pPr algn="l" fontAlgn="b"/>
+                      <a:r>
+                        <a:rPr lang="zh-TW" altLang="en-US" sz="1600" u="none" strike="noStrike">
+                          <a:effectLst/>
+                          <a:latin typeface="標楷體" panose="03000509000000000000" pitchFamily="65" charset="-120"/>
+                          <a:ea typeface="標楷體" panose="03000509000000000000" pitchFamily="65" charset="-120"/>
+                        </a:rPr>
+                        <a:t>增益</a:t>
+                      </a:r>
+                      <a:endParaRPr lang="zh-TW" altLang="en-US" sz="1600" b="0" i="0" u="none" strike="noStrike">
+                        <a:solidFill>
+                          <a:srgbClr val="000000"/>
+                        </a:solidFill>
+                        <a:effectLst/>
+                        <a:latin typeface="標楷體" panose="03000509000000000000" pitchFamily="65" charset="-120"/>
+                        <a:ea typeface="標楷體" panose="03000509000000000000" pitchFamily="65" charset="-120"/>
+                      </a:endParaRPr>
+                    </a:p>
+                  </a:txBody>
+                  <a:tcPr marL="9525" marR="9525" marT="9525" marB="0" anchor="b"/>
+                </a:tc>
+                <a:tc>
+                  <a:txBody>
+                    <a:bodyPr/>
+                    <a:lstStyle/>
+                    <a:p>
+                      <a:pPr algn="r" fontAlgn="b"/>
+                      <a:r>
+                        <a:rPr lang="en-US" altLang="zh-TW" sz="1400" u="none" strike="noStrike">
+                          <a:effectLst/>
+                          <a:latin typeface="標楷體" panose="03000509000000000000" pitchFamily="65" charset="-120"/>
+                          <a:ea typeface="標楷體" panose="03000509000000000000" pitchFamily="65" charset="-120"/>
+                        </a:rPr>
+                        <a:t>0.96</a:t>
+                      </a:r>
+                      <a:endParaRPr lang="en-US" altLang="zh-TW" sz="1400" b="0" i="0" u="none" strike="noStrike">
+                        <a:solidFill>
+                          <a:srgbClr val="000000"/>
+                        </a:solidFill>
+                        <a:effectLst/>
+                        <a:latin typeface="標楷體" panose="03000509000000000000" pitchFamily="65" charset="-120"/>
+                        <a:ea typeface="標楷體" panose="03000509000000000000" pitchFamily="65" charset="-120"/>
+                      </a:endParaRPr>
+                    </a:p>
+                  </a:txBody>
+                  <a:tcPr marL="9525" marR="9525" marT="9525" marB="0" anchor="b"/>
+                </a:tc>
+                <a:tc>
+                  <a:txBody>
+                    <a:bodyPr/>
+                    <a:lstStyle/>
+                    <a:p>
+                      <a:pPr algn="r" fontAlgn="b"/>
+                      <a:r>
+                        <a:rPr lang="en-US" altLang="zh-TW" sz="1400" u="none" strike="noStrike">
+                          <a:effectLst/>
+                          <a:latin typeface="標楷體" panose="03000509000000000000" pitchFamily="65" charset="-120"/>
+                          <a:ea typeface="標楷體" panose="03000509000000000000" pitchFamily="65" charset="-120"/>
+                        </a:rPr>
+                        <a:t>0.99</a:t>
+                      </a:r>
+                      <a:endParaRPr lang="en-US" altLang="zh-TW" sz="1400" b="0" i="0" u="none" strike="noStrike">
+                        <a:solidFill>
+                          <a:srgbClr val="000000"/>
+                        </a:solidFill>
+                        <a:effectLst/>
+                        <a:latin typeface="標楷體" panose="03000509000000000000" pitchFamily="65" charset="-120"/>
+                        <a:ea typeface="標楷體" panose="03000509000000000000" pitchFamily="65" charset="-120"/>
+                      </a:endParaRPr>
+                    </a:p>
+                  </a:txBody>
+                  <a:tcPr marL="9525" marR="9525" marT="9525" marB="0" anchor="b"/>
+                </a:tc>
+                <a:tc>
+                  <a:txBody>
+                    <a:bodyPr/>
+                    <a:lstStyle/>
+                    <a:p>
+                      <a:pPr algn="r" fontAlgn="b"/>
+                      <a:r>
+                        <a:rPr lang="en-US" altLang="zh-TW" sz="1400" u="none" strike="noStrike">
+                          <a:effectLst/>
+                          <a:latin typeface="標楷體" panose="03000509000000000000" pitchFamily="65" charset="-120"/>
+                          <a:ea typeface="標楷體" panose="03000509000000000000" pitchFamily="65" charset="-120"/>
+                        </a:rPr>
+                        <a:t>0.84</a:t>
+                      </a:r>
+                      <a:endParaRPr lang="en-US" altLang="zh-TW" sz="1400" b="0" i="0" u="none" strike="noStrike">
+                        <a:solidFill>
+                          <a:srgbClr val="000000"/>
+                        </a:solidFill>
+                        <a:effectLst/>
+                        <a:latin typeface="標楷體" panose="03000509000000000000" pitchFamily="65" charset="-120"/>
+                        <a:ea typeface="標楷體" panose="03000509000000000000" pitchFamily="65" charset="-120"/>
+                      </a:endParaRPr>
+                    </a:p>
+                  </a:txBody>
+                  <a:tcPr marL="9525" marR="9525" marT="9525" marB="0" anchor="b"/>
+                </a:tc>
+                <a:tc>
+                  <a:txBody>
+                    <a:bodyPr/>
+                    <a:lstStyle/>
+                    <a:p>
+                      <a:pPr algn="r" fontAlgn="b"/>
+                      <a:r>
+                        <a:rPr lang="en-US" altLang="zh-TW" sz="1400" u="none" strike="noStrike">
+                          <a:effectLst/>
+                          <a:latin typeface="標楷體" panose="03000509000000000000" pitchFamily="65" charset="-120"/>
+                          <a:ea typeface="標楷體" panose="03000509000000000000" pitchFamily="65" charset="-120"/>
+                        </a:rPr>
+                        <a:t>0.58</a:t>
+                      </a:r>
+                      <a:endParaRPr lang="en-US" altLang="zh-TW" sz="1400" b="0" i="0" u="none" strike="noStrike">
+                        <a:solidFill>
+                          <a:srgbClr val="000000"/>
+                        </a:solidFill>
+                        <a:effectLst/>
+                        <a:latin typeface="標楷體" panose="03000509000000000000" pitchFamily="65" charset="-120"/>
+                        <a:ea typeface="標楷體" panose="03000509000000000000" pitchFamily="65" charset="-120"/>
+                      </a:endParaRPr>
+                    </a:p>
+                  </a:txBody>
+                  <a:tcPr marL="9525" marR="9525" marT="9525" marB="0" anchor="b"/>
+                </a:tc>
+                <a:tc>
+                  <a:txBody>
+                    <a:bodyPr/>
+                    <a:lstStyle/>
+                    <a:p>
+                      <a:pPr algn="r" fontAlgn="b"/>
+                      <a:r>
+                        <a:rPr lang="en-US" altLang="zh-TW" sz="1400" u="none" strike="noStrike">
+                          <a:effectLst/>
+                          <a:latin typeface="標楷體" panose="03000509000000000000" pitchFamily="65" charset="-120"/>
+                          <a:ea typeface="標楷體" panose="03000509000000000000" pitchFamily="65" charset="-120"/>
+                        </a:rPr>
+                        <a:t>0.45</a:t>
+                      </a:r>
+                      <a:endParaRPr lang="en-US" altLang="zh-TW" sz="1400" b="0" i="0" u="none" strike="noStrike">
+                        <a:solidFill>
+                          <a:srgbClr val="000000"/>
+                        </a:solidFill>
+                        <a:effectLst/>
+                        <a:latin typeface="標楷體" panose="03000509000000000000" pitchFamily="65" charset="-120"/>
+                        <a:ea typeface="標楷體" panose="03000509000000000000" pitchFamily="65" charset="-120"/>
+                      </a:endParaRPr>
+                    </a:p>
+                  </a:txBody>
+                  <a:tcPr marL="9525" marR="9525" marT="9525" marB="0" anchor="b"/>
+                </a:tc>
+                <a:tc>
+                  <a:txBody>
+                    <a:bodyPr/>
+                    <a:lstStyle/>
+                    <a:p>
+                      <a:pPr algn="r" fontAlgn="b"/>
+                      <a:r>
+                        <a:rPr lang="en-US" altLang="zh-TW" sz="1400" u="none" strike="noStrike">
+                          <a:effectLst/>
+                          <a:latin typeface="標楷體" panose="03000509000000000000" pitchFamily="65" charset="-120"/>
+                          <a:ea typeface="標楷體" panose="03000509000000000000" pitchFamily="65" charset="-120"/>
+                        </a:rPr>
+                        <a:t>0.36</a:t>
+                      </a:r>
+                      <a:endParaRPr lang="en-US" altLang="zh-TW" sz="1400" b="0" i="0" u="none" strike="noStrike">
+                        <a:solidFill>
+                          <a:srgbClr val="000000"/>
+                        </a:solidFill>
+                        <a:effectLst/>
+                        <a:latin typeface="標楷體" panose="03000509000000000000" pitchFamily="65" charset="-120"/>
+                        <a:ea typeface="標楷體" panose="03000509000000000000" pitchFamily="65" charset="-120"/>
+                      </a:endParaRPr>
+                    </a:p>
+                  </a:txBody>
+                  <a:tcPr marL="9525" marR="9525" marT="9525" marB="0" anchor="b"/>
+                </a:tc>
+                <a:tc>
+                  <a:txBody>
+                    <a:bodyPr/>
+                    <a:lstStyle/>
+                    <a:p>
+                      <a:pPr algn="r" fontAlgn="b"/>
+                      <a:r>
+                        <a:rPr lang="en-US" altLang="zh-TW" sz="1400" u="none" strike="noStrike">
+                          <a:effectLst/>
+                          <a:latin typeface="標楷體" panose="03000509000000000000" pitchFamily="65" charset="-120"/>
+                          <a:ea typeface="標楷體" panose="03000509000000000000" pitchFamily="65" charset="-120"/>
+                        </a:rPr>
+                        <a:t>0.21</a:t>
+                      </a:r>
+                      <a:endParaRPr lang="en-US" altLang="zh-TW" sz="1400" b="0" i="0" u="none" strike="noStrike">
+                        <a:solidFill>
+                          <a:srgbClr val="000000"/>
+                        </a:solidFill>
+                        <a:effectLst/>
+                        <a:latin typeface="標楷體" panose="03000509000000000000" pitchFamily="65" charset="-120"/>
+                        <a:ea typeface="標楷體" panose="03000509000000000000" pitchFamily="65" charset="-120"/>
+                      </a:endParaRPr>
+                    </a:p>
+                  </a:txBody>
+                  <a:tcPr marL="9525" marR="9525" marT="9525" marB="0" anchor="b"/>
+                </a:tc>
+                <a:tc>
+                  <a:txBody>
+                    <a:bodyPr/>
+                    <a:lstStyle/>
+                    <a:p>
+                      <a:pPr algn="r" fontAlgn="b"/>
+                      <a:r>
+                        <a:rPr lang="en-US" altLang="zh-TW" sz="1400" u="none" strike="noStrike">
+                          <a:effectLst/>
+                          <a:latin typeface="標楷體" panose="03000509000000000000" pitchFamily="65" charset="-120"/>
+                          <a:ea typeface="標楷體" panose="03000509000000000000" pitchFamily="65" charset="-120"/>
+                        </a:rPr>
+                        <a:t>0.126</a:t>
+                      </a:r>
+                      <a:endParaRPr lang="en-US" altLang="zh-TW" sz="1400" b="0" i="0" u="none" strike="noStrike">
+                        <a:solidFill>
+                          <a:srgbClr val="000000"/>
+                        </a:solidFill>
+                        <a:effectLst/>
+                        <a:latin typeface="標楷體" panose="03000509000000000000" pitchFamily="65" charset="-120"/>
+                        <a:ea typeface="標楷體" panose="03000509000000000000" pitchFamily="65" charset="-120"/>
+                      </a:endParaRPr>
+                    </a:p>
+                  </a:txBody>
+                  <a:tcPr marL="9525" marR="9525" marT="9525" marB="0" anchor="b"/>
+                </a:tc>
+                <a:tc>
+                  <a:txBody>
+                    <a:bodyPr/>
+                    <a:lstStyle/>
+                    <a:p>
+                      <a:pPr algn="r" fontAlgn="b"/>
+                      <a:r>
+                        <a:rPr lang="en-US" altLang="zh-TW" sz="1400" u="none" strike="noStrike" dirty="0">
+                          <a:effectLst/>
+                          <a:latin typeface="標楷體" panose="03000509000000000000" pitchFamily="65" charset="-120"/>
+                          <a:ea typeface="標楷體" panose="03000509000000000000" pitchFamily="65" charset="-120"/>
+                        </a:rPr>
+                        <a:t>0.076</a:t>
+                      </a:r>
+                      <a:endParaRPr lang="en-US" altLang="zh-TW" sz="1400" b="0" i="0" u="none" strike="noStrike" dirty="0">
+                        <a:solidFill>
+                          <a:srgbClr val="000000"/>
+                        </a:solidFill>
+                        <a:effectLst/>
+                        <a:latin typeface="標楷體" panose="03000509000000000000" pitchFamily="65" charset="-120"/>
+                        <a:ea typeface="標楷體" panose="03000509000000000000" pitchFamily="65" charset="-120"/>
+                      </a:endParaRPr>
+                    </a:p>
+                  </a:txBody>
+                  <a:tcPr marL="9525" marR="9525" marT="9525" marB="0" anchor="b"/>
+                </a:tc>
+                <a:tc>
+                  <a:txBody>
+                    <a:bodyPr/>
+                    <a:lstStyle/>
+                    <a:p>
+                      <a:pPr algn="r" fontAlgn="b"/>
+                      <a:r>
+                        <a:rPr lang="en-US" altLang="zh-TW" sz="1400" u="none" strike="noStrike" dirty="0">
+                          <a:effectLst/>
+                          <a:latin typeface="標楷體" panose="03000509000000000000" pitchFamily="65" charset="-120"/>
+                          <a:ea typeface="標楷體" panose="03000509000000000000" pitchFamily="65" charset="-120"/>
+                        </a:rPr>
+                        <a:t>0.119</a:t>
+                      </a:r>
+                      <a:endParaRPr lang="en-US" altLang="zh-TW" sz="1400" b="0" i="0" u="none" strike="noStrike" dirty="0">
+                        <a:solidFill>
+                          <a:srgbClr val="000000"/>
+                        </a:solidFill>
+                        <a:effectLst/>
+                        <a:latin typeface="標楷體" panose="03000509000000000000" pitchFamily="65" charset="-120"/>
+                        <a:ea typeface="標楷體" panose="03000509000000000000" pitchFamily="65" charset="-120"/>
+                      </a:endParaRPr>
+                    </a:p>
+                  </a:txBody>
+                  <a:tcPr marL="9525" marR="9525" marT="9525" marB="0" anchor="b"/>
+                </a:tc>
+                <a:tc>
+                  <a:txBody>
+                    <a:bodyPr/>
+                    <a:lstStyle/>
+                    <a:p>
+                      <a:pPr algn="r" fontAlgn="b"/>
+                      <a:r>
+                        <a:rPr lang="en-US" altLang="zh-TW" sz="1400" u="none" strike="noStrike">
+                          <a:effectLst/>
+                          <a:latin typeface="標楷體" panose="03000509000000000000" pitchFamily="65" charset="-120"/>
+                          <a:ea typeface="標楷體" panose="03000509000000000000" pitchFamily="65" charset="-120"/>
+                        </a:rPr>
+                        <a:t>0.12</a:t>
+                      </a:r>
+                      <a:endParaRPr lang="en-US" altLang="zh-TW" sz="1400" b="0" i="0" u="none" strike="noStrike">
+                        <a:solidFill>
+                          <a:srgbClr val="000000"/>
+                        </a:solidFill>
+                        <a:effectLst/>
+                        <a:latin typeface="標楷體" panose="03000509000000000000" pitchFamily="65" charset="-120"/>
+                        <a:ea typeface="標楷體" panose="03000509000000000000" pitchFamily="65" charset="-120"/>
+                      </a:endParaRPr>
+                    </a:p>
+                  </a:txBody>
+                  <a:tcPr marL="9525" marR="9525" marT="9525" marB="0" anchor="b"/>
+                </a:tc>
+                <a:extLst>
+                  <a:ext uri="{0D108BD9-81ED-4DB2-BD59-A6C34878D82A}">
+                    <a16:rowId xmlns:a16="http://schemas.microsoft.com/office/drawing/2014/main" val="65979916"/>
+                  </a:ext>
+                </a:extLst>
+              </a:tr>
+              <a:tr h="245886">
+                <a:tc>
+                  <a:txBody>
+                    <a:bodyPr/>
+                    <a:lstStyle/>
+                    <a:p>
+                      <a:pPr algn="l" fontAlgn="b"/>
+                      <a:r>
+                        <a:rPr lang="zh-TW" altLang="en-US" sz="1600" u="none" strike="noStrike">
+                          <a:effectLst/>
+                          <a:latin typeface="標楷體" panose="03000509000000000000" pitchFamily="65" charset="-120"/>
+                          <a:ea typeface="標楷體" panose="03000509000000000000" pitchFamily="65" charset="-120"/>
+                        </a:rPr>
+                        <a:t>增益</a:t>
+                      </a:r>
+                      <a:r>
+                        <a:rPr lang="en-US" altLang="zh-TW" sz="1600" u="none" strike="noStrike">
+                          <a:effectLst/>
+                          <a:latin typeface="標楷體" panose="03000509000000000000" pitchFamily="65" charset="-120"/>
+                          <a:ea typeface="標楷體" panose="03000509000000000000" pitchFamily="65" charset="-120"/>
+                        </a:rPr>
+                        <a:t>(</a:t>
+                      </a:r>
+                      <a:r>
+                        <a:rPr lang="en-US" sz="1600" u="none" strike="noStrike">
+                          <a:effectLst/>
+                          <a:latin typeface="標楷體" panose="03000509000000000000" pitchFamily="65" charset="-120"/>
+                          <a:ea typeface="標楷體" panose="03000509000000000000" pitchFamily="65" charset="-120"/>
+                        </a:rPr>
+                        <a:t>db)</a:t>
+                      </a:r>
+                      <a:endParaRPr lang="en-US" sz="1600" b="0" i="0" u="none" strike="noStrike">
+                        <a:solidFill>
+                          <a:srgbClr val="000000"/>
+                        </a:solidFill>
+                        <a:effectLst/>
+                        <a:latin typeface="標楷體" panose="03000509000000000000" pitchFamily="65" charset="-120"/>
+                        <a:ea typeface="標楷體" panose="03000509000000000000" pitchFamily="65" charset="-120"/>
+                      </a:endParaRPr>
+                    </a:p>
+                  </a:txBody>
+                  <a:tcPr marL="9525" marR="9525" marT="9525" marB="0" anchor="b"/>
+                </a:tc>
+                <a:tc>
+                  <a:txBody>
+                    <a:bodyPr/>
+                    <a:lstStyle/>
+                    <a:p>
+                      <a:pPr algn="r" fontAlgn="b"/>
+                      <a:r>
+                        <a:rPr lang="en-US" altLang="zh-TW" sz="1400" u="none" strike="noStrike">
+                          <a:effectLst/>
+                          <a:latin typeface="標楷體" panose="03000509000000000000" pitchFamily="65" charset="-120"/>
+                          <a:ea typeface="標楷體" panose="03000509000000000000" pitchFamily="65" charset="-120"/>
+                        </a:rPr>
+                        <a:t>-0.35</a:t>
+                      </a:r>
+                      <a:endParaRPr lang="en-US" altLang="zh-TW" sz="1400" b="0" i="0" u="none" strike="noStrike">
+                        <a:solidFill>
+                          <a:srgbClr val="000000"/>
+                        </a:solidFill>
+                        <a:effectLst/>
+                        <a:latin typeface="標楷體" panose="03000509000000000000" pitchFamily="65" charset="-120"/>
+                        <a:ea typeface="標楷體" panose="03000509000000000000" pitchFamily="65" charset="-120"/>
+                      </a:endParaRPr>
+                    </a:p>
+                  </a:txBody>
+                  <a:tcPr marL="9525" marR="9525" marT="9525" marB="0" anchor="b"/>
+                </a:tc>
+                <a:tc>
+                  <a:txBody>
+                    <a:bodyPr/>
+                    <a:lstStyle/>
+                    <a:p>
+                      <a:pPr algn="r" fontAlgn="b"/>
+                      <a:r>
+                        <a:rPr lang="en-US" altLang="zh-TW" sz="1400" u="none" strike="noStrike" dirty="0">
+                          <a:effectLst/>
+                          <a:latin typeface="標楷體" panose="03000509000000000000" pitchFamily="65" charset="-120"/>
+                          <a:ea typeface="標楷體" panose="03000509000000000000" pitchFamily="65" charset="-120"/>
+                        </a:rPr>
+                        <a:t>-0.09</a:t>
+                      </a:r>
+                      <a:endParaRPr lang="en-US" altLang="zh-TW" sz="1400" b="0" i="0" u="none" strike="noStrike" dirty="0">
+                        <a:solidFill>
+                          <a:srgbClr val="000000"/>
+                        </a:solidFill>
+                        <a:effectLst/>
+                        <a:latin typeface="標楷體" panose="03000509000000000000" pitchFamily="65" charset="-120"/>
+                        <a:ea typeface="標楷體" panose="03000509000000000000" pitchFamily="65" charset="-120"/>
+                      </a:endParaRPr>
+                    </a:p>
+                  </a:txBody>
+                  <a:tcPr marL="9525" marR="9525" marT="9525" marB="0" anchor="b"/>
+                </a:tc>
+                <a:tc>
+                  <a:txBody>
+                    <a:bodyPr/>
+                    <a:lstStyle/>
+                    <a:p>
+                      <a:pPr algn="r" fontAlgn="b"/>
+                      <a:r>
+                        <a:rPr lang="en-US" altLang="zh-TW" sz="1400" u="none" strike="noStrike">
+                          <a:effectLst/>
+                          <a:latin typeface="標楷體" panose="03000509000000000000" pitchFamily="65" charset="-120"/>
+                          <a:ea typeface="標楷體" panose="03000509000000000000" pitchFamily="65" charset="-120"/>
+                        </a:rPr>
+                        <a:t>-1.5</a:t>
+                      </a:r>
+                      <a:endParaRPr lang="en-US" altLang="zh-TW" sz="1400" b="0" i="0" u="none" strike="noStrike">
+                        <a:solidFill>
+                          <a:srgbClr val="000000"/>
+                        </a:solidFill>
+                        <a:effectLst/>
+                        <a:latin typeface="標楷體" panose="03000509000000000000" pitchFamily="65" charset="-120"/>
+                        <a:ea typeface="標楷體" panose="03000509000000000000" pitchFamily="65" charset="-120"/>
+                      </a:endParaRPr>
+                    </a:p>
+                  </a:txBody>
+                  <a:tcPr marL="9525" marR="9525" marT="9525" marB="0" anchor="b"/>
+                </a:tc>
+                <a:tc>
+                  <a:txBody>
+                    <a:bodyPr/>
+                    <a:lstStyle/>
+                    <a:p>
+                      <a:pPr algn="r" fontAlgn="b"/>
+                      <a:r>
+                        <a:rPr lang="en-US" altLang="zh-TW" sz="1400" u="none" strike="noStrike">
+                          <a:effectLst/>
+                          <a:latin typeface="標楷體" panose="03000509000000000000" pitchFamily="65" charset="-120"/>
+                          <a:ea typeface="標楷體" panose="03000509000000000000" pitchFamily="65" charset="-120"/>
+                        </a:rPr>
+                        <a:t>-4.7</a:t>
+                      </a:r>
+                      <a:endParaRPr lang="en-US" altLang="zh-TW" sz="1400" b="0" i="0" u="none" strike="noStrike">
+                        <a:solidFill>
+                          <a:srgbClr val="000000"/>
+                        </a:solidFill>
+                        <a:effectLst/>
+                        <a:latin typeface="標楷體" panose="03000509000000000000" pitchFamily="65" charset="-120"/>
+                        <a:ea typeface="標楷體" panose="03000509000000000000" pitchFamily="65" charset="-120"/>
+                      </a:endParaRPr>
+                    </a:p>
+                  </a:txBody>
+                  <a:tcPr marL="9525" marR="9525" marT="9525" marB="0" anchor="b"/>
+                </a:tc>
+                <a:tc>
+                  <a:txBody>
+                    <a:bodyPr/>
+                    <a:lstStyle/>
+                    <a:p>
+                      <a:pPr algn="r" fontAlgn="b"/>
+                      <a:r>
+                        <a:rPr lang="en-US" altLang="zh-TW" sz="1400" u="none" strike="noStrike">
+                          <a:effectLst/>
+                          <a:latin typeface="標楷體" panose="03000509000000000000" pitchFamily="65" charset="-120"/>
+                          <a:ea typeface="標楷體" panose="03000509000000000000" pitchFamily="65" charset="-120"/>
+                        </a:rPr>
+                        <a:t>-6.9</a:t>
+                      </a:r>
+                      <a:endParaRPr lang="en-US" altLang="zh-TW" sz="1400" b="0" i="0" u="none" strike="noStrike">
+                        <a:solidFill>
+                          <a:srgbClr val="000000"/>
+                        </a:solidFill>
+                        <a:effectLst/>
+                        <a:latin typeface="標楷體" panose="03000509000000000000" pitchFamily="65" charset="-120"/>
+                        <a:ea typeface="標楷體" panose="03000509000000000000" pitchFamily="65" charset="-120"/>
+                      </a:endParaRPr>
+                    </a:p>
+                  </a:txBody>
+                  <a:tcPr marL="9525" marR="9525" marT="9525" marB="0" anchor="b"/>
+                </a:tc>
+                <a:tc>
+                  <a:txBody>
+                    <a:bodyPr/>
+                    <a:lstStyle/>
+                    <a:p>
+                      <a:pPr algn="r" fontAlgn="b"/>
+                      <a:r>
+                        <a:rPr lang="en-US" altLang="zh-TW" sz="1400" u="none" strike="noStrike">
+                          <a:effectLst/>
+                          <a:latin typeface="標楷體" panose="03000509000000000000" pitchFamily="65" charset="-120"/>
+                          <a:ea typeface="標楷體" panose="03000509000000000000" pitchFamily="65" charset="-120"/>
+                        </a:rPr>
+                        <a:t>-8.9</a:t>
+                      </a:r>
+                      <a:endParaRPr lang="en-US" altLang="zh-TW" sz="1400" b="0" i="0" u="none" strike="noStrike">
+                        <a:solidFill>
+                          <a:srgbClr val="000000"/>
+                        </a:solidFill>
+                        <a:effectLst/>
+                        <a:latin typeface="標楷體" panose="03000509000000000000" pitchFamily="65" charset="-120"/>
+                        <a:ea typeface="標楷體" panose="03000509000000000000" pitchFamily="65" charset="-120"/>
+                      </a:endParaRPr>
+                    </a:p>
+                  </a:txBody>
+                  <a:tcPr marL="9525" marR="9525" marT="9525" marB="0" anchor="b"/>
+                </a:tc>
+                <a:tc>
+                  <a:txBody>
+                    <a:bodyPr/>
+                    <a:lstStyle/>
+                    <a:p>
+                      <a:pPr algn="r" fontAlgn="b"/>
+                      <a:r>
+                        <a:rPr lang="en-US" altLang="zh-TW" sz="1400" u="none" strike="noStrike">
+                          <a:effectLst/>
+                          <a:latin typeface="標楷體" panose="03000509000000000000" pitchFamily="65" charset="-120"/>
+                          <a:ea typeface="標楷體" panose="03000509000000000000" pitchFamily="65" charset="-120"/>
+                        </a:rPr>
+                        <a:t>-13.5</a:t>
+                      </a:r>
+                      <a:endParaRPr lang="en-US" altLang="zh-TW" sz="1400" b="0" i="0" u="none" strike="noStrike">
+                        <a:solidFill>
+                          <a:srgbClr val="000000"/>
+                        </a:solidFill>
+                        <a:effectLst/>
+                        <a:latin typeface="標楷體" panose="03000509000000000000" pitchFamily="65" charset="-120"/>
+                        <a:ea typeface="標楷體" panose="03000509000000000000" pitchFamily="65" charset="-120"/>
+                      </a:endParaRPr>
+                    </a:p>
+                  </a:txBody>
+                  <a:tcPr marL="9525" marR="9525" marT="9525" marB="0" anchor="b"/>
+                </a:tc>
+                <a:tc>
+                  <a:txBody>
+                    <a:bodyPr/>
+                    <a:lstStyle/>
+                    <a:p>
+                      <a:pPr algn="r" fontAlgn="b"/>
+                      <a:r>
+                        <a:rPr lang="en-US" altLang="zh-TW" sz="1400" u="none" strike="noStrike">
+                          <a:effectLst/>
+                          <a:latin typeface="標楷體" panose="03000509000000000000" pitchFamily="65" charset="-120"/>
+                          <a:ea typeface="標楷體" panose="03000509000000000000" pitchFamily="65" charset="-120"/>
+                        </a:rPr>
+                        <a:t>-17.9</a:t>
+                      </a:r>
+                      <a:endParaRPr lang="en-US" altLang="zh-TW" sz="1400" b="0" i="0" u="none" strike="noStrike">
+                        <a:solidFill>
+                          <a:srgbClr val="000000"/>
+                        </a:solidFill>
+                        <a:effectLst/>
+                        <a:latin typeface="標楷體" panose="03000509000000000000" pitchFamily="65" charset="-120"/>
+                        <a:ea typeface="標楷體" panose="03000509000000000000" pitchFamily="65" charset="-120"/>
+                      </a:endParaRPr>
+                    </a:p>
+                  </a:txBody>
+                  <a:tcPr marL="9525" marR="9525" marT="9525" marB="0" anchor="b"/>
+                </a:tc>
+                <a:tc>
+                  <a:txBody>
+                    <a:bodyPr/>
+                    <a:lstStyle/>
+                    <a:p>
+                      <a:pPr algn="r" fontAlgn="b"/>
+                      <a:r>
+                        <a:rPr lang="en-US" altLang="zh-TW" sz="1400" u="none" strike="noStrike" dirty="0">
+                          <a:effectLst/>
+                          <a:latin typeface="標楷體" panose="03000509000000000000" pitchFamily="65" charset="-120"/>
+                          <a:ea typeface="標楷體" panose="03000509000000000000" pitchFamily="65" charset="-120"/>
+                        </a:rPr>
+                        <a:t>-22.4</a:t>
+                      </a:r>
+                      <a:endParaRPr lang="en-US" altLang="zh-TW" sz="1400" b="0" i="0" u="none" strike="noStrike" dirty="0">
+                        <a:solidFill>
+                          <a:srgbClr val="000000"/>
+                        </a:solidFill>
+                        <a:effectLst/>
+                        <a:latin typeface="標楷體" panose="03000509000000000000" pitchFamily="65" charset="-120"/>
+                        <a:ea typeface="標楷體" panose="03000509000000000000" pitchFamily="65" charset="-120"/>
+                      </a:endParaRPr>
+                    </a:p>
+                  </a:txBody>
+                  <a:tcPr marL="9525" marR="9525" marT="9525" marB="0" anchor="b"/>
+                </a:tc>
+                <a:tc>
+                  <a:txBody>
+                    <a:bodyPr/>
+                    <a:lstStyle/>
+                    <a:p>
+                      <a:pPr algn="r" fontAlgn="b"/>
+                      <a:r>
+                        <a:rPr lang="en-US" altLang="zh-TW" sz="1400" u="none" strike="noStrike" dirty="0">
+                          <a:effectLst/>
+                          <a:latin typeface="標楷體" panose="03000509000000000000" pitchFamily="65" charset="-120"/>
+                          <a:ea typeface="標楷體" panose="03000509000000000000" pitchFamily="65" charset="-120"/>
+                        </a:rPr>
+                        <a:t>-18.5</a:t>
+                      </a:r>
+                      <a:endParaRPr lang="en-US" altLang="zh-TW" sz="1400" b="0" i="0" u="none" strike="noStrike" dirty="0">
+                        <a:solidFill>
+                          <a:srgbClr val="000000"/>
+                        </a:solidFill>
+                        <a:effectLst/>
+                        <a:latin typeface="標楷體" panose="03000509000000000000" pitchFamily="65" charset="-120"/>
+                        <a:ea typeface="標楷體" panose="03000509000000000000" pitchFamily="65" charset="-120"/>
+                      </a:endParaRPr>
+                    </a:p>
+                  </a:txBody>
+                  <a:tcPr marL="9525" marR="9525" marT="9525" marB="0" anchor="b"/>
+                </a:tc>
+                <a:tc>
+                  <a:txBody>
+                    <a:bodyPr/>
+                    <a:lstStyle/>
+                    <a:p>
+                      <a:pPr algn="r" fontAlgn="b"/>
+                      <a:r>
+                        <a:rPr lang="en-US" altLang="zh-TW" sz="1400" u="none" strike="noStrike" dirty="0">
+                          <a:effectLst/>
+                          <a:latin typeface="標楷體" panose="03000509000000000000" pitchFamily="65" charset="-120"/>
+                          <a:ea typeface="標楷體" panose="03000509000000000000" pitchFamily="65" charset="-120"/>
+                        </a:rPr>
+                        <a:t>-18.4</a:t>
+                      </a:r>
+                      <a:endParaRPr lang="en-US" altLang="zh-TW" sz="1400" b="0" i="0" u="none" strike="noStrike" dirty="0">
+                        <a:solidFill>
+                          <a:srgbClr val="000000"/>
+                        </a:solidFill>
+                        <a:effectLst/>
+                        <a:latin typeface="標楷體" panose="03000509000000000000" pitchFamily="65" charset="-120"/>
+                        <a:ea typeface="標楷體" panose="03000509000000000000" pitchFamily="65" charset="-120"/>
+                      </a:endParaRPr>
+                    </a:p>
+                  </a:txBody>
+                  <a:tcPr marL="9525" marR="9525" marT="9525" marB="0" anchor="b"/>
+                </a:tc>
+                <a:extLst>
+                  <a:ext uri="{0D108BD9-81ED-4DB2-BD59-A6C34878D82A}">
+                    <a16:rowId xmlns:a16="http://schemas.microsoft.com/office/drawing/2014/main" val="3463821328"/>
+                  </a:ext>
+                </a:extLst>
+              </a:tr>
+              <a:tr h="245886">
+                <a:tc>
+                  <a:txBody>
+                    <a:bodyPr/>
+                    <a:lstStyle/>
+                    <a:p>
+                      <a:pPr algn="l" fontAlgn="b"/>
+                      <a:r>
+                        <a:rPr lang="zh-TW" altLang="en-US" sz="1600" u="none" strike="noStrike" dirty="0">
+                          <a:effectLst/>
+                          <a:latin typeface="標楷體" panose="03000509000000000000" pitchFamily="65" charset="-120"/>
+                          <a:ea typeface="標楷體" panose="03000509000000000000" pitchFamily="65" charset="-120"/>
+                        </a:rPr>
+                        <a:t>相位</a:t>
+                      </a:r>
+                      <a:r>
+                        <a:rPr lang="en-US" altLang="zh-TW" sz="1600" u="none" strike="noStrike" dirty="0">
+                          <a:effectLst/>
+                          <a:latin typeface="標楷體" panose="03000509000000000000" pitchFamily="65" charset="-120"/>
+                          <a:ea typeface="標楷體" panose="03000509000000000000" pitchFamily="65" charset="-120"/>
+                        </a:rPr>
+                        <a:t>(</a:t>
+                      </a:r>
+                      <a:r>
+                        <a:rPr lang="en-US" sz="1600" u="none" strike="noStrike" dirty="0">
+                          <a:effectLst/>
+                          <a:latin typeface="標楷體" panose="03000509000000000000" pitchFamily="65" charset="-120"/>
+                          <a:ea typeface="標楷體" panose="03000509000000000000" pitchFamily="65" charset="-120"/>
+                        </a:rPr>
+                        <a:t>deg)</a:t>
+                      </a:r>
+                      <a:endParaRPr lang="en-US" sz="1600" b="0" i="0" u="none" strike="noStrike" dirty="0">
+                        <a:solidFill>
+                          <a:srgbClr val="000000"/>
+                        </a:solidFill>
+                        <a:effectLst/>
+                        <a:latin typeface="標楷體" panose="03000509000000000000" pitchFamily="65" charset="-120"/>
+                        <a:ea typeface="標楷體" panose="03000509000000000000" pitchFamily="65" charset="-120"/>
+                      </a:endParaRPr>
+                    </a:p>
+                  </a:txBody>
+                  <a:tcPr marL="9525" marR="9525" marT="9525" marB="0" anchor="b"/>
+                </a:tc>
+                <a:tc>
+                  <a:txBody>
+                    <a:bodyPr/>
+                    <a:lstStyle/>
+                    <a:p>
+                      <a:pPr algn="r" fontAlgn="b"/>
+                      <a:r>
+                        <a:rPr lang="en-US" altLang="zh-TW" sz="1400" u="none" strike="noStrike">
+                          <a:effectLst/>
+                          <a:latin typeface="標楷體" panose="03000509000000000000" pitchFamily="65" charset="-120"/>
+                          <a:ea typeface="標楷體" panose="03000509000000000000" pitchFamily="65" charset="-120"/>
+                        </a:rPr>
+                        <a:t>-13.95</a:t>
+                      </a:r>
+                      <a:endParaRPr lang="en-US" altLang="zh-TW" sz="1400" b="0" i="0" u="none" strike="noStrike">
+                        <a:solidFill>
+                          <a:srgbClr val="000000"/>
+                        </a:solidFill>
+                        <a:effectLst/>
+                        <a:latin typeface="標楷體" panose="03000509000000000000" pitchFamily="65" charset="-120"/>
+                        <a:ea typeface="標楷體" panose="03000509000000000000" pitchFamily="65" charset="-120"/>
+                      </a:endParaRPr>
+                    </a:p>
+                  </a:txBody>
+                  <a:tcPr marL="9525" marR="9525" marT="9525" marB="0" anchor="b"/>
+                </a:tc>
+                <a:tc>
+                  <a:txBody>
+                    <a:bodyPr/>
+                    <a:lstStyle/>
+                    <a:p>
+                      <a:pPr algn="r" fontAlgn="b"/>
+                      <a:r>
+                        <a:rPr lang="en-US" altLang="zh-TW" sz="1400" u="none" strike="noStrike">
+                          <a:effectLst/>
+                          <a:latin typeface="標楷體" panose="03000509000000000000" pitchFamily="65" charset="-120"/>
+                          <a:ea typeface="標楷體" panose="03000509000000000000" pitchFamily="65" charset="-120"/>
+                        </a:rPr>
+                        <a:t>-19.86</a:t>
+                      </a:r>
+                      <a:endParaRPr lang="en-US" altLang="zh-TW" sz="1400" b="0" i="0" u="none" strike="noStrike">
+                        <a:solidFill>
+                          <a:srgbClr val="000000"/>
+                        </a:solidFill>
+                        <a:effectLst/>
+                        <a:latin typeface="標楷體" panose="03000509000000000000" pitchFamily="65" charset="-120"/>
+                        <a:ea typeface="標楷體" panose="03000509000000000000" pitchFamily="65" charset="-120"/>
+                      </a:endParaRPr>
+                    </a:p>
+                  </a:txBody>
+                  <a:tcPr marL="9525" marR="9525" marT="9525" marB="0" anchor="b"/>
+                </a:tc>
+                <a:tc>
+                  <a:txBody>
+                    <a:bodyPr/>
+                    <a:lstStyle/>
+                    <a:p>
+                      <a:pPr algn="r" fontAlgn="b"/>
+                      <a:r>
+                        <a:rPr lang="en-US" altLang="zh-TW" sz="1400" u="none" strike="noStrike">
+                          <a:effectLst/>
+                          <a:latin typeface="標楷體" panose="03000509000000000000" pitchFamily="65" charset="-120"/>
+                          <a:ea typeface="標楷體" panose="03000509000000000000" pitchFamily="65" charset="-120"/>
+                        </a:rPr>
+                        <a:t>-33</a:t>
+                      </a:r>
+                      <a:endParaRPr lang="en-US" altLang="zh-TW" sz="1400" b="0" i="0" u="none" strike="noStrike">
+                        <a:solidFill>
+                          <a:srgbClr val="000000"/>
+                        </a:solidFill>
+                        <a:effectLst/>
+                        <a:latin typeface="標楷體" panose="03000509000000000000" pitchFamily="65" charset="-120"/>
+                        <a:ea typeface="標楷體" panose="03000509000000000000" pitchFamily="65" charset="-120"/>
+                      </a:endParaRPr>
+                    </a:p>
+                  </a:txBody>
+                  <a:tcPr marL="9525" marR="9525" marT="9525" marB="0" anchor="b"/>
+                </a:tc>
+                <a:tc>
+                  <a:txBody>
+                    <a:bodyPr/>
+                    <a:lstStyle/>
+                    <a:p>
+                      <a:pPr algn="r" fontAlgn="b"/>
+                      <a:r>
+                        <a:rPr lang="en-US" altLang="zh-TW" sz="1400" u="none" strike="noStrike">
+                          <a:effectLst/>
+                          <a:latin typeface="標楷體" panose="03000509000000000000" pitchFamily="65" charset="-120"/>
+                          <a:ea typeface="標楷體" panose="03000509000000000000" pitchFamily="65" charset="-120"/>
+                        </a:rPr>
+                        <a:t>-55.6</a:t>
+                      </a:r>
+                      <a:endParaRPr lang="en-US" altLang="zh-TW" sz="1400" b="0" i="0" u="none" strike="noStrike">
+                        <a:solidFill>
+                          <a:srgbClr val="000000"/>
+                        </a:solidFill>
+                        <a:effectLst/>
+                        <a:latin typeface="標楷體" panose="03000509000000000000" pitchFamily="65" charset="-120"/>
+                        <a:ea typeface="標楷體" panose="03000509000000000000" pitchFamily="65" charset="-120"/>
+                      </a:endParaRPr>
+                    </a:p>
+                  </a:txBody>
+                  <a:tcPr marL="9525" marR="9525" marT="9525" marB="0" anchor="b"/>
+                </a:tc>
+                <a:tc>
+                  <a:txBody>
+                    <a:bodyPr/>
+                    <a:lstStyle/>
+                    <a:p>
+                      <a:pPr algn="r" fontAlgn="b"/>
+                      <a:r>
+                        <a:rPr lang="en-US" altLang="zh-TW" sz="1400" u="none" strike="noStrike">
+                          <a:effectLst/>
+                          <a:latin typeface="標楷體" panose="03000509000000000000" pitchFamily="65" charset="-120"/>
+                          <a:ea typeface="標楷體" panose="03000509000000000000" pitchFamily="65" charset="-120"/>
+                        </a:rPr>
+                        <a:t>-67.14</a:t>
+                      </a:r>
+                      <a:endParaRPr lang="en-US" altLang="zh-TW" sz="1400" b="0" i="0" u="none" strike="noStrike">
+                        <a:solidFill>
+                          <a:srgbClr val="000000"/>
+                        </a:solidFill>
+                        <a:effectLst/>
+                        <a:latin typeface="標楷體" panose="03000509000000000000" pitchFamily="65" charset="-120"/>
+                        <a:ea typeface="標楷體" panose="03000509000000000000" pitchFamily="65" charset="-120"/>
+                      </a:endParaRPr>
+                    </a:p>
+                  </a:txBody>
+                  <a:tcPr marL="9525" marR="9525" marT="9525" marB="0" anchor="b"/>
+                </a:tc>
+                <a:tc>
+                  <a:txBody>
+                    <a:bodyPr/>
+                    <a:lstStyle/>
+                    <a:p>
+                      <a:pPr algn="r" fontAlgn="b"/>
+                      <a:r>
+                        <a:rPr lang="en-US" altLang="zh-TW" sz="1400" u="none" strike="noStrike">
+                          <a:effectLst/>
+                          <a:latin typeface="標楷體" panose="03000509000000000000" pitchFamily="65" charset="-120"/>
+                          <a:ea typeface="標楷體" panose="03000509000000000000" pitchFamily="65" charset="-120"/>
+                        </a:rPr>
+                        <a:t>-108.3</a:t>
+                      </a:r>
+                      <a:endParaRPr lang="en-US" altLang="zh-TW" sz="1400" b="0" i="0" u="none" strike="noStrike">
+                        <a:solidFill>
+                          <a:srgbClr val="000000"/>
+                        </a:solidFill>
+                        <a:effectLst/>
+                        <a:latin typeface="標楷體" panose="03000509000000000000" pitchFamily="65" charset="-120"/>
+                        <a:ea typeface="標楷體" panose="03000509000000000000" pitchFamily="65" charset="-120"/>
+                      </a:endParaRPr>
+                    </a:p>
+                  </a:txBody>
+                  <a:tcPr marL="9525" marR="9525" marT="9525" marB="0" anchor="b"/>
+                </a:tc>
+                <a:tc>
+                  <a:txBody>
+                    <a:bodyPr/>
+                    <a:lstStyle/>
+                    <a:p>
+                      <a:pPr algn="r" fontAlgn="b"/>
+                      <a:r>
+                        <a:rPr lang="en-US" altLang="zh-TW" sz="1400" u="none" strike="noStrike">
+                          <a:effectLst/>
+                          <a:latin typeface="標楷體" panose="03000509000000000000" pitchFamily="65" charset="-120"/>
+                          <a:ea typeface="標楷體" panose="03000509000000000000" pitchFamily="65" charset="-120"/>
+                        </a:rPr>
+                        <a:t>-90</a:t>
+                      </a:r>
+                      <a:endParaRPr lang="en-US" altLang="zh-TW" sz="1400" b="0" i="0" u="none" strike="noStrike">
+                        <a:solidFill>
+                          <a:srgbClr val="000000"/>
+                        </a:solidFill>
+                        <a:effectLst/>
+                        <a:latin typeface="標楷體" panose="03000509000000000000" pitchFamily="65" charset="-120"/>
+                        <a:ea typeface="標楷體" panose="03000509000000000000" pitchFamily="65" charset="-120"/>
+                      </a:endParaRPr>
+                    </a:p>
+                  </a:txBody>
+                  <a:tcPr marL="9525" marR="9525" marT="9525" marB="0" anchor="b"/>
+                </a:tc>
+                <a:tc>
+                  <a:txBody>
+                    <a:bodyPr/>
+                    <a:lstStyle/>
+                    <a:p>
+                      <a:pPr algn="r" fontAlgn="b"/>
+                      <a:r>
+                        <a:rPr lang="en-US" altLang="zh-TW" sz="1400" u="none" strike="noStrike">
+                          <a:effectLst/>
+                          <a:latin typeface="標楷體" panose="03000509000000000000" pitchFamily="65" charset="-120"/>
+                          <a:ea typeface="標楷體" panose="03000509000000000000" pitchFamily="65" charset="-120"/>
+                        </a:rPr>
+                        <a:t>-90</a:t>
+                      </a:r>
+                      <a:endParaRPr lang="en-US" altLang="zh-TW" sz="1400" b="0" i="0" u="none" strike="noStrike">
+                        <a:solidFill>
+                          <a:srgbClr val="000000"/>
+                        </a:solidFill>
+                        <a:effectLst/>
+                        <a:latin typeface="標楷體" panose="03000509000000000000" pitchFamily="65" charset="-120"/>
+                        <a:ea typeface="標楷體" panose="03000509000000000000" pitchFamily="65" charset="-120"/>
+                      </a:endParaRPr>
+                    </a:p>
+                  </a:txBody>
+                  <a:tcPr marL="9525" marR="9525" marT="9525" marB="0" anchor="b"/>
+                </a:tc>
+                <a:tc>
+                  <a:txBody>
+                    <a:bodyPr/>
+                    <a:lstStyle/>
+                    <a:p>
+                      <a:pPr algn="r" fontAlgn="b"/>
+                      <a:r>
+                        <a:rPr lang="en-US" altLang="zh-TW" sz="1400" u="none" strike="noStrike">
+                          <a:effectLst/>
+                          <a:latin typeface="標楷體" panose="03000509000000000000" pitchFamily="65" charset="-120"/>
+                          <a:ea typeface="標楷體" panose="03000509000000000000" pitchFamily="65" charset="-120"/>
+                        </a:rPr>
+                        <a:t>-84.5</a:t>
+                      </a:r>
+                      <a:endParaRPr lang="en-US" altLang="zh-TW" sz="1400" b="0" i="0" u="none" strike="noStrike">
+                        <a:solidFill>
+                          <a:srgbClr val="000000"/>
+                        </a:solidFill>
+                        <a:effectLst/>
+                        <a:latin typeface="標楷體" panose="03000509000000000000" pitchFamily="65" charset="-120"/>
+                        <a:ea typeface="標楷體" panose="03000509000000000000" pitchFamily="65" charset="-120"/>
+                      </a:endParaRPr>
+                    </a:p>
+                  </a:txBody>
+                  <a:tcPr marL="9525" marR="9525" marT="9525" marB="0" anchor="b"/>
+                </a:tc>
+                <a:tc>
+                  <a:txBody>
+                    <a:bodyPr/>
+                    <a:lstStyle/>
+                    <a:p>
+                      <a:pPr algn="r" fontAlgn="b"/>
+                      <a:r>
+                        <a:rPr lang="en-US" altLang="zh-TW" sz="1400" u="none" strike="noStrike">
+                          <a:effectLst/>
+                          <a:latin typeface="標楷體" panose="03000509000000000000" pitchFamily="65" charset="-120"/>
+                          <a:ea typeface="標楷體" panose="03000509000000000000" pitchFamily="65" charset="-120"/>
+                        </a:rPr>
+                        <a:t>-94.28</a:t>
+                      </a:r>
+                      <a:endParaRPr lang="en-US" altLang="zh-TW" sz="1400" b="0" i="0" u="none" strike="noStrike">
+                        <a:solidFill>
+                          <a:srgbClr val="000000"/>
+                        </a:solidFill>
+                        <a:effectLst/>
+                        <a:latin typeface="標楷體" panose="03000509000000000000" pitchFamily="65" charset="-120"/>
+                        <a:ea typeface="標楷體" panose="03000509000000000000" pitchFamily="65" charset="-120"/>
+                      </a:endParaRPr>
+                    </a:p>
+                  </a:txBody>
+                  <a:tcPr marL="9525" marR="9525" marT="9525" marB="0" anchor="b"/>
+                </a:tc>
+                <a:tc>
+                  <a:txBody>
+                    <a:bodyPr/>
+                    <a:lstStyle/>
+                    <a:p>
+                      <a:pPr algn="r" fontAlgn="b"/>
+                      <a:r>
+                        <a:rPr lang="en-US" altLang="zh-TW" sz="1400" u="none" strike="noStrike" dirty="0">
+                          <a:effectLst/>
+                          <a:latin typeface="標楷體" panose="03000509000000000000" pitchFamily="65" charset="-120"/>
+                          <a:ea typeface="標楷體" panose="03000509000000000000" pitchFamily="65" charset="-120"/>
+                        </a:rPr>
+                        <a:t>-91.91</a:t>
+                      </a:r>
+                      <a:endParaRPr lang="en-US" altLang="zh-TW" sz="1400" b="0" i="0" u="none" strike="noStrike" dirty="0">
+                        <a:solidFill>
+                          <a:srgbClr val="000000"/>
+                        </a:solidFill>
+                        <a:effectLst/>
+                        <a:latin typeface="標楷體" panose="03000509000000000000" pitchFamily="65" charset="-120"/>
+                        <a:ea typeface="標楷體" panose="03000509000000000000" pitchFamily="65" charset="-120"/>
+                      </a:endParaRPr>
+                    </a:p>
+                  </a:txBody>
+                  <a:tcPr marL="9525" marR="9525" marT="9525" marB="0" anchor="b"/>
+                </a:tc>
+                <a:extLst>
+                  <a:ext uri="{0D108BD9-81ED-4DB2-BD59-A6C34878D82A}">
+                    <a16:rowId xmlns:a16="http://schemas.microsoft.com/office/drawing/2014/main" val="1636589332"/>
+                  </a:ext>
+                </a:extLst>
+              </a:tr>
+            </a:tbl>
+          </a:graphicData>
+        </a:graphic>
+      </p:graphicFrame>
     </p:spTree>
     <p:extLst>
       <p:ext uri="{BB962C8B-B14F-4D97-AF65-F5344CB8AC3E}">
@@ -4003,6 +7101,231 @@
 </file>
 
 <file path=ppt/slides/slide3.xml><?xml version="1.0" encoding="utf-8"?>
+<p:sld xmlns:a="http://schemas.openxmlformats.org/drawingml/2006/main" xmlns:r="http://schemas.openxmlformats.org/officeDocument/2006/relationships" xmlns:p="http://schemas.openxmlformats.org/presentationml/2006/main">
+  <p:cSld>
+    <p:spTree>
+      <p:nvGrpSpPr>
+        <p:cNvPr id="1" name="">
+          <a:extLst>
+            <a:ext uri="{FF2B5EF4-FFF2-40B4-BE49-F238E27FC236}">
+              <a16:creationId xmlns:a16="http://schemas.microsoft.com/office/drawing/2014/main" id="{8A7B02A0-01F2-5253-7B48-6385742314E1}"/>
+            </a:ext>
+          </a:extLst>
+        </p:cNvPr>
+        <p:cNvGrpSpPr/>
+        <p:nvPr/>
+      </p:nvGrpSpPr>
+      <p:grpSpPr>
+        <a:xfrm>
+          <a:off x="0" y="0"/>
+          <a:ext cx="0" cy="0"/>
+          <a:chOff x="0" y="0"/>
+          <a:chExt cx="0" cy="0"/>
+        </a:xfrm>
+      </p:grpSpPr>
+      <p:pic>
+        <p:nvPicPr>
+          <p:cNvPr id="9" name="圖片 8">
+            <a:extLst>
+              <a:ext uri="{FF2B5EF4-FFF2-40B4-BE49-F238E27FC236}">
+                <a16:creationId xmlns:a16="http://schemas.microsoft.com/office/drawing/2014/main" id="{6A00C0A7-6A53-C0ED-74FC-C380EC101130}"/>
+              </a:ext>
+            </a:extLst>
+          </p:cNvPr>
+          <p:cNvPicPr>
+            <a:picLocks noChangeAspect="1"/>
+          </p:cNvPicPr>
+          <p:nvPr/>
+        </p:nvPicPr>
+        <p:blipFill>
+          <a:blip r:embed="rId2"/>
+          <a:stretch>
+            <a:fillRect/>
+          </a:stretch>
+        </p:blipFill>
+        <p:spPr>
+          <a:xfrm>
+            <a:off x="2925128" y="2448560"/>
+            <a:ext cx="5896944" cy="4242841"/>
+          </a:xfrm>
+          <a:prstGeom prst="rect">
+            <a:avLst/>
+          </a:prstGeom>
+        </p:spPr>
+      </p:pic>
+      <p:sp>
+        <p:nvSpPr>
+          <p:cNvPr id="2" name="標題 1">
+            <a:extLst>
+              <a:ext uri="{FF2B5EF4-FFF2-40B4-BE49-F238E27FC236}">
+                <a16:creationId xmlns:a16="http://schemas.microsoft.com/office/drawing/2014/main" id="{B4E02F8F-EFCB-133E-348F-EB547F2F28F3}"/>
+              </a:ext>
+            </a:extLst>
+          </p:cNvPr>
+          <p:cNvSpPr>
+            <a:spLocks noGrp="1"/>
+          </p:cNvSpPr>
+          <p:nvPr>
+            <p:ph type="title"/>
+          </p:nvPr>
+        </p:nvSpPr>
+        <p:spPr/>
+        <p:txBody>
+          <a:bodyPr/>
+          <a:lstStyle/>
+          <a:p>
+            <a:r>
+              <a:rPr lang="zh-TW" altLang="en-US" dirty="0">
+                <a:latin typeface="標楷體" panose="03000509000000000000" pitchFamily="65" charset="-120"/>
+                <a:ea typeface="標楷體" panose="03000509000000000000" pitchFamily="65" charset="-120"/>
+              </a:rPr>
+              <a:t>實驗</a:t>
+            </a:r>
+            <a:r>
+              <a:rPr lang="en-US" altLang="zh-TW" dirty="0">
+                <a:latin typeface="標楷體" panose="03000509000000000000" pitchFamily="65" charset="-120"/>
+                <a:ea typeface="標楷體" panose="03000509000000000000" pitchFamily="65" charset="-120"/>
+              </a:rPr>
+              <a:t>7-1</a:t>
+            </a:r>
+            <a:r>
+              <a:rPr lang="zh-TW" altLang="en-US" dirty="0">
+                <a:latin typeface="標楷體" panose="03000509000000000000" pitchFamily="65" charset="-120"/>
+                <a:ea typeface="標楷體" panose="03000509000000000000" pitchFamily="65" charset="-120"/>
+              </a:rPr>
+              <a:t>實驗</a:t>
+            </a:r>
+          </a:p>
+        </p:txBody>
+      </p:sp>
+      <p:sp>
+        <p:nvSpPr>
+          <p:cNvPr id="5" name="文字方塊 4">
+            <a:extLst>
+              <a:ext uri="{FF2B5EF4-FFF2-40B4-BE49-F238E27FC236}">
+                <a16:creationId xmlns:a16="http://schemas.microsoft.com/office/drawing/2014/main" id="{BFA2612A-ADEE-66A5-C51F-F234BB788CCB}"/>
+              </a:ext>
+            </a:extLst>
+          </p:cNvPr>
+          <p:cNvSpPr txBox="1"/>
+          <p:nvPr/>
+        </p:nvSpPr>
+        <p:spPr>
+          <a:xfrm rot="16200000">
+            <a:off x="2685465" y="5467577"/>
+            <a:ext cx="919480" cy="307777"/>
+          </a:xfrm>
+          <a:prstGeom prst="rect">
+            <a:avLst/>
+          </a:prstGeom>
+          <a:noFill/>
+        </p:spPr>
+        <p:txBody>
+          <a:bodyPr wrap="square" rtlCol="0">
+            <a:spAutoFit/>
+          </a:bodyPr>
+          <a:lstStyle/>
+          <a:p>
+            <a:r>
+              <a:rPr lang="en-US" altLang="zh-TW" sz="1400" dirty="0">
+                <a:latin typeface="Times New Roman" panose="02020603050405020304" pitchFamily="18" charset="0"/>
+                <a:cs typeface="Times New Roman" panose="02020603050405020304" pitchFamily="18" charset="0"/>
+              </a:rPr>
+              <a:t>Phase</a:t>
+            </a:r>
+            <a:endParaRPr lang="zh-TW" altLang="en-US" sz="1400" dirty="0">
+              <a:latin typeface="Times New Roman" panose="02020603050405020304" pitchFamily="18" charset="0"/>
+              <a:cs typeface="Times New Roman" panose="02020603050405020304" pitchFamily="18" charset="0"/>
+            </a:endParaRPr>
+          </a:p>
+        </p:txBody>
+      </p:sp>
+      <p:sp>
+        <p:nvSpPr>
+          <p:cNvPr id="10" name="文字方塊 9">
+            <a:extLst>
+              <a:ext uri="{FF2B5EF4-FFF2-40B4-BE49-F238E27FC236}">
+                <a16:creationId xmlns:a16="http://schemas.microsoft.com/office/drawing/2014/main" id="{6E47CCB2-1825-0AB5-A0B3-360744FEF594}"/>
+              </a:ext>
+            </a:extLst>
+          </p:cNvPr>
+          <p:cNvSpPr txBox="1"/>
+          <p:nvPr/>
+        </p:nvSpPr>
+        <p:spPr>
+          <a:xfrm rot="16200000">
+            <a:off x="2672841" y="3925276"/>
+            <a:ext cx="1066650" cy="307777"/>
+          </a:xfrm>
+          <a:prstGeom prst="rect">
+            <a:avLst/>
+          </a:prstGeom>
+          <a:noFill/>
+        </p:spPr>
+        <p:txBody>
+          <a:bodyPr wrap="square" rtlCol="0">
+            <a:spAutoFit/>
+          </a:bodyPr>
+          <a:lstStyle/>
+          <a:p>
+            <a:r>
+              <a:rPr lang="en-US" altLang="zh-TW" sz="1400" dirty="0">
+                <a:latin typeface="Times New Roman" panose="02020603050405020304" pitchFamily="18" charset="0"/>
+                <a:cs typeface="Times New Roman" panose="02020603050405020304" pitchFamily="18" charset="0"/>
+              </a:rPr>
+              <a:t>Magnitude</a:t>
+            </a:r>
+            <a:endParaRPr lang="zh-TW" altLang="en-US" sz="1400" dirty="0">
+              <a:latin typeface="Times New Roman" panose="02020603050405020304" pitchFamily="18" charset="0"/>
+              <a:cs typeface="Times New Roman" panose="02020603050405020304" pitchFamily="18" charset="0"/>
+            </a:endParaRPr>
+          </a:p>
+        </p:txBody>
+      </p:sp>
+      <p:pic>
+        <p:nvPicPr>
+          <p:cNvPr id="11" name="圖片 10">
+            <a:extLst>
+              <a:ext uri="{FF2B5EF4-FFF2-40B4-BE49-F238E27FC236}">
+                <a16:creationId xmlns:a16="http://schemas.microsoft.com/office/drawing/2014/main" id="{15562509-2020-2010-6BE7-9F35E7C1BDF6}"/>
+              </a:ext>
+            </a:extLst>
+          </p:cNvPr>
+          <p:cNvPicPr>
+            <a:picLocks noChangeAspect="1"/>
+          </p:cNvPicPr>
+          <p:nvPr/>
+        </p:nvPicPr>
+        <p:blipFill>
+          <a:blip r:embed="rId3"/>
+          <a:stretch>
+            <a:fillRect/>
+          </a:stretch>
+        </p:blipFill>
+        <p:spPr>
+          <a:xfrm>
+            <a:off x="992777" y="1498297"/>
+            <a:ext cx="8335758" cy="707920"/>
+          </a:xfrm>
+          <a:prstGeom prst="rect">
+            <a:avLst/>
+          </a:prstGeom>
+        </p:spPr>
+      </p:pic>
+    </p:spTree>
+    <p:extLst>
+      <p:ext uri="{BB962C8B-B14F-4D97-AF65-F5344CB8AC3E}">
+        <p14:creationId xmlns:p14="http://schemas.microsoft.com/office/powerpoint/2010/main" val="34045092"/>
+      </p:ext>
+    </p:extLst>
+  </p:cSld>
+  <p:clrMapOvr>
+    <a:masterClrMapping/>
+  </p:clrMapOvr>
+</p:sld>
+</file>
+
+<file path=ppt/slides/slide4.xml><?xml version="1.0" encoding="utf-8"?>
 <p:sld xmlns:a="http://schemas.openxmlformats.org/drawingml/2006/main" xmlns:r="http://schemas.openxmlformats.org/officeDocument/2006/relationships" xmlns:p="http://schemas.openxmlformats.org/presentationml/2006/main">
   <p:cSld>
     <p:spTree>
@@ -4035,7 +7358,7 @@
           <a:lstStyle/>
           <a:p>
             <a:r>
-              <a:rPr lang="zh-TW" altLang="en-US" dirty="0" smtClean="0">
+              <a:rPr lang="zh-TW" altLang="en-US" dirty="0">
                 <a:latin typeface="標楷體" panose="03000509000000000000" pitchFamily="65" charset="-120"/>
                 <a:ea typeface="標楷體" panose="03000509000000000000" pitchFamily="65" charset="-120"/>
               </a:rPr>
@@ -4046,19 +7369,15 @@
                 <a:latin typeface="標楷體" panose="03000509000000000000" pitchFamily="65" charset="-120"/>
                 <a:ea typeface="標楷體" panose="03000509000000000000" pitchFamily="65" charset="-120"/>
               </a:rPr>
-              <a:t>7</a:t>
-            </a:r>
-            <a:r>
-              <a:rPr lang="en-US" altLang="zh-TW" dirty="0" smtClean="0">
+              <a:t>7-1</a:t>
+            </a:r>
+            <a:r>
+              <a:rPr lang="zh-TW" altLang="en-US" dirty="0">
                 <a:latin typeface="標楷體" panose="03000509000000000000" pitchFamily="65" charset="-120"/>
                 <a:ea typeface="標楷體" panose="03000509000000000000" pitchFamily="65" charset="-120"/>
               </a:rPr>
-              <a:t>-1</a:t>
-            </a:r>
-            <a:endParaRPr lang="zh-TW" altLang="en-US" dirty="0">
-              <a:latin typeface="標楷體" panose="03000509000000000000" pitchFamily="65" charset="-120"/>
-              <a:ea typeface="標楷體" panose="03000509000000000000" pitchFamily="65" charset="-120"/>
-            </a:endParaRPr>
+              <a:t>模擬</a:t>
+            </a:r>
           </a:p>
         </p:txBody>
       </p:sp>
@@ -4079,7 +7398,7 @@
         <p:spPr>
           <a:xfrm>
             <a:off x="838200" y="1645474"/>
-            <a:ext cx="9373908" cy="400106"/>
+            <a:ext cx="7452360" cy="318089"/>
           </a:xfrm>
           <a:prstGeom prst="rect">
             <a:avLst/>
@@ -4088,34 +7407,70 @@
       </p:pic>
       <p:pic>
         <p:nvPicPr>
-          <p:cNvPr id="6" name="圖片 5"/>
+          <p:cNvPr id="4" name="圖片 3">
+            <a:extLst>
+              <a:ext uri="{FF2B5EF4-FFF2-40B4-BE49-F238E27FC236}">
+                <a16:creationId xmlns:a16="http://schemas.microsoft.com/office/drawing/2014/main" id="{565668E9-E39B-2416-CC58-58572BA0FC8C}"/>
+              </a:ext>
+            </a:extLst>
+          </p:cNvPr>
           <p:cNvPicPr>
             <a:picLocks noChangeAspect="1"/>
           </p:cNvPicPr>
           <p:nvPr/>
         </p:nvPicPr>
         <p:blipFill>
-          <a:blip r:embed="rId3">
-            <a:extLst>
-              <a:ext uri="{28A0092B-C50C-407E-A947-70E740481C1C}">
-                <a14:useLocalDpi xmlns:a14="http://schemas.microsoft.com/office/drawing/2010/main" val="0"/>
-              </a:ext>
-            </a:extLst>
-          </a:blip>
+          <a:blip r:embed="rId3"/>
           <a:stretch>
             <a:fillRect/>
           </a:stretch>
         </p:blipFill>
         <p:spPr>
           <a:xfrm>
-            <a:off x="3685477" y="2170307"/>
-            <a:ext cx="5707995" cy="4280996"/>
+            <a:off x="3194079" y="2317182"/>
+            <a:ext cx="5194242" cy="3895682"/>
           </a:xfrm>
           <a:prstGeom prst="rect">
             <a:avLst/>
           </a:prstGeom>
         </p:spPr>
       </p:pic>
+      <p:sp>
+        <p:nvSpPr>
+          <p:cNvPr id="5" name="文字方塊 4">
+            <a:extLst>
+              <a:ext uri="{FF2B5EF4-FFF2-40B4-BE49-F238E27FC236}">
+                <a16:creationId xmlns:a16="http://schemas.microsoft.com/office/drawing/2014/main" id="{F7A11A38-F428-B2B9-862B-6F4AFC4ACEDE}"/>
+              </a:ext>
+            </a:extLst>
+          </p:cNvPr>
+          <p:cNvSpPr txBox="1"/>
+          <p:nvPr/>
+        </p:nvSpPr>
+        <p:spPr>
+          <a:xfrm rot="16200000">
+            <a:off x="8107680" y="3098800"/>
+            <a:ext cx="919480" cy="369332"/>
+          </a:xfrm>
+          <a:prstGeom prst="rect">
+            <a:avLst/>
+          </a:prstGeom>
+          <a:noFill/>
+        </p:spPr>
+        <p:txBody>
+          <a:bodyPr wrap="square" rtlCol="0">
+            <a:spAutoFit/>
+          </a:bodyPr>
+          <a:lstStyle/>
+          <a:p>
+            <a:r>
+              <a:rPr lang="en-US" altLang="zh-TW" dirty="0"/>
+              <a:t>Phase</a:t>
+            </a:r>
+            <a:endParaRPr lang="zh-TW" altLang="en-US" dirty="0"/>
+          </a:p>
+        </p:txBody>
+      </p:sp>
     </p:spTree>
     <p:extLst>
       <p:ext uri="{BB962C8B-B14F-4D97-AF65-F5344CB8AC3E}">
@@ -4129,7 +7484,7 @@
 </p:sld>
 </file>
 
-<file path=ppt/slides/slide4.xml><?xml version="1.0" encoding="utf-8"?>
+<file path=ppt/slides/slide5.xml><?xml version="1.0" encoding="utf-8"?>
 <p:sld xmlns:a="http://schemas.openxmlformats.org/drawingml/2006/main" xmlns:r="http://schemas.openxmlformats.org/officeDocument/2006/relationships" xmlns:p="http://schemas.openxmlformats.org/presentationml/2006/main">
   <p:cSld>
     <p:spTree>
@@ -4148,10 +7503,398 @@
       </p:grpSpPr>
       <p:sp>
         <p:nvSpPr>
-          <p:cNvPr id="6" name="標題 1">
+          <p:cNvPr id="2" name="標題 1">
             <a:extLst>
               <a:ext uri="{FF2B5EF4-FFF2-40B4-BE49-F238E27FC236}">
-                <a16:creationId xmlns:a16="http://schemas.microsoft.com/office/drawing/2014/main" id="{F0F24871-7E6E-6347-BF59-1F8F0DD956D0}"/>
+                <a16:creationId xmlns:a16="http://schemas.microsoft.com/office/drawing/2014/main" id="{84EA3BB8-3A80-2645-2AE2-EA9262D3E73B}"/>
+              </a:ext>
+            </a:extLst>
+          </p:cNvPr>
+          <p:cNvSpPr>
+            <a:spLocks noGrp="1"/>
+          </p:cNvSpPr>
+          <p:nvPr>
+            <p:ph type="title"/>
+          </p:nvPr>
+        </p:nvSpPr>
+        <p:spPr/>
+        <p:txBody>
+          <a:bodyPr/>
+          <a:lstStyle/>
+          <a:p>
+            <a:r>
+              <a:rPr lang="zh-TW" altLang="en-US" dirty="0">
+                <a:latin typeface="標楷體" panose="03000509000000000000" pitchFamily="65" charset="-120"/>
+                <a:ea typeface="標楷體" panose="03000509000000000000" pitchFamily="65" charset="-120"/>
+              </a:rPr>
+              <a:t>問題與討論</a:t>
+            </a:r>
+          </a:p>
+        </p:txBody>
+      </p:sp>
+      <p:pic>
+        <p:nvPicPr>
+          <p:cNvPr id="4" name="內容版面配置區 3">
+            <a:extLst>
+              <a:ext uri="{FF2B5EF4-FFF2-40B4-BE49-F238E27FC236}">
+                <a16:creationId xmlns:a16="http://schemas.microsoft.com/office/drawing/2014/main" id="{637BBCDD-9A57-99C4-8BD8-BA84564A4E55}"/>
+              </a:ext>
+            </a:extLst>
+          </p:cNvPr>
+          <p:cNvPicPr>
+            <a:picLocks noGrp="1" noChangeAspect="1"/>
+          </p:cNvPicPr>
+          <p:nvPr>
+            <p:ph idx="1"/>
+          </p:nvPr>
+        </p:nvPicPr>
+        <p:blipFill>
+          <a:blip r:embed="rId2"/>
+          <a:stretch>
+            <a:fillRect/>
+          </a:stretch>
+        </p:blipFill>
+        <p:spPr>
+          <a:xfrm>
+            <a:off x="925512" y="1822769"/>
+            <a:ext cx="10852532" cy="3953668"/>
+          </a:xfrm>
+        </p:spPr>
+      </p:pic>
+      <p:sp>
+        <p:nvSpPr>
+          <p:cNvPr id="5" name="文字方塊 4">
+            <a:extLst>
+              <a:ext uri="{FF2B5EF4-FFF2-40B4-BE49-F238E27FC236}">
+                <a16:creationId xmlns:a16="http://schemas.microsoft.com/office/drawing/2014/main" id="{6B8772D7-BA57-EBC3-0A9C-90B495A47598}"/>
+              </a:ext>
+            </a:extLst>
+          </p:cNvPr>
+          <p:cNvSpPr txBox="1"/>
+          <p:nvPr/>
+        </p:nvSpPr>
+        <p:spPr>
+          <a:xfrm>
+            <a:off x="8900160" y="1954850"/>
+            <a:ext cx="1198880" cy="369332"/>
+          </a:xfrm>
+          <a:prstGeom prst="rect">
+            <a:avLst/>
+          </a:prstGeom>
+          <a:noFill/>
+        </p:spPr>
+        <p:txBody>
+          <a:bodyPr wrap="square" rtlCol="0">
+            <a:spAutoFit/>
+          </a:bodyPr>
+          <a:lstStyle/>
+          <a:p>
+            <a:r>
+              <a:rPr lang="en-US" altLang="zh-TW" dirty="0"/>
+              <a:t>yes</a:t>
+            </a:r>
+            <a:endParaRPr lang="zh-TW" altLang="en-US" dirty="0"/>
+          </a:p>
+        </p:txBody>
+      </p:sp>
+      <p:sp>
+        <p:nvSpPr>
+          <p:cNvPr id="7" name="文字方塊 6">
+            <a:extLst>
+              <a:ext uri="{FF2B5EF4-FFF2-40B4-BE49-F238E27FC236}">
+                <a16:creationId xmlns:a16="http://schemas.microsoft.com/office/drawing/2014/main" id="{9B979FDF-88C1-5D3C-D5EC-3C794388CB95}"/>
+              </a:ext>
+            </a:extLst>
+          </p:cNvPr>
+          <p:cNvSpPr txBox="1"/>
+          <p:nvPr/>
+        </p:nvSpPr>
+        <p:spPr>
+          <a:xfrm>
+            <a:off x="10067608" y="4941890"/>
+            <a:ext cx="1198880" cy="369332"/>
+          </a:xfrm>
+          <a:prstGeom prst="rect">
+            <a:avLst/>
+          </a:prstGeom>
+          <a:noFill/>
+        </p:spPr>
+        <p:txBody>
+          <a:bodyPr wrap="square" rtlCol="0">
+            <a:spAutoFit/>
+          </a:bodyPr>
+          <a:lstStyle/>
+          <a:p>
+            <a:r>
+              <a:rPr lang="en-US" altLang="zh-TW" dirty="0"/>
+              <a:t>yes</a:t>
+            </a:r>
+            <a:endParaRPr lang="zh-TW" altLang="en-US" dirty="0"/>
+          </a:p>
+        </p:txBody>
+      </p:sp>
+    </p:spTree>
+    <p:extLst>
+      <p:ext uri="{BB962C8B-B14F-4D97-AF65-F5344CB8AC3E}">
+        <p14:creationId xmlns:p14="http://schemas.microsoft.com/office/powerpoint/2010/main" val="884984280"/>
+      </p:ext>
+    </p:extLst>
+  </p:cSld>
+  <p:clrMapOvr>
+    <a:masterClrMapping/>
+  </p:clrMapOvr>
+</p:sld>
+</file>
+
+<file path=ppt/slides/slide6.xml><?xml version="1.0" encoding="utf-8"?>
+<p:sld xmlns:a="http://schemas.openxmlformats.org/drawingml/2006/main" xmlns:r="http://schemas.openxmlformats.org/officeDocument/2006/relationships" xmlns:p="http://schemas.openxmlformats.org/presentationml/2006/main">
+  <p:cSld>
+    <p:spTree>
+      <p:nvGrpSpPr>
+        <p:cNvPr id="1" name=""/>
+        <p:cNvGrpSpPr/>
+        <p:nvPr/>
+      </p:nvGrpSpPr>
+      <p:grpSpPr>
+        <a:xfrm>
+          <a:off x="0" y="0"/>
+          <a:ext cx="0" cy="0"/>
+          <a:chOff x="0" y="0"/>
+          <a:chExt cx="0" cy="0"/>
+        </a:xfrm>
+      </p:grpSpPr>
+      <p:sp>
+        <p:nvSpPr>
+          <p:cNvPr id="2" name="標題 1">
+            <a:extLst>
+              <a:ext uri="{FF2B5EF4-FFF2-40B4-BE49-F238E27FC236}">
+                <a16:creationId xmlns:a16="http://schemas.microsoft.com/office/drawing/2014/main" id="{99793009-B6CF-F866-77A9-DD5474B56F77}"/>
+              </a:ext>
+            </a:extLst>
+          </p:cNvPr>
+          <p:cNvSpPr>
+            <a:spLocks noGrp="1"/>
+          </p:cNvSpPr>
+          <p:nvPr>
+            <p:ph type="title"/>
+          </p:nvPr>
+        </p:nvSpPr>
+        <p:spPr/>
+        <p:txBody>
+          <a:bodyPr/>
+          <a:lstStyle/>
+          <a:p>
+            <a:r>
+              <a:rPr lang="en-US" altLang="zh-TW" dirty="0"/>
+              <a:t>2.</a:t>
+            </a:r>
+            <a:endParaRPr lang="zh-TW" altLang="en-US" dirty="0"/>
+          </a:p>
+        </p:txBody>
+      </p:sp>
+      <p:pic>
+        <p:nvPicPr>
+          <p:cNvPr id="5" name="內容版面配置區 4">
+            <a:extLst>
+              <a:ext uri="{FF2B5EF4-FFF2-40B4-BE49-F238E27FC236}">
+                <a16:creationId xmlns:a16="http://schemas.microsoft.com/office/drawing/2014/main" id="{681F87EB-BBC3-CFCD-B4FA-8677C885092A}"/>
+              </a:ext>
+            </a:extLst>
+          </p:cNvPr>
+          <p:cNvPicPr>
+            <a:picLocks noGrp="1" noChangeAspect="1"/>
+          </p:cNvPicPr>
+          <p:nvPr>
+            <p:ph idx="1"/>
+          </p:nvPr>
+        </p:nvPicPr>
+        <p:blipFill>
+          <a:blip r:embed="rId2"/>
+          <a:stretch>
+            <a:fillRect/>
+          </a:stretch>
+        </p:blipFill>
+        <p:spPr>
+          <a:xfrm>
+            <a:off x="2573134" y="1266830"/>
+            <a:ext cx="6377826" cy="4971093"/>
+          </a:xfrm>
+        </p:spPr>
+      </p:pic>
+    </p:spTree>
+    <p:extLst>
+      <p:ext uri="{BB962C8B-B14F-4D97-AF65-F5344CB8AC3E}">
+        <p14:creationId xmlns:p14="http://schemas.microsoft.com/office/powerpoint/2010/main" val="2216336941"/>
+      </p:ext>
+    </p:extLst>
+  </p:cSld>
+  <p:clrMapOvr>
+    <a:masterClrMapping/>
+  </p:clrMapOvr>
+</p:sld>
+</file>
+
+<file path=ppt/slides/slide7.xml><?xml version="1.0" encoding="utf-8"?>
+<p:sld xmlns:a="http://schemas.openxmlformats.org/drawingml/2006/main" xmlns:r="http://schemas.openxmlformats.org/officeDocument/2006/relationships" xmlns:p="http://schemas.openxmlformats.org/presentationml/2006/main">
+  <p:cSld>
+    <p:spTree>
+      <p:nvGrpSpPr>
+        <p:cNvPr id="1" name=""/>
+        <p:cNvGrpSpPr/>
+        <p:nvPr/>
+      </p:nvGrpSpPr>
+      <p:grpSpPr>
+        <a:xfrm>
+          <a:off x="0" y="0"/>
+          <a:ext cx="0" cy="0"/>
+          <a:chOff x="0" y="0"/>
+          <a:chExt cx="0" cy="0"/>
+        </a:xfrm>
+      </p:grpSpPr>
+      <p:sp>
+        <p:nvSpPr>
+          <p:cNvPr id="2" name="標題 1">
+            <a:extLst>
+              <a:ext uri="{FF2B5EF4-FFF2-40B4-BE49-F238E27FC236}">
+                <a16:creationId xmlns:a16="http://schemas.microsoft.com/office/drawing/2014/main" id="{C54965D5-F0BF-C040-5B10-D2AEE3E237FB}"/>
+              </a:ext>
+            </a:extLst>
+          </p:cNvPr>
+          <p:cNvSpPr>
+            <a:spLocks noGrp="1"/>
+          </p:cNvSpPr>
+          <p:nvPr>
+            <p:ph type="title"/>
+          </p:nvPr>
+        </p:nvSpPr>
+        <p:spPr/>
+        <p:txBody>
+          <a:bodyPr/>
+          <a:lstStyle/>
+          <a:p>
+            <a:r>
+              <a:rPr lang="en-US" altLang="zh-TW" dirty="0"/>
+              <a:t>3.</a:t>
+            </a:r>
+            <a:endParaRPr lang="zh-TW" altLang="en-US" dirty="0"/>
+          </a:p>
+        </p:txBody>
+      </p:sp>
+      <p:sp>
+        <p:nvSpPr>
+          <p:cNvPr id="3" name="內容版面配置區 2">
+            <a:extLst>
+              <a:ext uri="{FF2B5EF4-FFF2-40B4-BE49-F238E27FC236}">
+                <a16:creationId xmlns:a16="http://schemas.microsoft.com/office/drawing/2014/main" id="{26FAD726-BFA8-51E0-7763-88154901ABFB}"/>
+              </a:ext>
+            </a:extLst>
+          </p:cNvPr>
+          <p:cNvSpPr>
+            <a:spLocks noGrp="1"/>
+          </p:cNvSpPr>
+          <p:nvPr>
+            <p:ph idx="1"/>
+          </p:nvPr>
+        </p:nvSpPr>
+        <p:spPr/>
+        <p:txBody>
+          <a:bodyPr>
+            <a:normAutofit/>
+          </a:bodyPr>
+          <a:lstStyle/>
+          <a:p>
+            <a:pPr marL="0" indent="0">
+              <a:buNone/>
+            </a:pPr>
+            <a:r>
+              <a:rPr lang="en-US" altLang="zh-TW" b="0" i="0" u="none" strike="noStrike" dirty="0">
+                <a:solidFill>
+                  <a:srgbClr val="000000"/>
+                </a:solidFill>
+                <a:effectLst/>
+                <a:latin typeface="Times New Roman" panose="02020603050405020304" pitchFamily="18" charset="0"/>
+              </a:rPr>
+              <a:t>Ans:</a:t>
+            </a:r>
+            <a:r>
+              <a:rPr lang="zh-TW" altLang="en-US" b="0" i="0" u="none" strike="noStrike" dirty="0">
+                <a:solidFill>
+                  <a:srgbClr val="000000"/>
+                </a:solidFill>
+                <a:effectLst/>
+                <a:latin typeface="Times New Roman" panose="02020603050405020304" pitchFamily="18" charset="0"/>
+              </a:rPr>
+              <a:t> </a:t>
+            </a:r>
+            <a:r>
+              <a:rPr lang="en-US" altLang="zh-TW" b="0" i="0" u="none" strike="noStrike" dirty="0">
+                <a:solidFill>
+                  <a:srgbClr val="000000"/>
+                </a:solidFill>
+                <a:effectLst/>
+                <a:latin typeface="Times New Roman" panose="02020603050405020304" pitchFamily="18" charset="0"/>
+              </a:rPr>
+              <a:t>P5</a:t>
+            </a:r>
+            <a:r>
+              <a:rPr lang="zh-TW" altLang="en-US" dirty="0">
+                <a:solidFill>
+                  <a:srgbClr val="000000"/>
+                </a:solidFill>
+                <a:latin typeface="Times New Roman" panose="02020603050405020304" pitchFamily="18" charset="0"/>
+              </a:rPr>
+              <a:t>增大時</a:t>
+            </a:r>
+            <a:r>
+              <a:rPr lang="zh-TW" altLang="en-US" b="0" i="0" u="none" strike="noStrike" dirty="0">
+                <a:solidFill>
+                  <a:srgbClr val="000000"/>
+                </a:solidFill>
+                <a:effectLst/>
+                <a:latin typeface="Times New Roman" panose="02020603050405020304" pitchFamily="18" charset="0"/>
+              </a:rPr>
+              <a:t>，角頻率會增加。</a:t>
+            </a:r>
+            <a:endParaRPr lang="zh-TW" altLang="en-US" dirty="0"/>
+          </a:p>
+        </p:txBody>
+      </p:sp>
+    </p:spTree>
+    <p:extLst>
+      <p:ext uri="{BB962C8B-B14F-4D97-AF65-F5344CB8AC3E}">
+        <p14:creationId xmlns:p14="http://schemas.microsoft.com/office/powerpoint/2010/main" val="3685792603"/>
+      </p:ext>
+    </p:extLst>
+  </p:cSld>
+  <p:clrMapOvr>
+    <a:masterClrMapping/>
+  </p:clrMapOvr>
+</p:sld>
+</file>
+
+<file path=ppt/slides/slide8.xml><?xml version="1.0" encoding="utf-8"?>
+<p:sld xmlns:a="http://schemas.openxmlformats.org/drawingml/2006/main" xmlns:r="http://schemas.openxmlformats.org/officeDocument/2006/relationships" xmlns:p="http://schemas.openxmlformats.org/presentationml/2006/main">
+  <p:cSld>
+    <p:spTree>
+      <p:nvGrpSpPr>
+        <p:cNvPr id="1" name=""/>
+        <p:cNvGrpSpPr/>
+        <p:nvPr/>
+      </p:nvGrpSpPr>
+      <p:grpSpPr>
+        <a:xfrm>
+          <a:off x="0" y="0"/>
+          <a:ext cx="0" cy="0"/>
+          <a:chOff x="0" y="0"/>
+          <a:chExt cx="0" cy="0"/>
+        </a:xfrm>
+      </p:grpSpPr>
+      <p:sp>
+        <p:nvSpPr>
+          <p:cNvPr id="2" name="標題 1">
+            <a:extLst>
+              <a:ext uri="{FF2B5EF4-FFF2-40B4-BE49-F238E27FC236}">
+                <a16:creationId xmlns:a16="http://schemas.microsoft.com/office/drawing/2014/main" id="{5C7E0000-7709-CA38-99FA-0BA1C735E90C}"/>
               </a:ext>
             </a:extLst>
           </p:cNvPr>
@@ -4164,7 +7907,7 @@
         </p:nvSpPr>
         <p:spPr>
           <a:xfrm>
-            <a:off x="838200" y="365125"/>
+            <a:off x="838200" y="385445"/>
             <a:ext cx="10515600" cy="1325563"/>
           </a:xfrm>
         </p:spPr>
@@ -4173,373 +7916,72 @@
           <a:lstStyle/>
           <a:p>
             <a:r>
-              <a:rPr lang="zh-TW" altLang="en-US" dirty="0">
-                <a:latin typeface="標楷體" panose="03000509000000000000" pitchFamily="65" charset="-120"/>
-                <a:ea typeface="標楷體" panose="03000509000000000000" pitchFamily="65" charset="-120"/>
-              </a:rPr>
-              <a:t>問題討論</a:t>
-            </a:r>
+              <a:rPr lang="en-US" altLang="zh-TW" dirty="0"/>
+              <a:t>4.</a:t>
+            </a:r>
+            <a:endParaRPr lang="zh-TW" altLang="en-US" dirty="0"/>
           </a:p>
         </p:txBody>
       </p:sp>
       <p:sp>
         <p:nvSpPr>
-          <p:cNvPr id="4" name="標題 1">
+          <p:cNvPr id="3" name="內容版面配置區 2">
             <a:extLst>
               <a:ext uri="{FF2B5EF4-FFF2-40B4-BE49-F238E27FC236}">
-                <a16:creationId xmlns:a16="http://schemas.microsoft.com/office/drawing/2014/main" id="{982A2E51-34D5-E916-A511-4B6C9FD64EEC}"/>
-              </a:ext>
-            </a:extLst>
-          </p:cNvPr>
-          <p:cNvSpPr txBox="1">
-            <a:spLocks/>
-          </p:cNvSpPr>
-          <p:nvPr/>
-        </p:nvSpPr>
-        <p:spPr>
-          <a:xfrm>
-            <a:off x="925945" y="1459634"/>
-            <a:ext cx="10515600" cy="1325563"/>
-          </a:xfrm>
-          <a:prstGeom prst="rect">
-            <a:avLst/>
-          </a:prstGeom>
-        </p:spPr>
-        <p:txBody>
-          <a:bodyPr vert="horz" lIns="91440" tIns="45720" rIns="91440" bIns="45720" rtlCol="0" anchor="ctr">
-            <a:normAutofit/>
-          </a:bodyPr>
-          <a:lstStyle>
-            <a:lvl1pPr algn="l" defTabSz="914400" rtl="0" eaLnBrk="1" latinLnBrk="0" hangingPunct="1">
-              <a:lnSpc>
-                <a:spcPct val="90000"/>
-              </a:lnSpc>
-              <a:spcBef>
-                <a:spcPct val="0"/>
-              </a:spcBef>
-              <a:buNone/>
-              <a:defRPr sz="4400" kern="1200">
-                <a:solidFill>
-                  <a:schemeClr val="tx1"/>
-                </a:solidFill>
-                <a:latin typeface="+mj-lt"/>
-                <a:ea typeface="+mj-ea"/>
-                <a:cs typeface="+mj-cs"/>
-              </a:defRPr>
-            </a:lvl1pPr>
-          </a:lstStyle>
-          <a:p>
-            <a:r>
-              <a:rPr lang="en-US" altLang="zh-TW" sz="2400" dirty="0">
-                <a:latin typeface="標楷體" panose="03000509000000000000" pitchFamily="65" charset="-120"/>
-                <a:ea typeface="標楷體" panose="03000509000000000000" pitchFamily="65" charset="-120"/>
-              </a:rPr>
-              <a:t>(2)</a:t>
-            </a:r>
-            <a:r>
-              <a:rPr lang="zh-TW" altLang="en-US" sz="2400" dirty="0">
-                <a:latin typeface="標楷體" panose="03000509000000000000" pitchFamily="65" charset="-120"/>
-                <a:ea typeface="標楷體" panose="03000509000000000000" pitchFamily="65" charset="-120"/>
-              </a:rPr>
-              <a:t>根據實驗的設計，請討論參數改變對</a:t>
-            </a:r>
-            <a:r>
-              <a:rPr lang="en-US" altLang="zh-TW" sz="2400" dirty="0">
-                <a:latin typeface="標楷體" panose="03000509000000000000" pitchFamily="65" charset="-120"/>
-                <a:ea typeface="標楷體" panose="03000509000000000000" pitchFamily="65" charset="-120"/>
-              </a:rPr>
-              <a:t>PI</a:t>
-            </a:r>
-            <a:r>
-              <a:rPr lang="zh-TW" altLang="en-US" sz="2400" dirty="0">
-                <a:latin typeface="標楷體" panose="03000509000000000000" pitchFamily="65" charset="-120"/>
-                <a:ea typeface="標楷體" panose="03000509000000000000" pitchFamily="65" charset="-120"/>
-              </a:rPr>
-              <a:t>與</a:t>
-            </a:r>
-            <a:r>
-              <a:rPr lang="en-US" altLang="zh-TW" sz="2400" dirty="0">
-                <a:latin typeface="標楷體" panose="03000509000000000000" pitchFamily="65" charset="-120"/>
-                <a:ea typeface="標楷體" panose="03000509000000000000" pitchFamily="65" charset="-120"/>
-              </a:rPr>
-              <a:t>PID</a:t>
-            </a:r>
-            <a:r>
-              <a:rPr lang="zh-TW" altLang="en-US" sz="2400" dirty="0">
-                <a:latin typeface="標楷體" panose="03000509000000000000" pitchFamily="65" charset="-120"/>
-                <a:ea typeface="標楷體" panose="03000509000000000000" pitchFamily="65" charset="-120"/>
-              </a:rPr>
-              <a:t>控制器，在輸入相同步階訊號的情況下，與輸出訊號的差異</a:t>
-            </a:r>
-          </a:p>
-        </p:txBody>
-      </p:sp>
-      <p:sp>
-        <p:nvSpPr>
-          <p:cNvPr id="8" name="Rectangle 1">
-            <a:extLst>
-              <a:ext uri="{FF2B5EF4-FFF2-40B4-BE49-F238E27FC236}">
-                <a16:creationId xmlns:a16="http://schemas.microsoft.com/office/drawing/2014/main" id="{4EDB8AD8-B909-2413-AF5E-A907E5128A98}"/>
+                <a16:creationId xmlns:a16="http://schemas.microsoft.com/office/drawing/2014/main" id="{9D21D255-F322-5810-35BC-B6B1B3B0C894}"/>
               </a:ext>
             </a:extLst>
           </p:cNvPr>
           <p:cNvSpPr>
-            <a:spLocks noChangeArrowheads="1"/>
+            <a:spLocks noGrp="1"/>
           </p:cNvSpPr>
-          <p:nvPr/>
+          <p:nvPr>
+            <p:ph idx="1"/>
+          </p:nvPr>
         </p:nvSpPr>
-        <p:spPr bwMode="auto">
+        <p:spPr>
           <a:xfrm>
-            <a:off x="838200" y="2918643"/>
-            <a:ext cx="10270837" cy="2308324"/>
+            <a:off x="838200" y="2587625"/>
+            <a:ext cx="10515600" cy="1405255"/>
           </a:xfrm>
-          <a:prstGeom prst="rect">
-            <a:avLst/>
-          </a:prstGeom>
-          <a:noFill/>
-          <a:ln>
-            <a:noFill/>
-          </a:ln>
-          <a:effectLst/>
-          <a:extLst>
-            <a:ext uri="{909E8E84-426E-40DD-AFC4-6F175D3DCCD1}">
-              <a14:hiddenFill xmlns:a14="http://schemas.microsoft.com/office/drawing/2010/main">
-                <a:solidFill>
-                  <a:schemeClr val="accent1"/>
-                </a:solidFill>
-              </a14:hiddenFill>
-            </a:ext>
-            <a:ext uri="{91240B29-F687-4F45-9708-019B960494DF}">
-              <a14:hiddenLine xmlns:a14="http://schemas.microsoft.com/office/drawing/2010/main" w="9525">
-                <a:solidFill>
-                  <a:schemeClr val="tx1"/>
-                </a:solidFill>
-                <a:miter lim="800000"/>
-                <a:headEnd/>
-                <a:tailEnd/>
-              </a14:hiddenLine>
-            </a:ext>
-            <a:ext uri="{AF507438-7753-43E0-B8FC-AC1667EBCBE1}">
-              <a14:hiddenEffects xmlns:a14="http://schemas.microsoft.com/office/drawing/2010/main">
-                <a:effectLst>
-                  <a:outerShdw dist="35921" dir="2700000" algn="ctr" rotWithShape="0">
-                    <a:schemeClr val="bg2"/>
-                  </a:outerShdw>
-                </a:effectLst>
-              </a14:hiddenEffects>
-            </a:ext>
-          </a:extLst>
         </p:spPr>
         <p:txBody>
-          <a:bodyPr vert="horz" wrap="square" lIns="91440" tIns="45720" rIns="91440" bIns="45720" numCol="1" anchor="ctr" anchorCtr="0" compatLnSpc="1">
-            <a:prstTxWarp prst="textNoShape">
-              <a:avLst/>
-            </a:prstTxWarp>
-            <a:spAutoFit/>
+          <a:bodyPr>
+            <a:normAutofit/>
           </a:bodyPr>
           <a:lstStyle/>
           <a:p>
-            <a:pPr marL="0" marR="0" lvl="0" indent="0" algn="l" defTabSz="914400" rtl="0" eaLnBrk="0" fontAlgn="base" latinLnBrk="0" hangingPunct="0">
-              <a:lnSpc>
-                <a:spcPct val="100000"/>
-              </a:lnSpc>
-              <a:spcBef>
-                <a:spcPct val="0"/>
-              </a:spcBef>
-              <a:spcAft>
-                <a:spcPct val="0"/>
-              </a:spcAft>
-              <a:buClrTx/>
-              <a:buSzTx/>
-              <a:tabLst/>
+            <a:pPr marL="0" indent="0">
+              <a:buNone/>
             </a:pPr>
             <a:r>
-              <a:rPr kumimoji="0" lang="en-US" altLang="zh-TW" sz="2400" i="0" u="none" strike="noStrike" cap="none" normalizeH="0" baseline="0" dirty="0">
-                <a:ln>
-                  <a:noFill/>
-                </a:ln>
+              <a:rPr lang="en-US" altLang="zh-TW" b="0" i="0" u="none" strike="noStrike" dirty="0">
                 <a:solidFill>
-                  <a:schemeClr val="tx1"/>
+                  <a:srgbClr val="000000"/>
                 </a:solidFill>
                 <a:effectLst/>
-                <a:latin typeface="標楷體" panose="03000509000000000000" pitchFamily="65" charset="-120"/>
-                <a:ea typeface="標楷體" panose="03000509000000000000" pitchFamily="65" charset="-120"/>
+                <a:latin typeface="Times New Roman" panose="02020603050405020304" pitchFamily="18" charset="0"/>
               </a:rPr>
               <a:t>Ans:</a:t>
             </a:r>
-          </a:p>
-          <a:p>
-            <a:pPr marL="0" marR="0" lvl="0" indent="0" algn="l" defTabSz="914400" rtl="0" eaLnBrk="0" fontAlgn="base" latinLnBrk="0" hangingPunct="0">
-              <a:lnSpc>
-                <a:spcPct val="100000"/>
-              </a:lnSpc>
-              <a:spcBef>
-                <a:spcPct val="0"/>
-              </a:spcBef>
-              <a:spcAft>
-                <a:spcPct val="0"/>
-              </a:spcAft>
-              <a:buClrTx/>
-              <a:buSzTx/>
-              <a:tabLst/>
-            </a:pPr>
-            <a:r>
-              <a:rPr kumimoji="0" lang="zh-TW" altLang="zh-TW" sz="2000" i="0" u="none" strike="noStrike" cap="none" normalizeH="0" baseline="0" dirty="0">
-                <a:ln>
-                  <a:noFill/>
-                </a:ln>
+            <a:r>
+              <a:rPr lang="zh-TW" altLang="en-US" b="0" i="0" u="none" strike="noStrike" dirty="0">
                 <a:solidFill>
-                  <a:schemeClr val="tx1"/>
+                  <a:srgbClr val="000000"/>
                 </a:solidFill>
                 <a:effectLst/>
-                <a:latin typeface="標楷體" panose="03000509000000000000" pitchFamily="65" charset="-120"/>
-                <a:ea typeface="標楷體" panose="03000509000000000000" pitchFamily="65" charset="-120"/>
+                <a:latin typeface="Times New Roman" panose="02020603050405020304" pitchFamily="18" charset="0"/>
               </a:rPr>
-              <a:t>PI控制器適用於對穩態誤差要求高、但對超越量要求不高的系統。</a:t>
-            </a:r>
-            <a:endParaRPr kumimoji="0" lang="en-US" altLang="zh-TW" sz="2000" i="0" u="none" strike="noStrike" cap="none" normalizeH="0" baseline="0" dirty="0">
-              <a:ln>
-                <a:noFill/>
-              </a:ln>
-              <a:solidFill>
-                <a:schemeClr val="tx1"/>
-              </a:solidFill>
-              <a:effectLst/>
-              <a:latin typeface="標楷體" panose="03000509000000000000" pitchFamily="65" charset="-120"/>
-              <a:ea typeface="標楷體" panose="03000509000000000000" pitchFamily="65" charset="-120"/>
-            </a:endParaRPr>
-          </a:p>
-          <a:p>
-            <a:pPr marL="0" marR="0" lvl="0" indent="0" algn="l" defTabSz="914400" rtl="0" eaLnBrk="0" fontAlgn="base" latinLnBrk="0" hangingPunct="0">
-              <a:lnSpc>
-                <a:spcPct val="100000"/>
-              </a:lnSpc>
-              <a:spcBef>
-                <a:spcPct val="0"/>
-              </a:spcBef>
-              <a:spcAft>
-                <a:spcPct val="0"/>
-              </a:spcAft>
-              <a:buClrTx/>
-              <a:buSzTx/>
-              <a:tabLst/>
-            </a:pPr>
-            <a:endParaRPr kumimoji="0" lang="zh-TW" altLang="zh-TW" sz="2000" i="0" u="none" strike="noStrike" cap="none" normalizeH="0" baseline="0" dirty="0">
-              <a:ln>
-                <a:noFill/>
-              </a:ln>
-              <a:solidFill>
-                <a:schemeClr val="tx1"/>
-              </a:solidFill>
-              <a:effectLst/>
-              <a:latin typeface="標楷體" panose="03000509000000000000" pitchFamily="65" charset="-120"/>
-              <a:ea typeface="標楷體" panose="03000509000000000000" pitchFamily="65" charset="-120"/>
-            </a:endParaRPr>
-          </a:p>
-          <a:p>
-            <a:pPr marL="0" marR="0" lvl="0" indent="0" algn="l" defTabSz="914400" rtl="0" eaLnBrk="0" fontAlgn="base" latinLnBrk="0" hangingPunct="0">
-              <a:lnSpc>
-                <a:spcPct val="100000"/>
-              </a:lnSpc>
-              <a:spcBef>
-                <a:spcPct val="0"/>
-              </a:spcBef>
-              <a:spcAft>
-                <a:spcPct val="0"/>
-              </a:spcAft>
-              <a:buClrTx/>
-              <a:buSzTx/>
-              <a:tabLst/>
-            </a:pPr>
-            <a:r>
-              <a:rPr kumimoji="0" lang="zh-TW" altLang="zh-TW" sz="2000" i="0" u="none" strike="noStrike" cap="none" normalizeH="0" baseline="0" dirty="0">
-                <a:ln>
-                  <a:noFill/>
-                </a:ln>
-                <a:solidFill>
-                  <a:schemeClr val="tx1"/>
-                </a:solidFill>
-                <a:effectLst/>
-                <a:latin typeface="標楷體" panose="03000509000000000000" pitchFamily="65" charset="-120"/>
-                <a:ea typeface="標楷體" panose="03000509000000000000" pitchFamily="65" charset="-120"/>
-              </a:rPr>
-              <a:t>PID控制器適用於對反應速度與穩定性要求高的情境。</a:t>
-            </a:r>
-            <a:endParaRPr kumimoji="0" lang="en-US" altLang="zh-TW" sz="2000" i="0" u="none" strike="noStrike" cap="none" normalizeH="0" baseline="0" dirty="0">
-              <a:ln>
-                <a:noFill/>
-              </a:ln>
-              <a:solidFill>
-                <a:schemeClr val="tx1"/>
-              </a:solidFill>
-              <a:effectLst/>
-              <a:latin typeface="標楷體" panose="03000509000000000000" pitchFamily="65" charset="-120"/>
-              <a:ea typeface="標楷體" panose="03000509000000000000" pitchFamily="65" charset="-120"/>
-            </a:endParaRPr>
-          </a:p>
-          <a:p>
-            <a:pPr marL="0" marR="0" lvl="0" indent="0" algn="l" defTabSz="914400" rtl="0" eaLnBrk="0" fontAlgn="base" latinLnBrk="0" hangingPunct="0">
-              <a:lnSpc>
-                <a:spcPct val="100000"/>
-              </a:lnSpc>
-              <a:spcBef>
-                <a:spcPct val="0"/>
-              </a:spcBef>
-              <a:spcAft>
-                <a:spcPct val="0"/>
-              </a:spcAft>
-              <a:buClrTx/>
-              <a:buSzTx/>
-              <a:tabLst/>
-            </a:pPr>
-            <a:endParaRPr kumimoji="0" lang="zh-TW" altLang="zh-TW" sz="2000" i="0" u="none" strike="noStrike" cap="none" normalizeH="0" baseline="0" dirty="0">
-              <a:ln>
-                <a:noFill/>
-              </a:ln>
-              <a:solidFill>
-                <a:schemeClr val="tx1"/>
-              </a:solidFill>
-              <a:effectLst/>
-              <a:latin typeface="標楷體" panose="03000509000000000000" pitchFamily="65" charset="-120"/>
-              <a:ea typeface="標楷體" panose="03000509000000000000" pitchFamily="65" charset="-120"/>
-            </a:endParaRPr>
-          </a:p>
-          <a:p>
-            <a:pPr marL="0" marR="0" lvl="0" indent="0" algn="l" defTabSz="914400" rtl="0" eaLnBrk="0" fontAlgn="base" latinLnBrk="0" hangingPunct="0">
-              <a:lnSpc>
-                <a:spcPct val="100000"/>
-              </a:lnSpc>
-              <a:spcBef>
-                <a:spcPct val="0"/>
-              </a:spcBef>
-              <a:spcAft>
-                <a:spcPct val="0"/>
-              </a:spcAft>
-              <a:buClrTx/>
-              <a:buSzTx/>
-              <a:tabLst/>
-            </a:pPr>
-            <a:r>
-              <a:rPr kumimoji="0" lang="zh-TW" altLang="zh-TW" sz="2000" i="0" u="none" strike="noStrike" cap="none" normalizeH="0" baseline="0" dirty="0">
-                <a:ln>
-                  <a:noFill/>
-                </a:ln>
-                <a:solidFill>
-                  <a:schemeClr val="tx1"/>
-                </a:solidFill>
-                <a:effectLst/>
-                <a:latin typeface="標楷體" panose="03000509000000000000" pitchFamily="65" charset="-120"/>
-                <a:ea typeface="標楷體" panose="03000509000000000000" pitchFamily="65" charset="-120"/>
-              </a:rPr>
-              <a:t>實驗中可以透過調整比例、積分與微分增益來觀察波形變化，如：上升時間、尖峰時間、超越量、穩態誤差等指標。</a:t>
-            </a:r>
+              <a:t>幾個週期後所量到的較準，系統會慢慢穩定</a:t>
+            </a:r>
+            <a:endParaRPr lang="zh-TW" altLang="en-US" dirty="0"/>
           </a:p>
         </p:txBody>
       </p:sp>
     </p:spTree>
     <p:extLst>
       <p:ext uri="{BB962C8B-B14F-4D97-AF65-F5344CB8AC3E}">
-        <p14:creationId xmlns:p14="http://schemas.microsoft.com/office/powerpoint/2010/main" val="460641026"/>
+        <p14:creationId xmlns:p14="http://schemas.microsoft.com/office/powerpoint/2010/main" val="1414550412"/>
       </p:ext>
     </p:extLst>
   </p:cSld>

</xml_diff>

<commit_message>
final lab 8 ppt update
</commit_message>
<xml_diff>
--- a/實驗七/presentation/實驗七_第二組_葉彥辰_郭亮佑_蘇昱嘉.pptx
+++ b/實驗七/presentation/實驗七_第二組_葉彥辰_郭亮佑_蘇昱嘉.pptx
@@ -362,7 +362,7 @@
           <a:p>
             <a:fld id="{57D05ABF-D590-45D6-9362-AC05D4E152AF}" type="datetimeFigureOut">
               <a:rPr lang="zh-TW" altLang="en-US" smtClean="0"/>
-              <a:t>2025/4/13</a:t>
+              <a:t>2025/4/15</a:t>
             </a:fld>
             <a:endParaRPr lang="zh-TW" altLang="en-US"/>
           </a:p>
@@ -776,7 +776,7 @@
           <a:p>
             <a:fld id="{A6CAA258-0090-479D-81AE-6C5E423E63D8}" type="datetimeFigureOut">
               <a:rPr lang="zh-TW" altLang="en-US" smtClean="0"/>
-              <a:t>2025/4/13</a:t>
+              <a:t>2025/4/15</a:t>
             </a:fld>
             <a:endParaRPr lang="zh-TW" altLang="en-US"/>
           </a:p>
@@ -974,7 +974,7 @@
           <a:p>
             <a:fld id="{A6CAA258-0090-479D-81AE-6C5E423E63D8}" type="datetimeFigureOut">
               <a:rPr lang="zh-TW" altLang="en-US" smtClean="0"/>
-              <a:t>2025/4/13</a:t>
+              <a:t>2025/4/15</a:t>
             </a:fld>
             <a:endParaRPr lang="zh-TW" altLang="en-US"/>
           </a:p>
@@ -1182,7 +1182,7 @@
           <a:p>
             <a:fld id="{A6CAA258-0090-479D-81AE-6C5E423E63D8}" type="datetimeFigureOut">
               <a:rPr lang="zh-TW" altLang="en-US" smtClean="0"/>
-              <a:t>2025/4/13</a:t>
+              <a:t>2025/4/15</a:t>
             </a:fld>
             <a:endParaRPr lang="zh-TW" altLang="en-US"/>
           </a:p>
@@ -1380,7 +1380,7 @@
           <a:p>
             <a:fld id="{A6CAA258-0090-479D-81AE-6C5E423E63D8}" type="datetimeFigureOut">
               <a:rPr lang="zh-TW" altLang="en-US" smtClean="0"/>
-              <a:t>2025/4/13</a:t>
+              <a:t>2025/4/15</a:t>
             </a:fld>
             <a:endParaRPr lang="zh-TW" altLang="en-US"/>
           </a:p>
@@ -1655,7 +1655,7 @@
           <a:p>
             <a:fld id="{A6CAA258-0090-479D-81AE-6C5E423E63D8}" type="datetimeFigureOut">
               <a:rPr lang="zh-TW" altLang="en-US" smtClean="0"/>
-              <a:t>2025/4/13</a:t>
+              <a:t>2025/4/15</a:t>
             </a:fld>
             <a:endParaRPr lang="zh-TW" altLang="en-US"/>
           </a:p>
@@ -1920,7 +1920,7 @@
           <a:p>
             <a:fld id="{A6CAA258-0090-479D-81AE-6C5E423E63D8}" type="datetimeFigureOut">
               <a:rPr lang="zh-TW" altLang="en-US" smtClean="0"/>
-              <a:t>2025/4/13</a:t>
+              <a:t>2025/4/15</a:t>
             </a:fld>
             <a:endParaRPr lang="zh-TW" altLang="en-US"/>
           </a:p>
@@ -2332,7 +2332,7 @@
           <a:p>
             <a:fld id="{A6CAA258-0090-479D-81AE-6C5E423E63D8}" type="datetimeFigureOut">
               <a:rPr lang="zh-TW" altLang="en-US" smtClean="0"/>
-              <a:t>2025/4/13</a:t>
+              <a:t>2025/4/15</a:t>
             </a:fld>
             <a:endParaRPr lang="zh-TW" altLang="en-US"/>
           </a:p>
@@ -2473,7 +2473,7 @@
           <a:p>
             <a:fld id="{A6CAA258-0090-479D-81AE-6C5E423E63D8}" type="datetimeFigureOut">
               <a:rPr lang="zh-TW" altLang="en-US" smtClean="0"/>
-              <a:t>2025/4/13</a:t>
+              <a:t>2025/4/15</a:t>
             </a:fld>
             <a:endParaRPr lang="zh-TW" altLang="en-US"/>
           </a:p>
@@ -2586,7 +2586,7 @@
           <a:p>
             <a:fld id="{A6CAA258-0090-479D-81AE-6C5E423E63D8}" type="datetimeFigureOut">
               <a:rPr lang="zh-TW" altLang="en-US" smtClean="0"/>
-              <a:t>2025/4/13</a:t>
+              <a:t>2025/4/15</a:t>
             </a:fld>
             <a:endParaRPr lang="zh-TW" altLang="en-US"/>
           </a:p>
@@ -2897,7 +2897,7 @@
           <a:p>
             <a:fld id="{A6CAA258-0090-479D-81AE-6C5E423E63D8}" type="datetimeFigureOut">
               <a:rPr lang="zh-TW" altLang="en-US" smtClean="0"/>
-              <a:t>2025/4/13</a:t>
+              <a:t>2025/4/15</a:t>
             </a:fld>
             <a:endParaRPr lang="zh-TW" altLang="en-US"/>
           </a:p>
@@ -3185,7 +3185,7 @@
           <a:p>
             <a:fld id="{A6CAA258-0090-479D-81AE-6C5E423E63D8}" type="datetimeFigureOut">
               <a:rPr lang="zh-TW" altLang="en-US" smtClean="0"/>
-              <a:t>2025/4/13</a:t>
+              <a:t>2025/4/15</a:t>
             </a:fld>
             <a:endParaRPr lang="zh-TW" altLang="en-US"/>
           </a:p>
@@ -3426,7 +3426,7 @@
           <a:p>
             <a:fld id="{A6CAA258-0090-479D-81AE-6C5E423E63D8}" type="datetimeFigureOut">
               <a:rPr lang="zh-TW" altLang="en-US" smtClean="0"/>
-              <a:t>2025/4/13</a:t>
+              <a:t>2025/4/15</a:t>
             </a:fld>
             <a:endParaRPr lang="zh-TW" altLang="en-US"/>
           </a:p>
@@ -7556,7 +7556,7 @@
         </p:blipFill>
         <p:spPr>
           <a:xfrm>
-            <a:off x="925512" y="1822769"/>
+            <a:off x="838200" y="1822769"/>
             <a:ext cx="10852532" cy="3953668"/>
           </a:xfrm>
         </p:spPr>
@@ -7685,8 +7685,38 @@
           <a:lstStyle/>
           <a:p>
             <a:r>
-              <a:rPr lang="en-US" altLang="zh-TW" dirty="0"/>
+              <a:rPr lang="en-US" altLang="zh-TW" smtClean="0"/>
               <a:t>2.</a:t>
+            </a:r>
+            <a:endParaRPr lang="zh-TW" altLang="en-US" dirty="0"/>
+          </a:p>
+        </p:txBody>
+      </p:sp>
+      <p:sp>
+        <p:nvSpPr>
+          <p:cNvPr id="10" name="文字方塊 9"/>
+          <p:cNvSpPr txBox="1"/>
+          <p:nvPr/>
+        </p:nvSpPr>
+        <p:spPr>
+          <a:xfrm>
+            <a:off x="2038350" y="2019300"/>
+            <a:ext cx="2031325" cy="369332"/>
+          </a:xfrm>
+          <a:prstGeom prst="rect">
+            <a:avLst/>
+          </a:prstGeom>
+          <a:noFill/>
+        </p:spPr>
+        <p:txBody>
+          <a:bodyPr wrap="none" rtlCol="0">
+            <a:spAutoFit/>
+          </a:bodyPr>
+          <a:lstStyle/>
+          <a:p>
+            <a:r>
+              <a:rPr lang="zh-TW" altLang="en-US" dirty="0" smtClean="0"/>
+              <a:t>虛線為漸進線方法</a:t>
             </a:r>
             <a:endParaRPr lang="zh-TW" altLang="en-US" dirty="0"/>
           </a:p>
@@ -7694,13 +7724,7 @@
       </p:sp>
       <p:pic>
         <p:nvPicPr>
-          <p:cNvPr id="5" name="內容版面配置區 4">
-            <a:extLst>
-              <a:ext uri="{FF2B5EF4-FFF2-40B4-BE49-F238E27FC236}">
-                <a16:creationId xmlns:a16="http://schemas.microsoft.com/office/drawing/2014/main" id="{681F87EB-BBC3-CFCD-B4FA-8677C885092A}"/>
-              </a:ext>
-            </a:extLst>
-          </p:cNvPr>
+          <p:cNvPr id="12" name="內容版面配置區 11"/>
           <p:cNvPicPr>
             <a:picLocks noGrp="1" noChangeAspect="1"/>
           </p:cNvPicPr>
@@ -7709,15 +7733,21 @@
           </p:nvPr>
         </p:nvPicPr>
         <p:blipFill>
-          <a:blip r:embed="rId2"/>
+          <a:blip r:embed="rId2">
+            <a:extLst>
+              <a:ext uri="{28A0092B-C50C-407E-A947-70E740481C1C}">
+                <a14:useLocalDpi xmlns:a14="http://schemas.microsoft.com/office/drawing/2010/main" val="0"/>
+              </a:ext>
+            </a:extLst>
+          </a:blip>
           <a:stretch>
             <a:fillRect/>
           </a:stretch>
         </p:blipFill>
         <p:spPr>
           <a:xfrm>
-            <a:off x="2573134" y="1266830"/>
-            <a:ext cx="6377826" cy="4971093"/>
+            <a:off x="4347964" y="1690688"/>
+            <a:ext cx="5439172" cy="4351338"/>
           </a:xfrm>
         </p:spPr>
       </p:pic>
@@ -7767,7 +7797,12 @@
             <p:ph type="title"/>
           </p:nvPr>
         </p:nvSpPr>
-        <p:spPr/>
+        <p:spPr>
+          <a:xfrm>
+            <a:off x="927100" y="412227"/>
+            <a:ext cx="10515600" cy="1325563"/>
+          </a:xfrm>
+        </p:spPr>
         <p:txBody>
           <a:bodyPr/>
           <a:lstStyle/>
@@ -7780,85 +7815,539 @@
           </a:p>
         </p:txBody>
       </p:sp>
-      <p:sp>
-        <p:nvSpPr>
-          <p:cNvPr id="3" name="內容版面配置區 2">
+      <mc:AlternateContent xmlns:mc="http://schemas.openxmlformats.org/markup-compatibility/2006">
+        <mc:Choice xmlns:a14="http://schemas.microsoft.com/office/drawing/2010/main" Requires="a14">
+          <p:sp>
+            <p:nvSpPr>
+              <p:cNvPr id="3" name="內容版面配置區 2">
+                <a:extLst>
+                  <a:ext uri="{FF2B5EF4-FFF2-40B4-BE49-F238E27FC236}">
+                    <a16:creationId xmlns:a16="http://schemas.microsoft.com/office/drawing/2014/main" id="{26FAD726-BFA8-51E0-7763-88154901ABFB}"/>
+                  </a:ext>
+                </a:extLst>
+              </p:cNvPr>
+              <p:cNvSpPr>
+                <a:spLocks noGrp="1"/>
+              </p:cNvSpPr>
+              <p:nvPr>
+                <p:ph idx="1"/>
+              </p:nvPr>
+            </p:nvSpPr>
+            <p:spPr>
+              <a:xfrm>
+                <a:off x="838200" y="1530350"/>
+                <a:ext cx="6019800" cy="4646613"/>
+              </a:xfrm>
+            </p:spPr>
+            <p:txBody>
+              <a:bodyPr>
+                <a:normAutofit fontScale="85000" lnSpcReduction="10000"/>
+              </a:bodyPr>
+              <a:lstStyle/>
+              <a:p>
+                <a:pPr marL="0" indent="0">
+                  <a:buNone/>
+                </a:pPr>
+                <a:r>
+                  <a:rPr lang="en-US" altLang="zh-TW" b="0" i="0" u="none" strike="noStrike" dirty="0" smtClean="0">
+                    <a:solidFill>
+                      <a:srgbClr val="000000"/>
+                    </a:solidFill>
+                    <a:effectLst/>
+                    <a:latin typeface="Times New Roman" panose="02020603050405020304" pitchFamily="18" charset="0"/>
+                  </a:rPr>
+                  <a:t>Ans:</a:t>
+                </a:r>
+                <a:r>
+                  <a:rPr lang="zh-TW" altLang="en-US" b="0" i="0" u="none" strike="noStrike" dirty="0" smtClean="0">
+                    <a:solidFill>
+                      <a:srgbClr val="000000"/>
+                    </a:solidFill>
+                    <a:effectLst/>
+                    <a:latin typeface="Times New Roman" panose="02020603050405020304" pitchFamily="18" charset="0"/>
+                  </a:rPr>
+                  <a:t>除了</a:t>
+                </a:r>
+                <a:r>
+                  <a:rPr lang="en-US" altLang="zh-TW" b="0" i="0" u="none" strike="noStrike" dirty="0" smtClean="0">
+                    <a:solidFill>
+                      <a:srgbClr val="000000"/>
+                    </a:solidFill>
+                    <a:effectLst/>
+                    <a:latin typeface="Times New Roman" panose="02020603050405020304" pitchFamily="18" charset="0"/>
+                  </a:rPr>
+                  <a:t>Gain</a:t>
+                </a:r>
+                <a:r>
+                  <a:rPr lang="zh-TW" altLang="en-US" b="0" i="0" u="none" strike="noStrike" dirty="0" smtClean="0">
+                    <a:solidFill>
+                      <a:srgbClr val="000000"/>
+                    </a:solidFill>
+                    <a:effectLst/>
+                    <a:latin typeface="Times New Roman" panose="02020603050405020304" pitchFamily="18" charset="0"/>
+                  </a:rPr>
+                  <a:t>下降的起始點不同之外，</a:t>
+                </a:r>
+                <a:endParaRPr lang="en-US" altLang="zh-TW" b="0" i="0" u="none" strike="noStrike" dirty="0" smtClean="0">
+                  <a:solidFill>
+                    <a:srgbClr val="000000"/>
+                  </a:solidFill>
+                  <a:effectLst/>
+                  <a:latin typeface="Times New Roman" panose="02020603050405020304" pitchFamily="18" charset="0"/>
+                </a:endParaRPr>
+              </a:p>
+              <a:p>
+                <a:pPr marL="0" indent="0">
+                  <a:buNone/>
+                </a:pPr>
+                <a:r>
+                  <a:rPr lang="zh-TW" altLang="en-US" dirty="0">
+                    <a:solidFill>
+                      <a:srgbClr val="000000"/>
+                    </a:solidFill>
+                    <a:latin typeface="Times New Roman" panose="02020603050405020304" pitchFamily="18" charset="0"/>
+                  </a:rPr>
+                  <a:t>因為</a:t>
+                </a:r>
+                <a:r>
+                  <a:rPr lang="zh-TW" altLang="en-US" dirty="0" smtClean="0">
+                    <a:solidFill>
+                      <a:srgbClr val="000000"/>
+                    </a:solidFill>
+                    <a:latin typeface="Times New Roman" panose="02020603050405020304" pitchFamily="18" charset="0"/>
+                  </a:rPr>
+                  <a:t>是 </a:t>
+                </a:r>
+                <a14:m>
+                  <m:oMath xmlns:m="http://schemas.openxmlformats.org/officeDocument/2006/math">
+                    <m:f>
+                      <m:fPr>
+                        <m:ctrlPr>
+                          <a:rPr lang="en-US" altLang="zh-TW" b="0" i="1" smtClean="0">
+                            <a:solidFill>
+                              <a:srgbClr val="000000"/>
+                            </a:solidFill>
+                            <a:latin typeface="Cambria Math" panose="02040503050406030204" pitchFamily="18" charset="0"/>
+                          </a:rPr>
+                        </m:ctrlPr>
+                      </m:fPr>
+                      <m:num>
+                        <m:f>
+                          <m:fPr>
+                            <m:ctrlPr>
+                              <a:rPr lang="en-US" altLang="zh-TW" b="0" i="1" smtClean="0">
+                                <a:solidFill>
+                                  <a:srgbClr val="000000"/>
+                                </a:solidFill>
+                                <a:latin typeface="Cambria Math" panose="02040503050406030204" pitchFamily="18" charset="0"/>
+                              </a:rPr>
+                            </m:ctrlPr>
+                          </m:fPr>
+                          <m:num>
+                            <m:sSub>
+                              <m:sSubPr>
+                                <m:ctrlPr>
+                                  <a:rPr lang="en-US" altLang="zh-TW" b="0" i="1" smtClean="0">
+                                    <a:solidFill>
+                                      <a:srgbClr val="000000"/>
+                                    </a:solidFill>
+                                    <a:latin typeface="Cambria Math" panose="02040503050406030204" pitchFamily="18" charset="0"/>
+                                  </a:rPr>
+                                </m:ctrlPr>
+                              </m:sSubPr>
+                              <m:e>
+                                <m:r>
+                                  <a:rPr lang="en-US" altLang="zh-TW" b="0" i="1" smtClean="0">
+                                    <a:solidFill>
+                                      <a:srgbClr val="000000"/>
+                                    </a:solidFill>
+                                    <a:latin typeface="Cambria Math" panose="02040503050406030204" pitchFamily="18" charset="0"/>
+                                  </a:rPr>
+                                  <m:t>𝐾</m:t>
+                                </m:r>
+                              </m:e>
+                              <m:sub>
+                                <m:r>
+                                  <a:rPr lang="en-US" altLang="zh-TW" b="0" i="1" smtClean="0">
+                                    <a:solidFill>
+                                      <a:srgbClr val="000000"/>
+                                    </a:solidFill>
+                                    <a:latin typeface="Cambria Math" panose="02040503050406030204" pitchFamily="18" charset="0"/>
+                                  </a:rPr>
+                                  <m:t>𝐴</m:t>
+                                </m:r>
+                              </m:sub>
+                            </m:sSub>
+                            <m:sSub>
+                              <m:sSubPr>
+                                <m:ctrlPr>
+                                  <a:rPr lang="en-US" altLang="zh-TW" b="0" i="1" smtClean="0">
+                                    <a:solidFill>
+                                      <a:srgbClr val="000000"/>
+                                    </a:solidFill>
+                                    <a:latin typeface="Cambria Math" panose="02040503050406030204" pitchFamily="18" charset="0"/>
+                                  </a:rPr>
+                                </m:ctrlPr>
+                              </m:sSubPr>
+                              <m:e>
+                                <m:r>
+                                  <a:rPr lang="en-US" altLang="zh-TW" b="0" i="1" smtClean="0">
+                                    <a:solidFill>
+                                      <a:srgbClr val="000000"/>
+                                    </a:solidFill>
+                                    <a:latin typeface="Cambria Math" panose="02040503050406030204" pitchFamily="18" charset="0"/>
+                                  </a:rPr>
+                                  <m:t>𝑃</m:t>
+                                </m:r>
+                              </m:e>
+                              <m:sub>
+                                <m:r>
+                                  <a:rPr lang="en-US" altLang="zh-TW" b="0" i="1" smtClean="0">
+                                    <a:solidFill>
+                                      <a:srgbClr val="000000"/>
+                                    </a:solidFill>
+                                    <a:latin typeface="Cambria Math" panose="02040503050406030204" pitchFamily="18" charset="0"/>
+                                  </a:rPr>
+                                  <m:t>5</m:t>
+                                </m:r>
+                              </m:sub>
+                            </m:sSub>
+                          </m:num>
+                          <m:den>
+                            <m:r>
+                              <a:rPr lang="en-US" altLang="zh-TW" b="0" i="1" smtClean="0">
+                                <a:solidFill>
+                                  <a:srgbClr val="000000"/>
+                                </a:solidFill>
+                                <a:latin typeface="Cambria Math" panose="02040503050406030204" pitchFamily="18" charset="0"/>
+                              </a:rPr>
+                              <m:t>0.8</m:t>
+                            </m:r>
+                          </m:den>
+                        </m:f>
+                      </m:num>
+                      <m:den>
+                        <m:r>
+                          <a:rPr lang="en-US" altLang="zh-TW" b="0" i="1" smtClean="0">
+                            <a:solidFill>
+                              <a:srgbClr val="000000"/>
+                            </a:solidFill>
+                            <a:latin typeface="Cambria Math" panose="02040503050406030204" pitchFamily="18" charset="0"/>
+                          </a:rPr>
+                          <m:t>𝑠</m:t>
+                        </m:r>
+                        <m:r>
+                          <a:rPr lang="en-US" altLang="zh-TW" b="0" i="1" smtClean="0">
+                            <a:solidFill>
+                              <a:srgbClr val="000000"/>
+                            </a:solidFill>
+                            <a:latin typeface="Cambria Math" panose="02040503050406030204" pitchFamily="18" charset="0"/>
+                          </a:rPr>
+                          <m:t>+</m:t>
+                        </m:r>
+                        <m:f>
+                          <m:fPr>
+                            <m:ctrlPr>
+                              <a:rPr lang="en-US" altLang="zh-TW" b="0" i="1" smtClean="0">
+                                <a:solidFill>
+                                  <a:srgbClr val="000000"/>
+                                </a:solidFill>
+                                <a:latin typeface="Cambria Math" panose="02040503050406030204" pitchFamily="18" charset="0"/>
+                              </a:rPr>
+                            </m:ctrlPr>
+                          </m:fPr>
+                          <m:num>
+                            <m:sSub>
+                              <m:sSubPr>
+                                <m:ctrlPr>
+                                  <a:rPr lang="en-US" altLang="zh-TW" b="0" i="1" smtClean="0">
+                                    <a:solidFill>
+                                      <a:srgbClr val="000000"/>
+                                    </a:solidFill>
+                                    <a:latin typeface="Cambria Math" panose="02040503050406030204" pitchFamily="18" charset="0"/>
+                                  </a:rPr>
+                                </m:ctrlPr>
+                              </m:sSubPr>
+                              <m:e>
+                                <m:r>
+                                  <a:rPr lang="en-US" altLang="zh-TW" b="0" i="1" smtClean="0">
+                                    <a:solidFill>
+                                      <a:srgbClr val="000000"/>
+                                    </a:solidFill>
+                                    <a:latin typeface="Cambria Math" panose="02040503050406030204" pitchFamily="18" charset="0"/>
+                                  </a:rPr>
+                                  <m:t>𝐾</m:t>
+                                </m:r>
+                              </m:e>
+                              <m:sub>
+                                <m:r>
+                                  <a:rPr lang="en-US" altLang="zh-TW" b="0" i="1" smtClean="0">
+                                    <a:solidFill>
+                                      <a:srgbClr val="000000"/>
+                                    </a:solidFill>
+                                    <a:latin typeface="Cambria Math" panose="02040503050406030204" pitchFamily="18" charset="0"/>
+                                  </a:rPr>
+                                  <m:t>𝐴</m:t>
+                                </m:r>
+                              </m:sub>
+                            </m:sSub>
+                            <m:sSub>
+                              <m:sSubPr>
+                                <m:ctrlPr>
+                                  <a:rPr lang="en-US" altLang="zh-TW" b="0" i="1" smtClean="0">
+                                    <a:solidFill>
+                                      <a:srgbClr val="000000"/>
+                                    </a:solidFill>
+                                    <a:latin typeface="Cambria Math" panose="02040503050406030204" pitchFamily="18" charset="0"/>
+                                  </a:rPr>
+                                </m:ctrlPr>
+                              </m:sSubPr>
+                              <m:e>
+                                <m:r>
+                                  <a:rPr lang="en-US" altLang="zh-TW" b="0" i="1" smtClean="0">
+                                    <a:solidFill>
+                                      <a:srgbClr val="000000"/>
+                                    </a:solidFill>
+                                    <a:latin typeface="Cambria Math" panose="02040503050406030204" pitchFamily="18" charset="0"/>
+                                  </a:rPr>
+                                  <m:t>𝑃</m:t>
+                                </m:r>
+                              </m:e>
+                              <m:sub>
+                                <m:r>
+                                  <a:rPr lang="en-US" altLang="zh-TW" b="0" i="1" smtClean="0">
+                                    <a:solidFill>
+                                      <a:srgbClr val="000000"/>
+                                    </a:solidFill>
+                                    <a:latin typeface="Cambria Math" panose="02040503050406030204" pitchFamily="18" charset="0"/>
+                                  </a:rPr>
+                                  <m:t>5</m:t>
+                                </m:r>
+                              </m:sub>
+                            </m:sSub>
+                          </m:num>
+                          <m:den>
+                            <m:r>
+                              <a:rPr lang="en-US" altLang="zh-TW" b="0" i="1" smtClean="0">
+                                <a:solidFill>
+                                  <a:srgbClr val="000000"/>
+                                </a:solidFill>
+                                <a:latin typeface="Cambria Math" panose="02040503050406030204" pitchFamily="18" charset="0"/>
+                              </a:rPr>
+                              <m:t>0.8</m:t>
+                            </m:r>
+                          </m:den>
+                        </m:f>
+                      </m:den>
+                    </m:f>
+                    <m:r>
+                      <a:rPr lang="zh-TW" altLang="en-US" i="1">
+                        <a:solidFill>
+                          <a:srgbClr val="000000"/>
+                        </a:solidFill>
+                        <a:latin typeface="Cambria Math" panose="02040503050406030204" pitchFamily="18" charset="0"/>
+                      </a:rPr>
+                      <m:t>的關係。</m:t>
+                    </m:r>
+                  </m:oMath>
+                </a14:m>
+                <a:endParaRPr lang="en-US" altLang="zh-TW" b="0" i="0" u="none" strike="noStrike" dirty="0" smtClean="0">
+                  <a:solidFill>
+                    <a:srgbClr val="000000"/>
+                  </a:solidFill>
+                  <a:effectLst/>
+                  <a:latin typeface="Times New Roman" panose="02020603050405020304" pitchFamily="18" charset="0"/>
+                </a:endParaRPr>
+              </a:p>
+              <a:p>
+                <a:pPr marL="0" indent="0">
+                  <a:buNone/>
+                </a:pPr>
+                <a:r>
+                  <a:rPr lang="en-US" altLang="zh-TW" dirty="0" smtClean="0">
+                    <a:solidFill>
+                      <a:srgbClr val="000000"/>
+                    </a:solidFill>
+                    <a:latin typeface="Times New Roman" panose="02020603050405020304" pitchFamily="18" charset="0"/>
+                  </a:rPr>
+                  <a:t>Phase</a:t>
+                </a:r>
+                <a:r>
+                  <a:rPr lang="zh-TW" altLang="en-US" dirty="0" smtClean="0">
+                    <a:solidFill>
+                      <a:srgbClr val="000000"/>
+                    </a:solidFill>
+                    <a:latin typeface="Times New Roman" panose="02020603050405020304" pitchFamily="18" charset="0"/>
+                  </a:rPr>
+                  <a:t>那邊雖然</a:t>
+                </a:r>
+                <a:r>
+                  <a:rPr lang="en-US" altLang="zh-TW" dirty="0" smtClean="0">
+                    <a:solidFill>
+                      <a:srgbClr val="000000"/>
+                    </a:solidFill>
+                    <a:latin typeface="Times New Roman" panose="02020603050405020304" pitchFamily="18" charset="0"/>
+                  </a:rPr>
+                  <a:t>10^-1</a:t>
+                </a:r>
+                <a:r>
+                  <a:rPr lang="zh-TW" altLang="en-US" dirty="0" smtClean="0">
+                    <a:solidFill>
+                      <a:srgbClr val="000000"/>
+                    </a:solidFill>
+                    <a:latin typeface="Times New Roman" panose="02020603050405020304" pitchFamily="18" charset="0"/>
+                  </a:rPr>
+                  <a:t>以前和</a:t>
+                </a:r>
+                <a:r>
+                  <a:rPr lang="en-US" altLang="zh-TW" dirty="0" smtClean="0">
+                    <a:solidFill>
+                      <a:srgbClr val="000000"/>
+                    </a:solidFill>
+                    <a:latin typeface="Times New Roman" panose="02020603050405020304" pitchFamily="18" charset="0"/>
+                  </a:rPr>
+                  <a:t>10^3</a:t>
+                </a:r>
+                <a:r>
+                  <a:rPr lang="zh-TW" altLang="en-US" dirty="0" smtClean="0">
+                    <a:solidFill>
+                      <a:srgbClr val="000000"/>
+                    </a:solidFill>
+                    <a:latin typeface="Times New Roman" panose="02020603050405020304" pitchFamily="18" charset="0"/>
+                  </a:rPr>
+                  <a:t>之後差不多，但中間過程有差異，</a:t>
+                </a:r>
+                <a14:m>
+                  <m:oMath xmlns:m="http://schemas.openxmlformats.org/officeDocument/2006/math">
+                    <m:sSub>
+                      <m:sSubPr>
+                        <m:ctrlPr>
+                          <a:rPr lang="en-US" altLang="zh-TW" b="0" i="1" smtClean="0">
+                            <a:solidFill>
+                              <a:srgbClr val="000000"/>
+                            </a:solidFill>
+                            <a:latin typeface="Cambria Math" panose="02040503050406030204" pitchFamily="18" charset="0"/>
+                          </a:rPr>
+                        </m:ctrlPr>
+                      </m:sSubPr>
+                      <m:e>
+                        <m:r>
+                          <a:rPr lang="en-US" altLang="zh-TW" b="0" i="1" smtClean="0">
+                            <a:solidFill>
+                              <a:srgbClr val="000000"/>
+                            </a:solidFill>
+                            <a:latin typeface="Cambria Math" panose="02040503050406030204" pitchFamily="18" charset="0"/>
+                          </a:rPr>
+                          <m:t>𝑃</m:t>
+                        </m:r>
+                      </m:e>
+                      <m:sub>
+                        <m:r>
+                          <a:rPr lang="en-US" altLang="zh-TW" b="0" i="1" smtClean="0">
+                            <a:solidFill>
+                              <a:srgbClr val="000000"/>
+                            </a:solidFill>
+                            <a:latin typeface="Cambria Math" panose="02040503050406030204" pitchFamily="18" charset="0"/>
+                          </a:rPr>
+                          <m:t>5</m:t>
+                        </m:r>
+                      </m:sub>
+                    </m:sSub>
+                  </m:oMath>
+                </a14:m>
+                <a:r>
+                  <a:rPr lang="zh-TW" altLang="en-US" dirty="0" smtClean="0">
+                    <a:solidFill>
+                      <a:srgbClr val="000000"/>
+                    </a:solidFill>
+                    <a:latin typeface="Times New Roman" panose="02020603050405020304" pitchFamily="18" charset="0"/>
+                  </a:rPr>
+                  <a:t>越低越陡急。</a:t>
+                </a:r>
+                <a:endParaRPr lang="en-US" altLang="zh-TW" dirty="0" smtClean="0">
+                  <a:solidFill>
+                    <a:srgbClr val="000000"/>
+                  </a:solidFill>
+                  <a:latin typeface="Times New Roman" panose="02020603050405020304" pitchFamily="18" charset="0"/>
+                </a:endParaRPr>
+              </a:p>
+            </p:txBody>
+          </p:sp>
+        </mc:Choice>
+        <mc:Fallback>
+          <p:sp>
+            <p:nvSpPr>
+              <p:cNvPr id="3" name="內容版面配置區 2">
+                <a:extLst>
+                  <a:ext uri="{FF2B5EF4-FFF2-40B4-BE49-F238E27FC236}">
+                    <a16:creationId xmlns:a16="http://schemas.microsoft.com/office/drawing/2014/main" id="{26FAD726-BFA8-51E0-7763-88154901ABFB}"/>
+                  </a:ext>
+                </a:extLst>
+              </p:cNvPr>
+              <p:cNvSpPr>
+                <a:spLocks noGrp="1" noRot="1" noChangeAspect="1" noMove="1" noResize="1" noEditPoints="1" noAdjustHandles="1" noChangeArrowheads="1" noChangeShapeType="1" noTextEdit="1"/>
+              </p:cNvSpPr>
+              <p:nvPr>
+                <p:ph idx="1"/>
+              </p:nvPr>
+            </p:nvSpPr>
+            <p:spPr>
+              <a:xfrm>
+                <a:off x="838200" y="1530350"/>
+                <a:ext cx="6019800" cy="4646613"/>
+              </a:xfrm>
+              <a:blipFill>
+                <a:blip r:embed="rId2"/>
+                <a:stretch>
+                  <a:fillRect l="-1621" t="-2625" r="-3850"/>
+                </a:stretch>
+              </a:blipFill>
+            </p:spPr>
+            <p:txBody>
+              <a:bodyPr/>
+              <a:lstStyle/>
+              <a:p>
+                <a:r>
+                  <a:rPr lang="zh-TW" altLang="en-US">
+                    <a:noFill/>
+                  </a:rPr>
+                  <a:t> </a:t>
+                </a:r>
+              </a:p>
+            </p:txBody>
+          </p:sp>
+        </mc:Fallback>
+      </mc:AlternateContent>
+      <p:pic>
+        <p:nvPicPr>
+          <p:cNvPr id="4" name="圖片 3"/>
+          <p:cNvPicPr>
+            <a:picLocks noChangeAspect="1"/>
+          </p:cNvPicPr>
+          <p:nvPr/>
+        </p:nvPicPr>
+        <p:blipFill>
+          <a:blip r:embed="rId3">
             <a:extLst>
-              <a:ext uri="{FF2B5EF4-FFF2-40B4-BE49-F238E27FC236}">
-                <a16:creationId xmlns:a16="http://schemas.microsoft.com/office/drawing/2014/main" id="{26FAD726-BFA8-51E0-7763-88154901ABFB}"/>
+              <a:ext uri="{28A0092B-C50C-407E-A947-70E740481C1C}">
+                <a14:useLocalDpi xmlns:a14="http://schemas.microsoft.com/office/drawing/2010/main" val="0"/>
               </a:ext>
             </a:extLst>
-          </p:cNvPr>
-          <p:cNvSpPr>
-            <a:spLocks noGrp="1"/>
-          </p:cNvSpPr>
-          <p:nvPr>
-            <p:ph idx="1"/>
-          </p:nvPr>
-        </p:nvSpPr>
-        <p:spPr/>
-        <p:txBody>
-          <a:bodyPr>
-            <a:normAutofit/>
-          </a:bodyPr>
-          <a:lstStyle/>
-          <a:p>
-            <a:pPr marL="0" indent="0">
-              <a:buNone/>
-            </a:pPr>
-            <a:r>
-              <a:rPr lang="en-US" altLang="zh-TW" b="0" i="0" u="none" strike="noStrike" dirty="0">
-                <a:solidFill>
-                  <a:srgbClr val="000000"/>
-                </a:solidFill>
-                <a:effectLst/>
-                <a:latin typeface="Times New Roman" panose="02020603050405020304" pitchFamily="18" charset="0"/>
-              </a:rPr>
-              <a:t>Ans:</a:t>
-            </a:r>
-            <a:r>
-              <a:rPr lang="zh-TW" altLang="en-US" b="0" i="0" u="none" strike="noStrike" dirty="0">
-                <a:solidFill>
-                  <a:srgbClr val="000000"/>
-                </a:solidFill>
-                <a:effectLst/>
-                <a:latin typeface="Times New Roman" panose="02020603050405020304" pitchFamily="18" charset="0"/>
-              </a:rPr>
-              <a:t> </a:t>
-            </a:r>
-            <a:r>
-              <a:rPr lang="en-US" altLang="zh-TW" b="0" i="0" u="none" strike="noStrike" dirty="0">
-                <a:solidFill>
-                  <a:srgbClr val="000000"/>
-                </a:solidFill>
-                <a:effectLst/>
-                <a:latin typeface="Times New Roman" panose="02020603050405020304" pitchFamily="18" charset="0"/>
-              </a:rPr>
-              <a:t>P5</a:t>
-            </a:r>
-            <a:r>
-              <a:rPr lang="zh-TW" altLang="en-US" dirty="0">
-                <a:solidFill>
-                  <a:srgbClr val="000000"/>
-                </a:solidFill>
-                <a:latin typeface="Times New Roman" panose="02020603050405020304" pitchFamily="18" charset="0"/>
-              </a:rPr>
-              <a:t>增大時</a:t>
-            </a:r>
-            <a:r>
-              <a:rPr lang="zh-TW" altLang="en-US" b="0" i="0" u="none" strike="noStrike" dirty="0">
-                <a:solidFill>
-                  <a:srgbClr val="000000"/>
-                </a:solidFill>
-                <a:effectLst/>
-                <a:latin typeface="Times New Roman" panose="02020603050405020304" pitchFamily="18" charset="0"/>
-              </a:rPr>
-              <a:t>，角頻率會增加。</a:t>
-            </a:r>
-            <a:endParaRPr lang="zh-TW" altLang="en-US" dirty="0"/>
-          </a:p>
-        </p:txBody>
-      </p:sp>
+          </a:blip>
+          <a:stretch>
+            <a:fillRect/>
+          </a:stretch>
+        </p:blipFill>
+        <p:spPr>
+          <a:xfrm>
+            <a:off x="6807533" y="2001294"/>
+            <a:ext cx="5333333" cy="4000000"/>
+          </a:xfrm>
+          <a:prstGeom prst="rect">
+            <a:avLst/>
+          </a:prstGeom>
+        </p:spPr>
+      </p:pic>
     </p:spTree>
     <p:extLst>
       <p:ext uri="{BB962C8B-B14F-4D97-AF65-F5344CB8AC3E}">

</xml_diff>